<commit_message>
adding LinkedIn slide to the end of the slide deck
</commit_message>
<xml_diff>
--- a/VSCintro-demo.pptx
+++ b/VSCintro-demo.pptx
@@ -3,26 +3,28 @@
 <p:presentation xmlns:a="http://schemas.openxmlformats.org/drawingml/2006/main" xmlns:r="http://schemas.openxmlformats.org/officeDocument/2006/relationships" xmlns:p="http://schemas.openxmlformats.org/presentationml/2006/main" showSpecialPlsOnTitleSld="0" saveSubsetFonts="1">
   <p:sldMasterIdLst>
     <p:sldMasterId id="2147483648" r:id="rId6"/>
+    <p:sldMasterId id="2147483712" r:id="rId7"/>
   </p:sldMasterIdLst>
   <p:notesMasterIdLst>
-    <p:notesMasterId r:id="rId19"/>
+    <p:notesMasterId r:id="rId21"/>
   </p:notesMasterIdLst>
   <p:handoutMasterIdLst>
-    <p:handoutMasterId r:id="rId20"/>
+    <p:handoutMasterId r:id="rId22"/>
   </p:handoutMasterIdLst>
   <p:sldIdLst>
-    <p:sldId id="258" r:id="rId7"/>
-    <p:sldId id="411" r:id="rId8"/>
-    <p:sldId id="987" r:id="rId9"/>
-    <p:sldId id="989" r:id="rId10"/>
-    <p:sldId id="986" r:id="rId11"/>
-    <p:sldId id="988" r:id="rId12"/>
-    <p:sldId id="990" r:id="rId13"/>
-    <p:sldId id="994" r:id="rId14"/>
-    <p:sldId id="979" r:id="rId15"/>
-    <p:sldId id="991" r:id="rId16"/>
-    <p:sldId id="992" r:id="rId17"/>
-    <p:sldId id="993" r:id="rId18"/>
+    <p:sldId id="258" r:id="rId8"/>
+    <p:sldId id="411" r:id="rId9"/>
+    <p:sldId id="987" r:id="rId10"/>
+    <p:sldId id="989" r:id="rId11"/>
+    <p:sldId id="986" r:id="rId12"/>
+    <p:sldId id="988" r:id="rId13"/>
+    <p:sldId id="990" r:id="rId14"/>
+    <p:sldId id="994" r:id="rId15"/>
+    <p:sldId id="979" r:id="rId16"/>
+    <p:sldId id="991" r:id="rId17"/>
+    <p:sldId id="992" r:id="rId18"/>
+    <p:sldId id="993" r:id="rId19"/>
+    <p:sldId id="256" r:id="rId20"/>
   </p:sldIdLst>
   <p:sldSz cx="12192000" cy="6858000"/>
   <p:notesSz cx="6858000" cy="9144000"/>
@@ -222,7 +224,7 @@
           <a:p>
             <a:fld id="{01F519A0-78CB-4E85-BDD7-0175329041AC}" type="datetimeFigureOut">
               <a:rPr lang="en-US" smtClean="0"/>
-              <a:t>9/15/2020</a:t>
+              <a:t>2/18/2021</a:t>
             </a:fld>
             <a:endParaRPr lang="en-US"/>
           </a:p>
@@ -388,7 +390,7 @@
           <a:p>
             <a:fld id="{337BDF4F-FAE4-4E7A-B003-7AAF79F14F3C}" type="datetimeFigureOut">
               <a:rPr lang="en-US" smtClean="0"/>
-              <a:t>9/15/2020</a:t>
+              <a:t>2/18/2021</a:t>
             </a:fld>
             <a:endParaRPr lang="en-US"/>
           </a:p>
@@ -853,7 +855,7 @@
           <a:p>
             <a:fld id="{12D417FB-DB75-4510-8AD7-5416595AADD8}" type="datetime1">
               <a:rPr lang="en-US" smtClean="0"/>
-              <a:t>9/15/2020</a:t>
+              <a:t>2/18/2021</a:t>
             </a:fld>
             <a:endParaRPr lang="en-US"/>
           </a:p>
@@ -1230,7 +1232,812 @@
 </p:sldLayout>
 </file>
 
-<file path=ppt/slideLayouts/slideLayout2.xml><?xml version="1.0" encoding="utf-8"?>
+<file path=ppt/slideLayouts/slideLayout10.xml><?xml version="1.0" encoding="utf-8"?>
+<p:sldLayout xmlns:a="http://schemas.openxmlformats.org/drawingml/2006/main" xmlns:r="http://schemas.openxmlformats.org/officeDocument/2006/relationships" xmlns:p="http://schemas.openxmlformats.org/presentationml/2006/main" type="twoObj" preserve="1">
+  <p:cSld name="Two Content">
+    <p:spTree>
+      <p:nvGrpSpPr>
+        <p:cNvPr id="1" name=""/>
+        <p:cNvGrpSpPr/>
+        <p:nvPr/>
+      </p:nvGrpSpPr>
+      <p:grpSpPr>
+        <a:xfrm>
+          <a:off x="0" y="0"/>
+          <a:ext cx="0" cy="0"/>
+          <a:chOff x="0" y="0"/>
+          <a:chExt cx="0" cy="0"/>
+        </a:xfrm>
+      </p:grpSpPr>
+      <p:sp>
+        <p:nvSpPr>
+          <p:cNvPr id="2" name="Title 1"/>
+          <p:cNvSpPr>
+            <a:spLocks noGrp="1"/>
+          </p:cNvSpPr>
+          <p:nvPr>
+            <p:ph type="title"/>
+          </p:nvPr>
+        </p:nvSpPr>
+        <p:spPr/>
+        <p:txBody>
+          <a:bodyPr/>
+          <a:lstStyle/>
+          <a:p>
+            <a:r>
+              <a:rPr lang="en-US"/>
+              <a:t>Click to edit Master title style</a:t>
+            </a:r>
+          </a:p>
+        </p:txBody>
+      </p:sp>
+      <p:sp>
+        <p:nvSpPr>
+          <p:cNvPr id="3" name="Content Placeholder 2"/>
+          <p:cNvSpPr>
+            <a:spLocks noGrp="1"/>
+          </p:cNvSpPr>
+          <p:nvPr>
+            <p:ph sz="half" idx="1"/>
+          </p:nvPr>
+        </p:nvSpPr>
+        <p:spPr>
+          <a:xfrm>
+            <a:off x="838200" y="1825625"/>
+            <a:ext cx="5181600" cy="4351338"/>
+          </a:xfrm>
+        </p:spPr>
+        <p:txBody>
+          <a:bodyPr/>
+          <a:lstStyle/>
+          <a:p>
+            <a:pPr lvl="0"/>
+            <a:r>
+              <a:rPr lang="en-US"/>
+              <a:t>Edit Master text styles</a:t>
+            </a:r>
+          </a:p>
+          <a:p>
+            <a:pPr lvl="1"/>
+            <a:r>
+              <a:rPr lang="en-US"/>
+              <a:t>Second level</a:t>
+            </a:r>
+          </a:p>
+          <a:p>
+            <a:pPr lvl="2"/>
+            <a:r>
+              <a:rPr lang="en-US"/>
+              <a:t>Third level</a:t>
+            </a:r>
+          </a:p>
+          <a:p>
+            <a:pPr lvl="3"/>
+            <a:r>
+              <a:rPr lang="en-US"/>
+              <a:t>Fourth level</a:t>
+            </a:r>
+          </a:p>
+          <a:p>
+            <a:pPr lvl="4"/>
+            <a:r>
+              <a:rPr lang="en-US"/>
+              <a:t>Fifth level</a:t>
+            </a:r>
+          </a:p>
+        </p:txBody>
+      </p:sp>
+      <p:sp>
+        <p:nvSpPr>
+          <p:cNvPr id="4" name="Content Placeholder 3"/>
+          <p:cNvSpPr>
+            <a:spLocks noGrp="1"/>
+          </p:cNvSpPr>
+          <p:nvPr>
+            <p:ph sz="half" idx="2"/>
+          </p:nvPr>
+        </p:nvSpPr>
+        <p:spPr>
+          <a:xfrm>
+            <a:off x="6172200" y="1825625"/>
+            <a:ext cx="5181600" cy="4351338"/>
+          </a:xfrm>
+        </p:spPr>
+        <p:txBody>
+          <a:bodyPr/>
+          <a:lstStyle/>
+          <a:p>
+            <a:pPr lvl="0"/>
+            <a:r>
+              <a:rPr lang="en-US"/>
+              <a:t>Edit Master text styles</a:t>
+            </a:r>
+          </a:p>
+          <a:p>
+            <a:pPr lvl="1"/>
+            <a:r>
+              <a:rPr lang="en-US"/>
+              <a:t>Second level</a:t>
+            </a:r>
+          </a:p>
+          <a:p>
+            <a:pPr lvl="2"/>
+            <a:r>
+              <a:rPr lang="en-US"/>
+              <a:t>Third level</a:t>
+            </a:r>
+          </a:p>
+          <a:p>
+            <a:pPr lvl="3"/>
+            <a:r>
+              <a:rPr lang="en-US"/>
+              <a:t>Fourth level</a:t>
+            </a:r>
+          </a:p>
+          <a:p>
+            <a:pPr lvl="4"/>
+            <a:r>
+              <a:rPr lang="en-US"/>
+              <a:t>Fifth level</a:t>
+            </a:r>
+          </a:p>
+        </p:txBody>
+      </p:sp>
+      <p:sp>
+        <p:nvSpPr>
+          <p:cNvPr id="5" name="Date Placeholder 4"/>
+          <p:cNvSpPr>
+            <a:spLocks noGrp="1"/>
+          </p:cNvSpPr>
+          <p:nvPr>
+            <p:ph type="dt" sz="half" idx="10"/>
+          </p:nvPr>
+        </p:nvSpPr>
+        <p:spPr/>
+        <p:txBody>
+          <a:bodyPr/>
+          <a:lstStyle/>
+          <a:p>
+            <a:fld id="{1C565815-05F0-455F-BBD6-9680ABD9D1CB}" type="datetimeFigureOut">
+              <a:rPr lang="en-US" smtClean="0"/>
+              <a:t>2/18/2021</a:t>
+            </a:fld>
+            <a:endParaRPr lang="en-US"/>
+          </a:p>
+        </p:txBody>
+      </p:sp>
+      <p:sp>
+        <p:nvSpPr>
+          <p:cNvPr id="6" name="Footer Placeholder 5"/>
+          <p:cNvSpPr>
+            <a:spLocks noGrp="1"/>
+          </p:cNvSpPr>
+          <p:nvPr>
+            <p:ph type="ftr" sz="quarter" idx="11"/>
+          </p:nvPr>
+        </p:nvSpPr>
+        <p:spPr/>
+        <p:txBody>
+          <a:bodyPr/>
+          <a:lstStyle/>
+          <a:p>
+            <a:endParaRPr lang="en-US"/>
+          </a:p>
+        </p:txBody>
+      </p:sp>
+      <p:sp>
+        <p:nvSpPr>
+          <p:cNvPr id="7" name="Slide Number Placeholder 6"/>
+          <p:cNvSpPr>
+            <a:spLocks noGrp="1"/>
+          </p:cNvSpPr>
+          <p:nvPr>
+            <p:ph type="sldNum" sz="quarter" idx="12"/>
+          </p:nvPr>
+        </p:nvSpPr>
+        <p:spPr/>
+        <p:txBody>
+          <a:bodyPr/>
+          <a:lstStyle/>
+          <a:p>
+            <a:fld id="{2DDE5766-DCCA-445A-AA53-048753A2C1C5}" type="slidenum">
+              <a:rPr lang="en-US" smtClean="0"/>
+              <a:t>‹#›</a:t>
+            </a:fld>
+            <a:endParaRPr lang="en-US"/>
+          </a:p>
+        </p:txBody>
+      </p:sp>
+    </p:spTree>
+    <p:extLst>
+      <p:ext uri="{BB962C8B-B14F-4D97-AF65-F5344CB8AC3E}">
+        <p14:creationId xmlns:p14="http://schemas.microsoft.com/office/powerpoint/2010/main" val="146366778"/>
+      </p:ext>
+    </p:extLst>
+  </p:cSld>
+  <p:clrMapOvr>
+    <a:masterClrMapping/>
+  </p:clrMapOvr>
+</p:sldLayout>
+</file>
+
+<file path=ppt/slideLayouts/slideLayout11.xml><?xml version="1.0" encoding="utf-8"?>
+<p:sldLayout xmlns:a="http://schemas.openxmlformats.org/drawingml/2006/main" xmlns:r="http://schemas.openxmlformats.org/officeDocument/2006/relationships" xmlns:p="http://schemas.openxmlformats.org/presentationml/2006/main" type="twoTxTwoObj" preserve="1">
+  <p:cSld name="Comparison">
+    <p:spTree>
+      <p:nvGrpSpPr>
+        <p:cNvPr id="1" name=""/>
+        <p:cNvGrpSpPr/>
+        <p:nvPr/>
+      </p:nvGrpSpPr>
+      <p:grpSpPr>
+        <a:xfrm>
+          <a:off x="0" y="0"/>
+          <a:ext cx="0" cy="0"/>
+          <a:chOff x="0" y="0"/>
+          <a:chExt cx="0" cy="0"/>
+        </a:xfrm>
+      </p:grpSpPr>
+      <p:sp>
+        <p:nvSpPr>
+          <p:cNvPr id="2" name="Title 1"/>
+          <p:cNvSpPr>
+            <a:spLocks noGrp="1"/>
+          </p:cNvSpPr>
+          <p:nvPr>
+            <p:ph type="title"/>
+          </p:nvPr>
+        </p:nvSpPr>
+        <p:spPr>
+          <a:xfrm>
+            <a:off x="839788" y="365125"/>
+            <a:ext cx="10515600" cy="1325563"/>
+          </a:xfrm>
+        </p:spPr>
+        <p:txBody>
+          <a:bodyPr/>
+          <a:lstStyle/>
+          <a:p>
+            <a:r>
+              <a:rPr lang="en-US"/>
+              <a:t>Click to edit Master title style</a:t>
+            </a:r>
+          </a:p>
+        </p:txBody>
+      </p:sp>
+      <p:sp>
+        <p:nvSpPr>
+          <p:cNvPr id="3" name="Text Placeholder 2"/>
+          <p:cNvSpPr>
+            <a:spLocks noGrp="1"/>
+          </p:cNvSpPr>
+          <p:nvPr>
+            <p:ph type="body" idx="1"/>
+          </p:nvPr>
+        </p:nvSpPr>
+        <p:spPr>
+          <a:xfrm>
+            <a:off x="839788" y="1681163"/>
+            <a:ext cx="5157787" cy="823912"/>
+          </a:xfrm>
+        </p:spPr>
+        <p:txBody>
+          <a:bodyPr anchor="b"/>
+          <a:lstStyle>
+            <a:lvl1pPr marL="0" indent="0">
+              <a:buNone/>
+              <a:defRPr sz="2400" b="1"/>
+            </a:lvl1pPr>
+            <a:lvl2pPr marL="457200" indent="0">
+              <a:buNone/>
+              <a:defRPr sz="2000" b="1"/>
+            </a:lvl2pPr>
+            <a:lvl3pPr marL="914400" indent="0">
+              <a:buNone/>
+              <a:defRPr sz="1800" b="1"/>
+            </a:lvl3pPr>
+            <a:lvl4pPr marL="1371600" indent="0">
+              <a:buNone/>
+              <a:defRPr sz="1600" b="1"/>
+            </a:lvl4pPr>
+            <a:lvl5pPr marL="1828800" indent="0">
+              <a:buNone/>
+              <a:defRPr sz="1600" b="1"/>
+            </a:lvl5pPr>
+            <a:lvl6pPr marL="2286000" indent="0">
+              <a:buNone/>
+              <a:defRPr sz="1600" b="1"/>
+            </a:lvl6pPr>
+            <a:lvl7pPr marL="2743200" indent="0">
+              <a:buNone/>
+              <a:defRPr sz="1600" b="1"/>
+            </a:lvl7pPr>
+            <a:lvl8pPr marL="3200400" indent="0">
+              <a:buNone/>
+              <a:defRPr sz="1600" b="1"/>
+            </a:lvl8pPr>
+            <a:lvl9pPr marL="3657600" indent="0">
+              <a:buNone/>
+              <a:defRPr sz="1600" b="1"/>
+            </a:lvl9pPr>
+          </a:lstStyle>
+          <a:p>
+            <a:pPr lvl="0"/>
+            <a:r>
+              <a:rPr lang="en-US"/>
+              <a:t>Edit Master text styles</a:t>
+            </a:r>
+          </a:p>
+        </p:txBody>
+      </p:sp>
+      <p:sp>
+        <p:nvSpPr>
+          <p:cNvPr id="4" name="Content Placeholder 3"/>
+          <p:cNvSpPr>
+            <a:spLocks noGrp="1"/>
+          </p:cNvSpPr>
+          <p:nvPr>
+            <p:ph sz="half" idx="2"/>
+          </p:nvPr>
+        </p:nvSpPr>
+        <p:spPr>
+          <a:xfrm>
+            <a:off x="839788" y="2505075"/>
+            <a:ext cx="5157787" cy="3684588"/>
+          </a:xfrm>
+        </p:spPr>
+        <p:txBody>
+          <a:bodyPr/>
+          <a:lstStyle/>
+          <a:p>
+            <a:pPr lvl="0"/>
+            <a:r>
+              <a:rPr lang="en-US"/>
+              <a:t>Edit Master text styles</a:t>
+            </a:r>
+          </a:p>
+          <a:p>
+            <a:pPr lvl="1"/>
+            <a:r>
+              <a:rPr lang="en-US"/>
+              <a:t>Second level</a:t>
+            </a:r>
+          </a:p>
+          <a:p>
+            <a:pPr lvl="2"/>
+            <a:r>
+              <a:rPr lang="en-US"/>
+              <a:t>Third level</a:t>
+            </a:r>
+          </a:p>
+          <a:p>
+            <a:pPr lvl="3"/>
+            <a:r>
+              <a:rPr lang="en-US"/>
+              <a:t>Fourth level</a:t>
+            </a:r>
+          </a:p>
+          <a:p>
+            <a:pPr lvl="4"/>
+            <a:r>
+              <a:rPr lang="en-US"/>
+              <a:t>Fifth level</a:t>
+            </a:r>
+          </a:p>
+        </p:txBody>
+      </p:sp>
+      <p:sp>
+        <p:nvSpPr>
+          <p:cNvPr id="5" name="Text Placeholder 4"/>
+          <p:cNvSpPr>
+            <a:spLocks noGrp="1"/>
+          </p:cNvSpPr>
+          <p:nvPr>
+            <p:ph type="body" sz="quarter" idx="3"/>
+          </p:nvPr>
+        </p:nvSpPr>
+        <p:spPr>
+          <a:xfrm>
+            <a:off x="6172200" y="1681163"/>
+            <a:ext cx="5183188" cy="823912"/>
+          </a:xfrm>
+        </p:spPr>
+        <p:txBody>
+          <a:bodyPr anchor="b"/>
+          <a:lstStyle>
+            <a:lvl1pPr marL="0" indent="0">
+              <a:buNone/>
+              <a:defRPr sz="2400" b="1"/>
+            </a:lvl1pPr>
+            <a:lvl2pPr marL="457200" indent="0">
+              <a:buNone/>
+              <a:defRPr sz="2000" b="1"/>
+            </a:lvl2pPr>
+            <a:lvl3pPr marL="914400" indent="0">
+              <a:buNone/>
+              <a:defRPr sz="1800" b="1"/>
+            </a:lvl3pPr>
+            <a:lvl4pPr marL="1371600" indent="0">
+              <a:buNone/>
+              <a:defRPr sz="1600" b="1"/>
+            </a:lvl4pPr>
+            <a:lvl5pPr marL="1828800" indent="0">
+              <a:buNone/>
+              <a:defRPr sz="1600" b="1"/>
+            </a:lvl5pPr>
+            <a:lvl6pPr marL="2286000" indent="0">
+              <a:buNone/>
+              <a:defRPr sz="1600" b="1"/>
+            </a:lvl6pPr>
+            <a:lvl7pPr marL="2743200" indent="0">
+              <a:buNone/>
+              <a:defRPr sz="1600" b="1"/>
+            </a:lvl7pPr>
+            <a:lvl8pPr marL="3200400" indent="0">
+              <a:buNone/>
+              <a:defRPr sz="1600" b="1"/>
+            </a:lvl8pPr>
+            <a:lvl9pPr marL="3657600" indent="0">
+              <a:buNone/>
+              <a:defRPr sz="1600" b="1"/>
+            </a:lvl9pPr>
+          </a:lstStyle>
+          <a:p>
+            <a:pPr lvl="0"/>
+            <a:r>
+              <a:rPr lang="en-US"/>
+              <a:t>Edit Master text styles</a:t>
+            </a:r>
+          </a:p>
+        </p:txBody>
+      </p:sp>
+      <p:sp>
+        <p:nvSpPr>
+          <p:cNvPr id="6" name="Content Placeholder 5"/>
+          <p:cNvSpPr>
+            <a:spLocks noGrp="1"/>
+          </p:cNvSpPr>
+          <p:nvPr>
+            <p:ph sz="quarter" idx="4"/>
+          </p:nvPr>
+        </p:nvSpPr>
+        <p:spPr>
+          <a:xfrm>
+            <a:off x="6172200" y="2505075"/>
+            <a:ext cx="5183188" cy="3684588"/>
+          </a:xfrm>
+        </p:spPr>
+        <p:txBody>
+          <a:bodyPr/>
+          <a:lstStyle/>
+          <a:p>
+            <a:pPr lvl="0"/>
+            <a:r>
+              <a:rPr lang="en-US"/>
+              <a:t>Edit Master text styles</a:t>
+            </a:r>
+          </a:p>
+          <a:p>
+            <a:pPr lvl="1"/>
+            <a:r>
+              <a:rPr lang="en-US"/>
+              <a:t>Second level</a:t>
+            </a:r>
+          </a:p>
+          <a:p>
+            <a:pPr lvl="2"/>
+            <a:r>
+              <a:rPr lang="en-US"/>
+              <a:t>Third level</a:t>
+            </a:r>
+          </a:p>
+          <a:p>
+            <a:pPr lvl="3"/>
+            <a:r>
+              <a:rPr lang="en-US"/>
+              <a:t>Fourth level</a:t>
+            </a:r>
+          </a:p>
+          <a:p>
+            <a:pPr lvl="4"/>
+            <a:r>
+              <a:rPr lang="en-US"/>
+              <a:t>Fifth level</a:t>
+            </a:r>
+          </a:p>
+        </p:txBody>
+      </p:sp>
+      <p:sp>
+        <p:nvSpPr>
+          <p:cNvPr id="7" name="Date Placeholder 6"/>
+          <p:cNvSpPr>
+            <a:spLocks noGrp="1"/>
+          </p:cNvSpPr>
+          <p:nvPr>
+            <p:ph type="dt" sz="half" idx="10"/>
+          </p:nvPr>
+        </p:nvSpPr>
+        <p:spPr/>
+        <p:txBody>
+          <a:bodyPr/>
+          <a:lstStyle/>
+          <a:p>
+            <a:fld id="{1C565815-05F0-455F-BBD6-9680ABD9D1CB}" type="datetimeFigureOut">
+              <a:rPr lang="en-US" smtClean="0"/>
+              <a:t>2/18/2021</a:t>
+            </a:fld>
+            <a:endParaRPr lang="en-US"/>
+          </a:p>
+        </p:txBody>
+      </p:sp>
+      <p:sp>
+        <p:nvSpPr>
+          <p:cNvPr id="8" name="Footer Placeholder 7"/>
+          <p:cNvSpPr>
+            <a:spLocks noGrp="1"/>
+          </p:cNvSpPr>
+          <p:nvPr>
+            <p:ph type="ftr" sz="quarter" idx="11"/>
+          </p:nvPr>
+        </p:nvSpPr>
+        <p:spPr/>
+        <p:txBody>
+          <a:bodyPr/>
+          <a:lstStyle/>
+          <a:p>
+            <a:endParaRPr lang="en-US"/>
+          </a:p>
+        </p:txBody>
+      </p:sp>
+      <p:sp>
+        <p:nvSpPr>
+          <p:cNvPr id="9" name="Slide Number Placeholder 8"/>
+          <p:cNvSpPr>
+            <a:spLocks noGrp="1"/>
+          </p:cNvSpPr>
+          <p:nvPr>
+            <p:ph type="sldNum" sz="quarter" idx="12"/>
+          </p:nvPr>
+        </p:nvSpPr>
+        <p:spPr/>
+        <p:txBody>
+          <a:bodyPr/>
+          <a:lstStyle/>
+          <a:p>
+            <a:fld id="{2DDE5766-DCCA-445A-AA53-048753A2C1C5}" type="slidenum">
+              <a:rPr lang="en-US" smtClean="0"/>
+              <a:t>‹#›</a:t>
+            </a:fld>
+            <a:endParaRPr lang="en-US"/>
+          </a:p>
+        </p:txBody>
+      </p:sp>
+    </p:spTree>
+    <p:extLst>
+      <p:ext uri="{BB962C8B-B14F-4D97-AF65-F5344CB8AC3E}">
+        <p14:creationId xmlns:p14="http://schemas.microsoft.com/office/powerpoint/2010/main" val="1602852895"/>
+      </p:ext>
+    </p:extLst>
+  </p:cSld>
+  <p:clrMapOvr>
+    <a:masterClrMapping/>
+  </p:clrMapOvr>
+</p:sldLayout>
+</file>
+
+<file path=ppt/slideLayouts/slideLayout12.xml><?xml version="1.0" encoding="utf-8"?>
+<p:sldLayout xmlns:a="http://schemas.openxmlformats.org/drawingml/2006/main" xmlns:r="http://schemas.openxmlformats.org/officeDocument/2006/relationships" xmlns:p="http://schemas.openxmlformats.org/presentationml/2006/main" type="titleOnly" preserve="1">
+  <p:cSld name="Title Only">
+    <p:spTree>
+      <p:nvGrpSpPr>
+        <p:cNvPr id="1" name=""/>
+        <p:cNvGrpSpPr/>
+        <p:nvPr/>
+      </p:nvGrpSpPr>
+      <p:grpSpPr>
+        <a:xfrm>
+          <a:off x="0" y="0"/>
+          <a:ext cx="0" cy="0"/>
+          <a:chOff x="0" y="0"/>
+          <a:chExt cx="0" cy="0"/>
+        </a:xfrm>
+      </p:grpSpPr>
+      <p:sp>
+        <p:nvSpPr>
+          <p:cNvPr id="2" name="Title 1"/>
+          <p:cNvSpPr>
+            <a:spLocks noGrp="1"/>
+          </p:cNvSpPr>
+          <p:nvPr>
+            <p:ph type="title"/>
+          </p:nvPr>
+        </p:nvSpPr>
+        <p:spPr/>
+        <p:txBody>
+          <a:bodyPr/>
+          <a:lstStyle/>
+          <a:p>
+            <a:r>
+              <a:rPr lang="en-US"/>
+              <a:t>Click to edit Master title style</a:t>
+            </a:r>
+          </a:p>
+        </p:txBody>
+      </p:sp>
+      <p:sp>
+        <p:nvSpPr>
+          <p:cNvPr id="3" name="Date Placeholder 2"/>
+          <p:cNvSpPr>
+            <a:spLocks noGrp="1"/>
+          </p:cNvSpPr>
+          <p:nvPr>
+            <p:ph type="dt" sz="half" idx="10"/>
+          </p:nvPr>
+        </p:nvSpPr>
+        <p:spPr/>
+        <p:txBody>
+          <a:bodyPr/>
+          <a:lstStyle/>
+          <a:p>
+            <a:fld id="{1C565815-05F0-455F-BBD6-9680ABD9D1CB}" type="datetimeFigureOut">
+              <a:rPr lang="en-US" smtClean="0"/>
+              <a:t>2/18/2021</a:t>
+            </a:fld>
+            <a:endParaRPr lang="en-US"/>
+          </a:p>
+        </p:txBody>
+      </p:sp>
+      <p:sp>
+        <p:nvSpPr>
+          <p:cNvPr id="4" name="Footer Placeholder 3"/>
+          <p:cNvSpPr>
+            <a:spLocks noGrp="1"/>
+          </p:cNvSpPr>
+          <p:nvPr>
+            <p:ph type="ftr" sz="quarter" idx="11"/>
+          </p:nvPr>
+        </p:nvSpPr>
+        <p:spPr/>
+        <p:txBody>
+          <a:bodyPr/>
+          <a:lstStyle/>
+          <a:p>
+            <a:endParaRPr lang="en-US"/>
+          </a:p>
+        </p:txBody>
+      </p:sp>
+      <p:sp>
+        <p:nvSpPr>
+          <p:cNvPr id="5" name="Slide Number Placeholder 4"/>
+          <p:cNvSpPr>
+            <a:spLocks noGrp="1"/>
+          </p:cNvSpPr>
+          <p:nvPr>
+            <p:ph type="sldNum" sz="quarter" idx="12"/>
+          </p:nvPr>
+        </p:nvSpPr>
+        <p:spPr/>
+        <p:txBody>
+          <a:bodyPr/>
+          <a:lstStyle/>
+          <a:p>
+            <a:fld id="{2DDE5766-DCCA-445A-AA53-048753A2C1C5}" type="slidenum">
+              <a:rPr lang="en-US" smtClean="0"/>
+              <a:t>‹#›</a:t>
+            </a:fld>
+            <a:endParaRPr lang="en-US"/>
+          </a:p>
+        </p:txBody>
+      </p:sp>
+    </p:spTree>
+    <p:extLst>
+      <p:ext uri="{BB962C8B-B14F-4D97-AF65-F5344CB8AC3E}">
+        <p14:creationId xmlns:p14="http://schemas.microsoft.com/office/powerpoint/2010/main" val="359499723"/>
+      </p:ext>
+    </p:extLst>
+  </p:cSld>
+  <p:clrMapOvr>
+    <a:masterClrMapping/>
+  </p:clrMapOvr>
+</p:sldLayout>
+</file>
+
+<file path=ppt/slideLayouts/slideLayout13.xml><?xml version="1.0" encoding="utf-8"?>
+<p:sldLayout xmlns:a="http://schemas.openxmlformats.org/drawingml/2006/main" xmlns:r="http://schemas.openxmlformats.org/officeDocument/2006/relationships" xmlns:p="http://schemas.openxmlformats.org/presentationml/2006/main" type="blank" preserve="1">
+  <p:cSld name="Blank">
+    <p:spTree>
+      <p:nvGrpSpPr>
+        <p:cNvPr id="1" name=""/>
+        <p:cNvGrpSpPr/>
+        <p:nvPr/>
+      </p:nvGrpSpPr>
+      <p:grpSpPr>
+        <a:xfrm>
+          <a:off x="0" y="0"/>
+          <a:ext cx="0" cy="0"/>
+          <a:chOff x="0" y="0"/>
+          <a:chExt cx="0" cy="0"/>
+        </a:xfrm>
+      </p:grpSpPr>
+      <p:sp>
+        <p:nvSpPr>
+          <p:cNvPr id="2" name="Date Placeholder 1"/>
+          <p:cNvSpPr>
+            <a:spLocks noGrp="1"/>
+          </p:cNvSpPr>
+          <p:nvPr>
+            <p:ph type="dt" sz="half" idx="10"/>
+          </p:nvPr>
+        </p:nvSpPr>
+        <p:spPr/>
+        <p:txBody>
+          <a:bodyPr/>
+          <a:lstStyle/>
+          <a:p>
+            <a:fld id="{1C565815-05F0-455F-BBD6-9680ABD9D1CB}" type="datetimeFigureOut">
+              <a:rPr lang="en-US" smtClean="0"/>
+              <a:t>2/18/2021</a:t>
+            </a:fld>
+            <a:endParaRPr lang="en-US"/>
+          </a:p>
+        </p:txBody>
+      </p:sp>
+      <p:sp>
+        <p:nvSpPr>
+          <p:cNvPr id="3" name="Footer Placeholder 2"/>
+          <p:cNvSpPr>
+            <a:spLocks noGrp="1"/>
+          </p:cNvSpPr>
+          <p:nvPr>
+            <p:ph type="ftr" sz="quarter" idx="11"/>
+          </p:nvPr>
+        </p:nvSpPr>
+        <p:spPr/>
+        <p:txBody>
+          <a:bodyPr/>
+          <a:lstStyle/>
+          <a:p>
+            <a:endParaRPr lang="en-US"/>
+          </a:p>
+        </p:txBody>
+      </p:sp>
+      <p:sp>
+        <p:nvSpPr>
+          <p:cNvPr id="4" name="Slide Number Placeholder 3"/>
+          <p:cNvSpPr>
+            <a:spLocks noGrp="1"/>
+          </p:cNvSpPr>
+          <p:nvPr>
+            <p:ph type="sldNum" sz="quarter" idx="12"/>
+          </p:nvPr>
+        </p:nvSpPr>
+        <p:spPr/>
+        <p:txBody>
+          <a:bodyPr/>
+          <a:lstStyle/>
+          <a:p>
+            <a:fld id="{2DDE5766-DCCA-445A-AA53-048753A2C1C5}" type="slidenum">
+              <a:rPr lang="en-US" smtClean="0"/>
+              <a:t>‹#›</a:t>
+            </a:fld>
+            <a:endParaRPr lang="en-US"/>
+          </a:p>
+        </p:txBody>
+      </p:sp>
+    </p:spTree>
+    <p:extLst>
+      <p:ext uri="{BB962C8B-B14F-4D97-AF65-F5344CB8AC3E}">
+        <p14:creationId xmlns:p14="http://schemas.microsoft.com/office/powerpoint/2010/main" val="1794608838"/>
+      </p:ext>
+    </p:extLst>
+  </p:cSld>
+  <p:clrMapOvr>
+    <a:masterClrMapping/>
+  </p:clrMapOvr>
+</p:sldLayout>
+</file>
+
+<file path=ppt/slideLayouts/slideLayout14.xml><?xml version="1.0" encoding="utf-8"?>
 <p:sldLayout xmlns:a="http://schemas.openxmlformats.org/drawingml/2006/main" xmlns:r="http://schemas.openxmlformats.org/officeDocument/2006/relationships" xmlns:p="http://schemas.openxmlformats.org/presentationml/2006/main" type="objTx" preserve="1">
   <p:cSld name="Content with Caption">
     <p:spTree>
@@ -1429,6 +2236,48 @@
       </p:sp>
       <p:sp>
         <p:nvSpPr>
+          <p:cNvPr id="5" name="Date Placeholder 4"/>
+          <p:cNvSpPr>
+            <a:spLocks noGrp="1"/>
+          </p:cNvSpPr>
+          <p:nvPr>
+            <p:ph type="dt" sz="half" idx="10"/>
+          </p:nvPr>
+        </p:nvSpPr>
+        <p:spPr/>
+        <p:txBody>
+          <a:bodyPr/>
+          <a:lstStyle/>
+          <a:p>
+            <a:fld id="{1C565815-05F0-455F-BBD6-9680ABD9D1CB}" type="datetimeFigureOut">
+              <a:rPr lang="en-US" smtClean="0"/>
+              <a:t>2/18/2021</a:t>
+            </a:fld>
+            <a:endParaRPr lang="en-US"/>
+          </a:p>
+        </p:txBody>
+      </p:sp>
+      <p:sp>
+        <p:nvSpPr>
+          <p:cNvPr id="6" name="Footer Placeholder 5"/>
+          <p:cNvSpPr>
+            <a:spLocks noGrp="1"/>
+          </p:cNvSpPr>
+          <p:nvPr>
+            <p:ph type="ftr" sz="quarter" idx="11"/>
+          </p:nvPr>
+        </p:nvSpPr>
+        <p:spPr/>
+        <p:txBody>
+          <a:bodyPr/>
+          <a:lstStyle/>
+          <a:p>
+            <a:endParaRPr lang="en-US"/>
+          </a:p>
+        </p:txBody>
+      </p:sp>
+      <p:sp>
+        <p:nvSpPr>
           <p:cNvPr id="7" name="Slide Number Placeholder 6"/>
           <p:cNvSpPr>
             <a:spLocks noGrp="1"/>
@@ -1442,7 +2291,7 @@
           <a:bodyPr/>
           <a:lstStyle/>
           <a:p>
-            <a:fld id="{CF5A1C33-475D-474A-A037-DDAF3DC7AF09}" type="slidenum">
+            <a:fld id="{2DDE5766-DCCA-445A-AA53-048753A2C1C5}" type="slidenum">
               <a:rPr lang="en-US" smtClean="0"/>
               <a:t>‹#›</a:t>
             </a:fld>
@@ -1453,7 +2302,7 @@
     </p:spTree>
     <p:extLst>
       <p:ext uri="{BB962C8B-B14F-4D97-AF65-F5344CB8AC3E}">
-        <p14:creationId xmlns:p14="http://schemas.microsoft.com/office/powerpoint/2010/main" val="1226023708"/>
+        <p14:creationId xmlns:p14="http://schemas.microsoft.com/office/powerpoint/2010/main" val="2724079003"/>
       </p:ext>
     </p:extLst>
   </p:cSld>
@@ -1463,7 +2312,7 @@
 </p:sldLayout>
 </file>
 
-<file path=ppt/slideLayouts/slideLayout3.xml><?xml version="1.0" encoding="utf-8"?>
+<file path=ppt/slideLayouts/slideLayout15.xml><?xml version="1.0" encoding="utf-8"?>
 <p:sldLayout xmlns:a="http://schemas.openxmlformats.org/drawingml/2006/main" xmlns:r="http://schemas.openxmlformats.org/officeDocument/2006/relationships" xmlns:p="http://schemas.openxmlformats.org/presentationml/2006/main" type="picTx" preserve="1">
   <p:cSld name="Picture with Caption">
     <p:spTree>
@@ -1639,6 +2488,837 @@
       </p:sp>
       <p:sp>
         <p:nvSpPr>
+          <p:cNvPr id="5" name="Date Placeholder 4"/>
+          <p:cNvSpPr>
+            <a:spLocks noGrp="1"/>
+          </p:cNvSpPr>
+          <p:nvPr>
+            <p:ph type="dt" sz="half" idx="10"/>
+          </p:nvPr>
+        </p:nvSpPr>
+        <p:spPr/>
+        <p:txBody>
+          <a:bodyPr/>
+          <a:lstStyle/>
+          <a:p>
+            <a:fld id="{1C565815-05F0-455F-BBD6-9680ABD9D1CB}" type="datetimeFigureOut">
+              <a:rPr lang="en-US" smtClean="0"/>
+              <a:t>2/18/2021</a:t>
+            </a:fld>
+            <a:endParaRPr lang="en-US"/>
+          </a:p>
+        </p:txBody>
+      </p:sp>
+      <p:sp>
+        <p:nvSpPr>
+          <p:cNvPr id="6" name="Footer Placeholder 5"/>
+          <p:cNvSpPr>
+            <a:spLocks noGrp="1"/>
+          </p:cNvSpPr>
+          <p:nvPr>
+            <p:ph type="ftr" sz="quarter" idx="11"/>
+          </p:nvPr>
+        </p:nvSpPr>
+        <p:spPr/>
+        <p:txBody>
+          <a:bodyPr/>
+          <a:lstStyle/>
+          <a:p>
+            <a:endParaRPr lang="en-US"/>
+          </a:p>
+        </p:txBody>
+      </p:sp>
+      <p:sp>
+        <p:nvSpPr>
+          <p:cNvPr id="7" name="Slide Number Placeholder 6"/>
+          <p:cNvSpPr>
+            <a:spLocks noGrp="1"/>
+          </p:cNvSpPr>
+          <p:nvPr>
+            <p:ph type="sldNum" sz="quarter" idx="12"/>
+          </p:nvPr>
+        </p:nvSpPr>
+        <p:spPr/>
+        <p:txBody>
+          <a:bodyPr/>
+          <a:lstStyle/>
+          <a:p>
+            <a:fld id="{2DDE5766-DCCA-445A-AA53-048753A2C1C5}" type="slidenum">
+              <a:rPr lang="en-US" smtClean="0"/>
+              <a:t>‹#›</a:t>
+            </a:fld>
+            <a:endParaRPr lang="en-US"/>
+          </a:p>
+        </p:txBody>
+      </p:sp>
+    </p:spTree>
+    <p:extLst>
+      <p:ext uri="{BB962C8B-B14F-4D97-AF65-F5344CB8AC3E}">
+        <p14:creationId xmlns:p14="http://schemas.microsoft.com/office/powerpoint/2010/main" val="922988583"/>
+      </p:ext>
+    </p:extLst>
+  </p:cSld>
+  <p:clrMapOvr>
+    <a:masterClrMapping/>
+  </p:clrMapOvr>
+</p:sldLayout>
+</file>
+
+<file path=ppt/slideLayouts/slideLayout16.xml><?xml version="1.0" encoding="utf-8"?>
+<p:sldLayout xmlns:a="http://schemas.openxmlformats.org/drawingml/2006/main" xmlns:r="http://schemas.openxmlformats.org/officeDocument/2006/relationships" xmlns:p="http://schemas.openxmlformats.org/presentationml/2006/main" type="vertTx" preserve="1">
+  <p:cSld name="Title and Vertical Text">
+    <p:spTree>
+      <p:nvGrpSpPr>
+        <p:cNvPr id="1" name=""/>
+        <p:cNvGrpSpPr/>
+        <p:nvPr/>
+      </p:nvGrpSpPr>
+      <p:grpSpPr>
+        <a:xfrm>
+          <a:off x="0" y="0"/>
+          <a:ext cx="0" cy="0"/>
+          <a:chOff x="0" y="0"/>
+          <a:chExt cx="0" cy="0"/>
+        </a:xfrm>
+      </p:grpSpPr>
+      <p:sp>
+        <p:nvSpPr>
+          <p:cNvPr id="2" name="Title 1"/>
+          <p:cNvSpPr>
+            <a:spLocks noGrp="1"/>
+          </p:cNvSpPr>
+          <p:nvPr>
+            <p:ph type="title"/>
+          </p:nvPr>
+        </p:nvSpPr>
+        <p:spPr/>
+        <p:txBody>
+          <a:bodyPr/>
+          <a:lstStyle/>
+          <a:p>
+            <a:r>
+              <a:rPr lang="en-US"/>
+              <a:t>Click to edit Master title style</a:t>
+            </a:r>
+          </a:p>
+        </p:txBody>
+      </p:sp>
+      <p:sp>
+        <p:nvSpPr>
+          <p:cNvPr id="3" name="Vertical Text Placeholder 2"/>
+          <p:cNvSpPr>
+            <a:spLocks noGrp="1"/>
+          </p:cNvSpPr>
+          <p:nvPr>
+            <p:ph type="body" orient="vert" idx="1"/>
+          </p:nvPr>
+        </p:nvSpPr>
+        <p:spPr/>
+        <p:txBody>
+          <a:bodyPr vert="eaVert"/>
+          <a:lstStyle/>
+          <a:p>
+            <a:pPr lvl="0"/>
+            <a:r>
+              <a:rPr lang="en-US"/>
+              <a:t>Edit Master text styles</a:t>
+            </a:r>
+          </a:p>
+          <a:p>
+            <a:pPr lvl="1"/>
+            <a:r>
+              <a:rPr lang="en-US"/>
+              <a:t>Second level</a:t>
+            </a:r>
+          </a:p>
+          <a:p>
+            <a:pPr lvl="2"/>
+            <a:r>
+              <a:rPr lang="en-US"/>
+              <a:t>Third level</a:t>
+            </a:r>
+          </a:p>
+          <a:p>
+            <a:pPr lvl="3"/>
+            <a:r>
+              <a:rPr lang="en-US"/>
+              <a:t>Fourth level</a:t>
+            </a:r>
+          </a:p>
+          <a:p>
+            <a:pPr lvl="4"/>
+            <a:r>
+              <a:rPr lang="en-US"/>
+              <a:t>Fifth level</a:t>
+            </a:r>
+          </a:p>
+        </p:txBody>
+      </p:sp>
+      <p:sp>
+        <p:nvSpPr>
+          <p:cNvPr id="4" name="Date Placeholder 3"/>
+          <p:cNvSpPr>
+            <a:spLocks noGrp="1"/>
+          </p:cNvSpPr>
+          <p:nvPr>
+            <p:ph type="dt" sz="half" idx="10"/>
+          </p:nvPr>
+        </p:nvSpPr>
+        <p:spPr/>
+        <p:txBody>
+          <a:bodyPr/>
+          <a:lstStyle/>
+          <a:p>
+            <a:fld id="{1C565815-05F0-455F-BBD6-9680ABD9D1CB}" type="datetimeFigureOut">
+              <a:rPr lang="en-US" smtClean="0"/>
+              <a:t>2/18/2021</a:t>
+            </a:fld>
+            <a:endParaRPr lang="en-US"/>
+          </a:p>
+        </p:txBody>
+      </p:sp>
+      <p:sp>
+        <p:nvSpPr>
+          <p:cNvPr id="5" name="Footer Placeholder 4"/>
+          <p:cNvSpPr>
+            <a:spLocks noGrp="1"/>
+          </p:cNvSpPr>
+          <p:nvPr>
+            <p:ph type="ftr" sz="quarter" idx="11"/>
+          </p:nvPr>
+        </p:nvSpPr>
+        <p:spPr/>
+        <p:txBody>
+          <a:bodyPr/>
+          <a:lstStyle/>
+          <a:p>
+            <a:endParaRPr lang="en-US"/>
+          </a:p>
+        </p:txBody>
+      </p:sp>
+      <p:sp>
+        <p:nvSpPr>
+          <p:cNvPr id="6" name="Slide Number Placeholder 5"/>
+          <p:cNvSpPr>
+            <a:spLocks noGrp="1"/>
+          </p:cNvSpPr>
+          <p:nvPr>
+            <p:ph type="sldNum" sz="quarter" idx="12"/>
+          </p:nvPr>
+        </p:nvSpPr>
+        <p:spPr/>
+        <p:txBody>
+          <a:bodyPr/>
+          <a:lstStyle/>
+          <a:p>
+            <a:fld id="{2DDE5766-DCCA-445A-AA53-048753A2C1C5}" type="slidenum">
+              <a:rPr lang="en-US" smtClean="0"/>
+              <a:t>‹#›</a:t>
+            </a:fld>
+            <a:endParaRPr lang="en-US"/>
+          </a:p>
+        </p:txBody>
+      </p:sp>
+    </p:spTree>
+    <p:extLst>
+      <p:ext uri="{BB962C8B-B14F-4D97-AF65-F5344CB8AC3E}">
+        <p14:creationId xmlns:p14="http://schemas.microsoft.com/office/powerpoint/2010/main" val="927821711"/>
+      </p:ext>
+    </p:extLst>
+  </p:cSld>
+  <p:clrMapOvr>
+    <a:masterClrMapping/>
+  </p:clrMapOvr>
+</p:sldLayout>
+</file>
+
+<file path=ppt/slideLayouts/slideLayout17.xml><?xml version="1.0" encoding="utf-8"?>
+<p:sldLayout xmlns:a="http://schemas.openxmlformats.org/drawingml/2006/main" xmlns:r="http://schemas.openxmlformats.org/officeDocument/2006/relationships" xmlns:p="http://schemas.openxmlformats.org/presentationml/2006/main" type="vertTitleAndTx" preserve="1">
+  <p:cSld name="Vertical Title and Text">
+    <p:spTree>
+      <p:nvGrpSpPr>
+        <p:cNvPr id="1" name=""/>
+        <p:cNvGrpSpPr/>
+        <p:nvPr/>
+      </p:nvGrpSpPr>
+      <p:grpSpPr>
+        <a:xfrm>
+          <a:off x="0" y="0"/>
+          <a:ext cx="0" cy="0"/>
+          <a:chOff x="0" y="0"/>
+          <a:chExt cx="0" cy="0"/>
+        </a:xfrm>
+      </p:grpSpPr>
+      <p:sp>
+        <p:nvSpPr>
+          <p:cNvPr id="2" name="Vertical Title 1"/>
+          <p:cNvSpPr>
+            <a:spLocks noGrp="1"/>
+          </p:cNvSpPr>
+          <p:nvPr>
+            <p:ph type="title" orient="vert"/>
+          </p:nvPr>
+        </p:nvSpPr>
+        <p:spPr>
+          <a:xfrm>
+            <a:off x="8724900" y="365125"/>
+            <a:ext cx="2628900" cy="5811838"/>
+          </a:xfrm>
+        </p:spPr>
+        <p:txBody>
+          <a:bodyPr vert="eaVert"/>
+          <a:lstStyle/>
+          <a:p>
+            <a:r>
+              <a:rPr lang="en-US"/>
+              <a:t>Click to edit Master title style</a:t>
+            </a:r>
+          </a:p>
+        </p:txBody>
+      </p:sp>
+      <p:sp>
+        <p:nvSpPr>
+          <p:cNvPr id="3" name="Vertical Text Placeholder 2"/>
+          <p:cNvSpPr>
+            <a:spLocks noGrp="1"/>
+          </p:cNvSpPr>
+          <p:nvPr>
+            <p:ph type="body" orient="vert" idx="1"/>
+          </p:nvPr>
+        </p:nvSpPr>
+        <p:spPr>
+          <a:xfrm>
+            <a:off x="838200" y="365125"/>
+            <a:ext cx="7734300" cy="5811838"/>
+          </a:xfrm>
+        </p:spPr>
+        <p:txBody>
+          <a:bodyPr vert="eaVert"/>
+          <a:lstStyle/>
+          <a:p>
+            <a:pPr lvl="0"/>
+            <a:r>
+              <a:rPr lang="en-US"/>
+              <a:t>Edit Master text styles</a:t>
+            </a:r>
+          </a:p>
+          <a:p>
+            <a:pPr lvl="1"/>
+            <a:r>
+              <a:rPr lang="en-US"/>
+              <a:t>Second level</a:t>
+            </a:r>
+          </a:p>
+          <a:p>
+            <a:pPr lvl="2"/>
+            <a:r>
+              <a:rPr lang="en-US"/>
+              <a:t>Third level</a:t>
+            </a:r>
+          </a:p>
+          <a:p>
+            <a:pPr lvl="3"/>
+            <a:r>
+              <a:rPr lang="en-US"/>
+              <a:t>Fourth level</a:t>
+            </a:r>
+          </a:p>
+          <a:p>
+            <a:pPr lvl="4"/>
+            <a:r>
+              <a:rPr lang="en-US"/>
+              <a:t>Fifth level</a:t>
+            </a:r>
+          </a:p>
+        </p:txBody>
+      </p:sp>
+      <p:sp>
+        <p:nvSpPr>
+          <p:cNvPr id="4" name="Date Placeholder 3"/>
+          <p:cNvSpPr>
+            <a:spLocks noGrp="1"/>
+          </p:cNvSpPr>
+          <p:nvPr>
+            <p:ph type="dt" sz="half" idx="10"/>
+          </p:nvPr>
+        </p:nvSpPr>
+        <p:spPr/>
+        <p:txBody>
+          <a:bodyPr/>
+          <a:lstStyle/>
+          <a:p>
+            <a:fld id="{1C565815-05F0-455F-BBD6-9680ABD9D1CB}" type="datetimeFigureOut">
+              <a:rPr lang="en-US" smtClean="0"/>
+              <a:t>2/18/2021</a:t>
+            </a:fld>
+            <a:endParaRPr lang="en-US"/>
+          </a:p>
+        </p:txBody>
+      </p:sp>
+      <p:sp>
+        <p:nvSpPr>
+          <p:cNvPr id="5" name="Footer Placeholder 4"/>
+          <p:cNvSpPr>
+            <a:spLocks noGrp="1"/>
+          </p:cNvSpPr>
+          <p:nvPr>
+            <p:ph type="ftr" sz="quarter" idx="11"/>
+          </p:nvPr>
+        </p:nvSpPr>
+        <p:spPr/>
+        <p:txBody>
+          <a:bodyPr/>
+          <a:lstStyle/>
+          <a:p>
+            <a:endParaRPr lang="en-US"/>
+          </a:p>
+        </p:txBody>
+      </p:sp>
+      <p:sp>
+        <p:nvSpPr>
+          <p:cNvPr id="6" name="Slide Number Placeholder 5"/>
+          <p:cNvSpPr>
+            <a:spLocks noGrp="1"/>
+          </p:cNvSpPr>
+          <p:nvPr>
+            <p:ph type="sldNum" sz="quarter" idx="12"/>
+          </p:nvPr>
+        </p:nvSpPr>
+        <p:spPr/>
+        <p:txBody>
+          <a:bodyPr/>
+          <a:lstStyle/>
+          <a:p>
+            <a:fld id="{2DDE5766-DCCA-445A-AA53-048753A2C1C5}" type="slidenum">
+              <a:rPr lang="en-US" smtClean="0"/>
+              <a:t>‹#›</a:t>
+            </a:fld>
+            <a:endParaRPr lang="en-US"/>
+          </a:p>
+        </p:txBody>
+      </p:sp>
+    </p:spTree>
+    <p:extLst>
+      <p:ext uri="{BB962C8B-B14F-4D97-AF65-F5344CB8AC3E}">
+        <p14:creationId xmlns:p14="http://schemas.microsoft.com/office/powerpoint/2010/main" val="617890220"/>
+      </p:ext>
+    </p:extLst>
+  </p:cSld>
+  <p:clrMapOvr>
+    <a:masterClrMapping/>
+  </p:clrMapOvr>
+</p:sldLayout>
+</file>
+
+<file path=ppt/slideLayouts/slideLayout2.xml><?xml version="1.0" encoding="utf-8"?>
+<p:sldLayout xmlns:a="http://schemas.openxmlformats.org/drawingml/2006/main" xmlns:r="http://schemas.openxmlformats.org/officeDocument/2006/relationships" xmlns:p="http://schemas.openxmlformats.org/presentationml/2006/main" type="objTx" preserve="1">
+  <p:cSld name="Content with Caption">
+    <p:spTree>
+      <p:nvGrpSpPr>
+        <p:cNvPr id="1" name=""/>
+        <p:cNvGrpSpPr/>
+        <p:nvPr/>
+      </p:nvGrpSpPr>
+      <p:grpSpPr>
+        <a:xfrm>
+          <a:off x="0" y="0"/>
+          <a:ext cx="0" cy="0"/>
+          <a:chOff x="0" y="0"/>
+          <a:chExt cx="0" cy="0"/>
+        </a:xfrm>
+      </p:grpSpPr>
+      <p:sp>
+        <p:nvSpPr>
+          <p:cNvPr id="2" name="Title 1"/>
+          <p:cNvSpPr>
+            <a:spLocks noGrp="1"/>
+          </p:cNvSpPr>
+          <p:nvPr>
+            <p:ph type="title"/>
+          </p:nvPr>
+        </p:nvSpPr>
+        <p:spPr>
+          <a:xfrm>
+            <a:off x="839788" y="457200"/>
+            <a:ext cx="3932237" cy="1600200"/>
+          </a:xfrm>
+        </p:spPr>
+        <p:txBody>
+          <a:bodyPr anchor="b"/>
+          <a:lstStyle>
+            <a:lvl1pPr>
+              <a:defRPr sz="3200"/>
+            </a:lvl1pPr>
+          </a:lstStyle>
+          <a:p>
+            <a:r>
+              <a:rPr lang="en-US"/>
+              <a:t>Click to edit Master title style</a:t>
+            </a:r>
+          </a:p>
+        </p:txBody>
+      </p:sp>
+      <p:sp>
+        <p:nvSpPr>
+          <p:cNvPr id="3" name="Content Placeholder 2"/>
+          <p:cNvSpPr>
+            <a:spLocks noGrp="1"/>
+          </p:cNvSpPr>
+          <p:nvPr>
+            <p:ph idx="1"/>
+          </p:nvPr>
+        </p:nvSpPr>
+        <p:spPr>
+          <a:xfrm>
+            <a:off x="5183188" y="987425"/>
+            <a:ext cx="6172200" cy="4873625"/>
+          </a:xfrm>
+        </p:spPr>
+        <p:txBody>
+          <a:bodyPr/>
+          <a:lstStyle>
+            <a:lvl1pPr>
+              <a:defRPr sz="3200"/>
+            </a:lvl1pPr>
+            <a:lvl2pPr>
+              <a:defRPr sz="2800"/>
+            </a:lvl2pPr>
+            <a:lvl3pPr>
+              <a:defRPr sz="2400"/>
+            </a:lvl3pPr>
+            <a:lvl4pPr>
+              <a:defRPr sz="2000"/>
+            </a:lvl4pPr>
+            <a:lvl5pPr>
+              <a:defRPr sz="2000"/>
+            </a:lvl5pPr>
+            <a:lvl6pPr>
+              <a:defRPr sz="2000"/>
+            </a:lvl6pPr>
+            <a:lvl7pPr>
+              <a:defRPr sz="2000"/>
+            </a:lvl7pPr>
+            <a:lvl8pPr>
+              <a:defRPr sz="2000"/>
+            </a:lvl8pPr>
+            <a:lvl9pPr>
+              <a:defRPr sz="2000"/>
+            </a:lvl9pPr>
+          </a:lstStyle>
+          <a:p>
+            <a:pPr lvl="0"/>
+            <a:r>
+              <a:rPr lang="en-US"/>
+              <a:t>Edit Master text styles</a:t>
+            </a:r>
+          </a:p>
+          <a:p>
+            <a:pPr lvl="1"/>
+            <a:r>
+              <a:rPr lang="en-US"/>
+              <a:t>Second level</a:t>
+            </a:r>
+          </a:p>
+          <a:p>
+            <a:pPr lvl="2"/>
+            <a:r>
+              <a:rPr lang="en-US"/>
+              <a:t>Third level</a:t>
+            </a:r>
+          </a:p>
+          <a:p>
+            <a:pPr lvl="3"/>
+            <a:r>
+              <a:rPr lang="en-US"/>
+              <a:t>Fourth level</a:t>
+            </a:r>
+          </a:p>
+          <a:p>
+            <a:pPr lvl="4"/>
+            <a:r>
+              <a:rPr lang="en-US"/>
+              <a:t>Fifth level</a:t>
+            </a:r>
+          </a:p>
+        </p:txBody>
+      </p:sp>
+      <p:sp>
+        <p:nvSpPr>
+          <p:cNvPr id="4" name="Text Placeholder 3"/>
+          <p:cNvSpPr>
+            <a:spLocks noGrp="1"/>
+          </p:cNvSpPr>
+          <p:nvPr>
+            <p:ph type="body" sz="half" idx="2"/>
+          </p:nvPr>
+        </p:nvSpPr>
+        <p:spPr>
+          <a:xfrm>
+            <a:off x="839788" y="2057400"/>
+            <a:ext cx="3932237" cy="3811588"/>
+          </a:xfrm>
+        </p:spPr>
+        <p:txBody>
+          <a:bodyPr/>
+          <a:lstStyle>
+            <a:lvl1pPr marL="0" indent="0">
+              <a:buNone/>
+              <a:defRPr sz="1600"/>
+            </a:lvl1pPr>
+            <a:lvl2pPr marL="457200" indent="0">
+              <a:buNone/>
+              <a:defRPr sz="1400"/>
+            </a:lvl2pPr>
+            <a:lvl3pPr marL="914400" indent="0">
+              <a:buNone/>
+              <a:defRPr sz="1200"/>
+            </a:lvl3pPr>
+            <a:lvl4pPr marL="1371600" indent="0">
+              <a:buNone/>
+              <a:defRPr sz="1000"/>
+            </a:lvl4pPr>
+            <a:lvl5pPr marL="1828800" indent="0">
+              <a:buNone/>
+              <a:defRPr sz="1000"/>
+            </a:lvl5pPr>
+            <a:lvl6pPr marL="2286000" indent="0">
+              <a:buNone/>
+              <a:defRPr sz="1000"/>
+            </a:lvl6pPr>
+            <a:lvl7pPr marL="2743200" indent="0">
+              <a:buNone/>
+              <a:defRPr sz="1000"/>
+            </a:lvl7pPr>
+            <a:lvl8pPr marL="3200400" indent="0">
+              <a:buNone/>
+              <a:defRPr sz="1000"/>
+            </a:lvl8pPr>
+            <a:lvl9pPr marL="3657600" indent="0">
+              <a:buNone/>
+              <a:defRPr sz="1000"/>
+            </a:lvl9pPr>
+          </a:lstStyle>
+          <a:p>
+            <a:pPr lvl="0"/>
+            <a:r>
+              <a:rPr lang="en-US"/>
+              <a:t>Edit Master text styles</a:t>
+            </a:r>
+          </a:p>
+        </p:txBody>
+      </p:sp>
+      <p:sp>
+        <p:nvSpPr>
+          <p:cNvPr id="7" name="Slide Number Placeholder 6"/>
+          <p:cNvSpPr>
+            <a:spLocks noGrp="1"/>
+          </p:cNvSpPr>
+          <p:nvPr>
+            <p:ph type="sldNum" sz="quarter" idx="12"/>
+          </p:nvPr>
+        </p:nvSpPr>
+        <p:spPr/>
+        <p:txBody>
+          <a:bodyPr/>
+          <a:lstStyle/>
+          <a:p>
+            <a:fld id="{CF5A1C33-475D-474A-A037-DDAF3DC7AF09}" type="slidenum">
+              <a:rPr lang="en-US" smtClean="0"/>
+              <a:t>‹#›</a:t>
+            </a:fld>
+            <a:endParaRPr lang="en-US"/>
+          </a:p>
+        </p:txBody>
+      </p:sp>
+    </p:spTree>
+    <p:extLst>
+      <p:ext uri="{BB962C8B-B14F-4D97-AF65-F5344CB8AC3E}">
+        <p14:creationId xmlns:p14="http://schemas.microsoft.com/office/powerpoint/2010/main" val="1226023708"/>
+      </p:ext>
+    </p:extLst>
+  </p:cSld>
+  <p:clrMapOvr>
+    <a:masterClrMapping/>
+  </p:clrMapOvr>
+</p:sldLayout>
+</file>
+
+<file path=ppt/slideLayouts/slideLayout3.xml><?xml version="1.0" encoding="utf-8"?>
+<p:sldLayout xmlns:a="http://schemas.openxmlformats.org/drawingml/2006/main" xmlns:r="http://schemas.openxmlformats.org/officeDocument/2006/relationships" xmlns:p="http://schemas.openxmlformats.org/presentationml/2006/main" type="picTx" preserve="1">
+  <p:cSld name="Picture with Caption">
+    <p:spTree>
+      <p:nvGrpSpPr>
+        <p:cNvPr id="1" name=""/>
+        <p:cNvGrpSpPr/>
+        <p:nvPr/>
+      </p:nvGrpSpPr>
+      <p:grpSpPr>
+        <a:xfrm>
+          <a:off x="0" y="0"/>
+          <a:ext cx="0" cy="0"/>
+          <a:chOff x="0" y="0"/>
+          <a:chExt cx="0" cy="0"/>
+        </a:xfrm>
+      </p:grpSpPr>
+      <p:sp>
+        <p:nvSpPr>
+          <p:cNvPr id="2" name="Title 1"/>
+          <p:cNvSpPr>
+            <a:spLocks noGrp="1"/>
+          </p:cNvSpPr>
+          <p:nvPr>
+            <p:ph type="title"/>
+          </p:nvPr>
+        </p:nvSpPr>
+        <p:spPr>
+          <a:xfrm>
+            <a:off x="839788" y="457200"/>
+            <a:ext cx="3932237" cy="1600200"/>
+          </a:xfrm>
+        </p:spPr>
+        <p:txBody>
+          <a:bodyPr anchor="b"/>
+          <a:lstStyle>
+            <a:lvl1pPr>
+              <a:defRPr sz="3200"/>
+            </a:lvl1pPr>
+          </a:lstStyle>
+          <a:p>
+            <a:r>
+              <a:rPr lang="en-US"/>
+              <a:t>Click to edit Master title style</a:t>
+            </a:r>
+          </a:p>
+        </p:txBody>
+      </p:sp>
+      <p:sp>
+        <p:nvSpPr>
+          <p:cNvPr id="3" name="Picture Placeholder 2"/>
+          <p:cNvSpPr>
+            <a:spLocks noGrp="1"/>
+          </p:cNvSpPr>
+          <p:nvPr>
+            <p:ph type="pic" idx="1"/>
+          </p:nvPr>
+        </p:nvSpPr>
+        <p:spPr>
+          <a:xfrm>
+            <a:off x="5183188" y="987425"/>
+            <a:ext cx="6172200" cy="4873625"/>
+          </a:xfrm>
+        </p:spPr>
+        <p:txBody>
+          <a:bodyPr/>
+          <a:lstStyle>
+            <a:lvl1pPr marL="0" indent="0">
+              <a:buNone/>
+              <a:defRPr sz="3200"/>
+            </a:lvl1pPr>
+            <a:lvl2pPr marL="457200" indent="0">
+              <a:buNone/>
+              <a:defRPr sz="2800"/>
+            </a:lvl2pPr>
+            <a:lvl3pPr marL="914400" indent="0">
+              <a:buNone/>
+              <a:defRPr sz="2400"/>
+            </a:lvl3pPr>
+            <a:lvl4pPr marL="1371600" indent="0">
+              <a:buNone/>
+              <a:defRPr sz="2000"/>
+            </a:lvl4pPr>
+            <a:lvl5pPr marL="1828800" indent="0">
+              <a:buNone/>
+              <a:defRPr sz="2000"/>
+            </a:lvl5pPr>
+            <a:lvl6pPr marL="2286000" indent="0">
+              <a:buNone/>
+              <a:defRPr sz="2000"/>
+            </a:lvl6pPr>
+            <a:lvl7pPr marL="2743200" indent="0">
+              <a:buNone/>
+              <a:defRPr sz="2000"/>
+            </a:lvl7pPr>
+            <a:lvl8pPr marL="3200400" indent="0">
+              <a:buNone/>
+              <a:defRPr sz="2000"/>
+            </a:lvl8pPr>
+            <a:lvl9pPr marL="3657600" indent="0">
+              <a:buNone/>
+              <a:defRPr sz="2000"/>
+            </a:lvl9pPr>
+          </a:lstStyle>
+          <a:p>
+            <a:endParaRPr lang="en-US"/>
+          </a:p>
+        </p:txBody>
+      </p:sp>
+      <p:sp>
+        <p:nvSpPr>
+          <p:cNvPr id="4" name="Text Placeholder 3"/>
+          <p:cNvSpPr>
+            <a:spLocks noGrp="1"/>
+          </p:cNvSpPr>
+          <p:nvPr>
+            <p:ph type="body" sz="half" idx="2"/>
+          </p:nvPr>
+        </p:nvSpPr>
+        <p:spPr>
+          <a:xfrm>
+            <a:off x="839788" y="2057400"/>
+            <a:ext cx="3932237" cy="3811588"/>
+          </a:xfrm>
+        </p:spPr>
+        <p:txBody>
+          <a:bodyPr/>
+          <a:lstStyle>
+            <a:lvl1pPr marL="0" indent="0">
+              <a:buNone/>
+              <a:defRPr sz="1600"/>
+            </a:lvl1pPr>
+            <a:lvl2pPr marL="457200" indent="0">
+              <a:buNone/>
+              <a:defRPr sz="1400"/>
+            </a:lvl2pPr>
+            <a:lvl3pPr marL="914400" indent="0">
+              <a:buNone/>
+              <a:defRPr sz="1200"/>
+            </a:lvl3pPr>
+            <a:lvl4pPr marL="1371600" indent="0">
+              <a:buNone/>
+              <a:defRPr sz="1000"/>
+            </a:lvl4pPr>
+            <a:lvl5pPr marL="1828800" indent="0">
+              <a:buNone/>
+              <a:defRPr sz="1000"/>
+            </a:lvl5pPr>
+            <a:lvl6pPr marL="2286000" indent="0">
+              <a:buNone/>
+              <a:defRPr sz="1000"/>
+            </a:lvl6pPr>
+            <a:lvl7pPr marL="2743200" indent="0">
+              <a:buNone/>
+              <a:defRPr sz="1000"/>
+            </a:lvl7pPr>
+            <a:lvl8pPr marL="3200400" indent="0">
+              <a:buNone/>
+              <a:defRPr sz="1000"/>
+            </a:lvl8pPr>
+            <a:lvl9pPr marL="3657600" indent="0">
+              <a:buNone/>
+              <a:defRPr sz="1000"/>
+            </a:lvl9pPr>
+          </a:lstStyle>
+          <a:p>
+            <a:pPr lvl="0"/>
+            <a:r>
+              <a:rPr lang="en-US"/>
+              <a:t>Edit Master text styles</a:t>
+            </a:r>
+          </a:p>
+        </p:txBody>
+      </p:sp>
+      <p:sp>
+        <p:nvSpPr>
           <p:cNvPr id="7" name="Slide Number Placeholder 6"/>
           <p:cNvSpPr>
             <a:spLocks noGrp="1"/>
@@ -1976,7 +3656,7 @@
           <a:p>
             <a:fld id="{A1FA2290-0477-46BB-87A2-28AB474124F3}" type="datetime1">
               <a:rPr lang="nl-BE" smtClean="0"/>
-              <a:t>15/09/2020</a:t>
+              <a:t>18/02/2021</a:t>
             </a:fld>
             <a:endParaRPr lang="nl-BE" dirty="0"/>
           </a:p>
@@ -2104,6 +3784,639 @@
     <p:extLst>
       <p:ext uri="{BB962C8B-B14F-4D97-AF65-F5344CB8AC3E}">
         <p14:creationId xmlns:p14="http://schemas.microsoft.com/office/powerpoint/2010/main" val="4103376313"/>
+      </p:ext>
+    </p:extLst>
+  </p:cSld>
+  <p:clrMapOvr>
+    <a:masterClrMapping/>
+  </p:clrMapOvr>
+</p:sldLayout>
+</file>
+
+<file path=ppt/slideLayouts/slideLayout7.xml><?xml version="1.0" encoding="utf-8"?>
+<p:sldLayout xmlns:a="http://schemas.openxmlformats.org/drawingml/2006/main" xmlns:r="http://schemas.openxmlformats.org/officeDocument/2006/relationships" xmlns:p="http://schemas.openxmlformats.org/presentationml/2006/main" type="title" preserve="1">
+  <p:cSld name="Title Slide">
+    <p:spTree>
+      <p:nvGrpSpPr>
+        <p:cNvPr id="1" name=""/>
+        <p:cNvGrpSpPr/>
+        <p:nvPr/>
+      </p:nvGrpSpPr>
+      <p:grpSpPr>
+        <a:xfrm>
+          <a:off x="0" y="0"/>
+          <a:ext cx="0" cy="0"/>
+          <a:chOff x="0" y="0"/>
+          <a:chExt cx="0" cy="0"/>
+        </a:xfrm>
+      </p:grpSpPr>
+      <p:sp>
+        <p:nvSpPr>
+          <p:cNvPr id="2" name="Title 1"/>
+          <p:cNvSpPr>
+            <a:spLocks noGrp="1"/>
+          </p:cNvSpPr>
+          <p:nvPr>
+            <p:ph type="ctrTitle"/>
+          </p:nvPr>
+        </p:nvSpPr>
+        <p:spPr>
+          <a:xfrm>
+            <a:off x="1524000" y="1122363"/>
+            <a:ext cx="9144000" cy="2387600"/>
+          </a:xfrm>
+        </p:spPr>
+        <p:txBody>
+          <a:bodyPr anchor="b"/>
+          <a:lstStyle>
+            <a:lvl1pPr algn="ctr">
+              <a:defRPr sz="6000"/>
+            </a:lvl1pPr>
+          </a:lstStyle>
+          <a:p>
+            <a:r>
+              <a:rPr lang="en-US"/>
+              <a:t>Click to edit Master title style</a:t>
+            </a:r>
+          </a:p>
+        </p:txBody>
+      </p:sp>
+      <p:sp>
+        <p:nvSpPr>
+          <p:cNvPr id="3" name="Subtitle 2"/>
+          <p:cNvSpPr>
+            <a:spLocks noGrp="1"/>
+          </p:cNvSpPr>
+          <p:nvPr>
+            <p:ph type="subTitle" idx="1"/>
+          </p:nvPr>
+        </p:nvSpPr>
+        <p:spPr>
+          <a:xfrm>
+            <a:off x="1524000" y="3602038"/>
+            <a:ext cx="9144000" cy="1655762"/>
+          </a:xfrm>
+        </p:spPr>
+        <p:txBody>
+          <a:bodyPr/>
+          <a:lstStyle>
+            <a:lvl1pPr marL="0" indent="0" algn="ctr">
+              <a:buNone/>
+              <a:defRPr sz="2400"/>
+            </a:lvl1pPr>
+            <a:lvl2pPr marL="457200" indent="0" algn="ctr">
+              <a:buNone/>
+              <a:defRPr sz="2000"/>
+            </a:lvl2pPr>
+            <a:lvl3pPr marL="914400" indent="0" algn="ctr">
+              <a:buNone/>
+              <a:defRPr sz="1800"/>
+            </a:lvl3pPr>
+            <a:lvl4pPr marL="1371600" indent="0" algn="ctr">
+              <a:buNone/>
+              <a:defRPr sz="1600"/>
+            </a:lvl4pPr>
+            <a:lvl5pPr marL="1828800" indent="0" algn="ctr">
+              <a:buNone/>
+              <a:defRPr sz="1600"/>
+            </a:lvl5pPr>
+            <a:lvl6pPr marL="2286000" indent="0" algn="ctr">
+              <a:buNone/>
+              <a:defRPr sz="1600"/>
+            </a:lvl6pPr>
+            <a:lvl7pPr marL="2743200" indent="0" algn="ctr">
+              <a:buNone/>
+              <a:defRPr sz="1600"/>
+            </a:lvl7pPr>
+            <a:lvl8pPr marL="3200400" indent="0" algn="ctr">
+              <a:buNone/>
+              <a:defRPr sz="1600"/>
+            </a:lvl8pPr>
+            <a:lvl9pPr marL="3657600" indent="0" algn="ctr">
+              <a:buNone/>
+              <a:defRPr sz="1600"/>
+            </a:lvl9pPr>
+          </a:lstStyle>
+          <a:p>
+            <a:r>
+              <a:rPr lang="en-US"/>
+              <a:t>Click to edit Master subtitle style</a:t>
+            </a:r>
+          </a:p>
+        </p:txBody>
+      </p:sp>
+      <p:sp>
+        <p:nvSpPr>
+          <p:cNvPr id="4" name="Date Placeholder 3"/>
+          <p:cNvSpPr>
+            <a:spLocks noGrp="1"/>
+          </p:cNvSpPr>
+          <p:nvPr>
+            <p:ph type="dt" sz="half" idx="10"/>
+          </p:nvPr>
+        </p:nvSpPr>
+        <p:spPr/>
+        <p:txBody>
+          <a:bodyPr/>
+          <a:lstStyle/>
+          <a:p>
+            <a:fld id="{1C565815-05F0-455F-BBD6-9680ABD9D1CB}" type="datetimeFigureOut">
+              <a:rPr lang="en-US" smtClean="0"/>
+              <a:t>2/18/2021</a:t>
+            </a:fld>
+            <a:endParaRPr lang="en-US"/>
+          </a:p>
+        </p:txBody>
+      </p:sp>
+      <p:sp>
+        <p:nvSpPr>
+          <p:cNvPr id="5" name="Footer Placeholder 4"/>
+          <p:cNvSpPr>
+            <a:spLocks noGrp="1"/>
+          </p:cNvSpPr>
+          <p:nvPr>
+            <p:ph type="ftr" sz="quarter" idx="11"/>
+          </p:nvPr>
+        </p:nvSpPr>
+        <p:spPr/>
+        <p:txBody>
+          <a:bodyPr/>
+          <a:lstStyle/>
+          <a:p>
+            <a:endParaRPr lang="en-US"/>
+          </a:p>
+        </p:txBody>
+      </p:sp>
+      <p:sp>
+        <p:nvSpPr>
+          <p:cNvPr id="6" name="Slide Number Placeholder 5"/>
+          <p:cNvSpPr>
+            <a:spLocks noGrp="1"/>
+          </p:cNvSpPr>
+          <p:nvPr>
+            <p:ph type="sldNum" sz="quarter" idx="12"/>
+          </p:nvPr>
+        </p:nvSpPr>
+        <p:spPr/>
+        <p:txBody>
+          <a:bodyPr/>
+          <a:lstStyle/>
+          <a:p>
+            <a:fld id="{2DDE5766-DCCA-445A-AA53-048753A2C1C5}" type="slidenum">
+              <a:rPr lang="en-US" smtClean="0"/>
+              <a:t>‹#›</a:t>
+            </a:fld>
+            <a:endParaRPr lang="en-US"/>
+          </a:p>
+        </p:txBody>
+      </p:sp>
+      <p:pic>
+        <p:nvPicPr>
+          <p:cNvPr id="7" name="Picture 6"/>
+          <p:cNvPicPr>
+            <a:picLocks noChangeAspect="1"/>
+          </p:cNvPicPr>
+          <p:nvPr userDrawn="1"/>
+        </p:nvPicPr>
+        <p:blipFill>
+          <a:blip r:embed="rId2">
+            <a:extLst>
+              <a:ext uri="{28A0092B-C50C-407E-A947-70E740481C1C}">
+                <a14:useLocalDpi xmlns:a14="http://schemas.microsoft.com/office/drawing/2010/main" val="0"/>
+              </a:ext>
+            </a:extLst>
+          </a:blip>
+          <a:stretch>
+            <a:fillRect/>
+          </a:stretch>
+        </p:blipFill>
+        <p:spPr>
+          <a:xfrm>
+            <a:off x="0" y="0"/>
+            <a:ext cx="12192000" cy="6858000"/>
+          </a:xfrm>
+          <a:prstGeom prst="rect">
+            <a:avLst/>
+          </a:prstGeom>
+        </p:spPr>
+      </p:pic>
+    </p:spTree>
+    <p:extLst>
+      <p:ext uri="{BB962C8B-B14F-4D97-AF65-F5344CB8AC3E}">
+        <p14:creationId xmlns:p14="http://schemas.microsoft.com/office/powerpoint/2010/main" val="329096511"/>
+      </p:ext>
+    </p:extLst>
+  </p:cSld>
+  <p:clrMapOvr>
+    <a:masterClrMapping/>
+  </p:clrMapOvr>
+</p:sldLayout>
+</file>
+
+<file path=ppt/slideLayouts/slideLayout8.xml><?xml version="1.0" encoding="utf-8"?>
+<p:sldLayout xmlns:a="http://schemas.openxmlformats.org/drawingml/2006/main" xmlns:r="http://schemas.openxmlformats.org/officeDocument/2006/relationships" xmlns:p="http://schemas.openxmlformats.org/presentationml/2006/main" type="obj" preserve="1">
+  <p:cSld name="Title and Content">
+    <p:spTree>
+      <p:nvGrpSpPr>
+        <p:cNvPr id="1" name=""/>
+        <p:cNvGrpSpPr/>
+        <p:nvPr/>
+      </p:nvGrpSpPr>
+      <p:grpSpPr>
+        <a:xfrm>
+          <a:off x="0" y="0"/>
+          <a:ext cx="0" cy="0"/>
+          <a:chOff x="0" y="0"/>
+          <a:chExt cx="0" cy="0"/>
+        </a:xfrm>
+      </p:grpSpPr>
+      <p:sp>
+        <p:nvSpPr>
+          <p:cNvPr id="2" name="Title 1"/>
+          <p:cNvSpPr>
+            <a:spLocks noGrp="1"/>
+          </p:cNvSpPr>
+          <p:nvPr>
+            <p:ph type="title"/>
+          </p:nvPr>
+        </p:nvSpPr>
+        <p:spPr/>
+        <p:txBody>
+          <a:bodyPr/>
+          <a:lstStyle/>
+          <a:p>
+            <a:r>
+              <a:rPr lang="en-US"/>
+              <a:t>Click to edit Master title style</a:t>
+            </a:r>
+          </a:p>
+        </p:txBody>
+      </p:sp>
+      <p:sp>
+        <p:nvSpPr>
+          <p:cNvPr id="3" name="Content Placeholder 2"/>
+          <p:cNvSpPr>
+            <a:spLocks noGrp="1"/>
+          </p:cNvSpPr>
+          <p:nvPr>
+            <p:ph idx="1"/>
+          </p:nvPr>
+        </p:nvSpPr>
+        <p:spPr/>
+        <p:txBody>
+          <a:bodyPr/>
+          <a:lstStyle/>
+          <a:p>
+            <a:pPr lvl="0"/>
+            <a:r>
+              <a:rPr lang="en-US"/>
+              <a:t>Edit Master text styles</a:t>
+            </a:r>
+          </a:p>
+          <a:p>
+            <a:pPr lvl="1"/>
+            <a:r>
+              <a:rPr lang="en-US"/>
+              <a:t>Second level</a:t>
+            </a:r>
+          </a:p>
+          <a:p>
+            <a:pPr lvl="2"/>
+            <a:r>
+              <a:rPr lang="en-US"/>
+              <a:t>Third level</a:t>
+            </a:r>
+          </a:p>
+          <a:p>
+            <a:pPr lvl="3"/>
+            <a:r>
+              <a:rPr lang="en-US"/>
+              <a:t>Fourth level</a:t>
+            </a:r>
+          </a:p>
+          <a:p>
+            <a:pPr lvl="4"/>
+            <a:r>
+              <a:rPr lang="en-US"/>
+              <a:t>Fifth level</a:t>
+            </a:r>
+          </a:p>
+        </p:txBody>
+      </p:sp>
+      <p:sp>
+        <p:nvSpPr>
+          <p:cNvPr id="4" name="Date Placeholder 3"/>
+          <p:cNvSpPr>
+            <a:spLocks noGrp="1"/>
+          </p:cNvSpPr>
+          <p:nvPr>
+            <p:ph type="dt" sz="half" idx="10"/>
+          </p:nvPr>
+        </p:nvSpPr>
+        <p:spPr/>
+        <p:txBody>
+          <a:bodyPr/>
+          <a:lstStyle/>
+          <a:p>
+            <a:fld id="{1C565815-05F0-455F-BBD6-9680ABD9D1CB}" type="datetimeFigureOut">
+              <a:rPr lang="en-US" smtClean="0"/>
+              <a:t>2/18/2021</a:t>
+            </a:fld>
+            <a:endParaRPr lang="en-US"/>
+          </a:p>
+        </p:txBody>
+      </p:sp>
+      <p:sp>
+        <p:nvSpPr>
+          <p:cNvPr id="5" name="Footer Placeholder 4"/>
+          <p:cNvSpPr>
+            <a:spLocks noGrp="1"/>
+          </p:cNvSpPr>
+          <p:nvPr>
+            <p:ph type="ftr" sz="quarter" idx="11"/>
+          </p:nvPr>
+        </p:nvSpPr>
+        <p:spPr/>
+        <p:txBody>
+          <a:bodyPr/>
+          <a:lstStyle/>
+          <a:p>
+            <a:endParaRPr lang="en-US"/>
+          </a:p>
+        </p:txBody>
+      </p:sp>
+      <p:sp>
+        <p:nvSpPr>
+          <p:cNvPr id="6" name="Slide Number Placeholder 5"/>
+          <p:cNvSpPr>
+            <a:spLocks noGrp="1"/>
+          </p:cNvSpPr>
+          <p:nvPr>
+            <p:ph type="sldNum" sz="quarter" idx="12"/>
+          </p:nvPr>
+        </p:nvSpPr>
+        <p:spPr/>
+        <p:txBody>
+          <a:bodyPr/>
+          <a:lstStyle/>
+          <a:p>
+            <a:fld id="{2DDE5766-DCCA-445A-AA53-048753A2C1C5}" type="slidenum">
+              <a:rPr lang="en-US" smtClean="0"/>
+              <a:t>‹#›</a:t>
+            </a:fld>
+            <a:endParaRPr lang="en-US"/>
+          </a:p>
+        </p:txBody>
+      </p:sp>
+    </p:spTree>
+    <p:extLst>
+      <p:ext uri="{BB962C8B-B14F-4D97-AF65-F5344CB8AC3E}">
+        <p14:creationId xmlns:p14="http://schemas.microsoft.com/office/powerpoint/2010/main" val="3414232024"/>
+      </p:ext>
+    </p:extLst>
+  </p:cSld>
+  <p:clrMapOvr>
+    <a:masterClrMapping/>
+  </p:clrMapOvr>
+</p:sldLayout>
+</file>
+
+<file path=ppt/slideLayouts/slideLayout9.xml><?xml version="1.0" encoding="utf-8"?>
+<p:sldLayout xmlns:a="http://schemas.openxmlformats.org/drawingml/2006/main" xmlns:r="http://schemas.openxmlformats.org/officeDocument/2006/relationships" xmlns:p="http://schemas.openxmlformats.org/presentationml/2006/main" type="secHead" preserve="1">
+  <p:cSld name="Section Header">
+    <p:spTree>
+      <p:nvGrpSpPr>
+        <p:cNvPr id="1" name=""/>
+        <p:cNvGrpSpPr/>
+        <p:nvPr/>
+      </p:nvGrpSpPr>
+      <p:grpSpPr>
+        <a:xfrm>
+          <a:off x="0" y="0"/>
+          <a:ext cx="0" cy="0"/>
+          <a:chOff x="0" y="0"/>
+          <a:chExt cx="0" cy="0"/>
+        </a:xfrm>
+      </p:grpSpPr>
+      <p:sp>
+        <p:nvSpPr>
+          <p:cNvPr id="2" name="Title 1"/>
+          <p:cNvSpPr>
+            <a:spLocks noGrp="1"/>
+          </p:cNvSpPr>
+          <p:nvPr>
+            <p:ph type="title"/>
+          </p:nvPr>
+        </p:nvSpPr>
+        <p:spPr>
+          <a:xfrm>
+            <a:off x="831850" y="1709738"/>
+            <a:ext cx="10515600" cy="2852737"/>
+          </a:xfrm>
+        </p:spPr>
+        <p:txBody>
+          <a:bodyPr anchor="b"/>
+          <a:lstStyle>
+            <a:lvl1pPr>
+              <a:defRPr sz="6000"/>
+            </a:lvl1pPr>
+          </a:lstStyle>
+          <a:p>
+            <a:r>
+              <a:rPr lang="en-US"/>
+              <a:t>Click to edit Master title style</a:t>
+            </a:r>
+          </a:p>
+        </p:txBody>
+      </p:sp>
+      <p:sp>
+        <p:nvSpPr>
+          <p:cNvPr id="3" name="Text Placeholder 2"/>
+          <p:cNvSpPr>
+            <a:spLocks noGrp="1"/>
+          </p:cNvSpPr>
+          <p:nvPr>
+            <p:ph type="body" idx="1"/>
+          </p:nvPr>
+        </p:nvSpPr>
+        <p:spPr>
+          <a:xfrm>
+            <a:off x="831850" y="4589463"/>
+            <a:ext cx="10515600" cy="1500187"/>
+          </a:xfrm>
+        </p:spPr>
+        <p:txBody>
+          <a:bodyPr/>
+          <a:lstStyle>
+            <a:lvl1pPr marL="0" indent="0">
+              <a:buNone/>
+              <a:defRPr sz="2400">
+                <a:solidFill>
+                  <a:schemeClr val="tx1">
+                    <a:tint val="75000"/>
+                  </a:schemeClr>
+                </a:solidFill>
+              </a:defRPr>
+            </a:lvl1pPr>
+            <a:lvl2pPr marL="457200" indent="0">
+              <a:buNone/>
+              <a:defRPr sz="2000">
+                <a:solidFill>
+                  <a:schemeClr val="tx1">
+                    <a:tint val="75000"/>
+                  </a:schemeClr>
+                </a:solidFill>
+              </a:defRPr>
+            </a:lvl2pPr>
+            <a:lvl3pPr marL="914400" indent="0">
+              <a:buNone/>
+              <a:defRPr sz="1800">
+                <a:solidFill>
+                  <a:schemeClr val="tx1">
+                    <a:tint val="75000"/>
+                  </a:schemeClr>
+                </a:solidFill>
+              </a:defRPr>
+            </a:lvl3pPr>
+            <a:lvl4pPr marL="1371600" indent="0">
+              <a:buNone/>
+              <a:defRPr sz="1600">
+                <a:solidFill>
+                  <a:schemeClr val="tx1">
+                    <a:tint val="75000"/>
+                  </a:schemeClr>
+                </a:solidFill>
+              </a:defRPr>
+            </a:lvl4pPr>
+            <a:lvl5pPr marL="1828800" indent="0">
+              <a:buNone/>
+              <a:defRPr sz="1600">
+                <a:solidFill>
+                  <a:schemeClr val="tx1">
+                    <a:tint val="75000"/>
+                  </a:schemeClr>
+                </a:solidFill>
+              </a:defRPr>
+            </a:lvl5pPr>
+            <a:lvl6pPr marL="2286000" indent="0">
+              <a:buNone/>
+              <a:defRPr sz="1600">
+                <a:solidFill>
+                  <a:schemeClr val="tx1">
+                    <a:tint val="75000"/>
+                  </a:schemeClr>
+                </a:solidFill>
+              </a:defRPr>
+            </a:lvl6pPr>
+            <a:lvl7pPr marL="2743200" indent="0">
+              <a:buNone/>
+              <a:defRPr sz="1600">
+                <a:solidFill>
+                  <a:schemeClr val="tx1">
+                    <a:tint val="75000"/>
+                  </a:schemeClr>
+                </a:solidFill>
+              </a:defRPr>
+            </a:lvl7pPr>
+            <a:lvl8pPr marL="3200400" indent="0">
+              <a:buNone/>
+              <a:defRPr sz="1600">
+                <a:solidFill>
+                  <a:schemeClr val="tx1">
+                    <a:tint val="75000"/>
+                  </a:schemeClr>
+                </a:solidFill>
+              </a:defRPr>
+            </a:lvl8pPr>
+            <a:lvl9pPr marL="3657600" indent="0">
+              <a:buNone/>
+              <a:defRPr sz="1600">
+                <a:solidFill>
+                  <a:schemeClr val="tx1">
+                    <a:tint val="75000"/>
+                  </a:schemeClr>
+                </a:solidFill>
+              </a:defRPr>
+            </a:lvl9pPr>
+          </a:lstStyle>
+          <a:p>
+            <a:pPr lvl="0"/>
+            <a:r>
+              <a:rPr lang="en-US"/>
+              <a:t>Edit Master text styles</a:t>
+            </a:r>
+          </a:p>
+        </p:txBody>
+      </p:sp>
+      <p:sp>
+        <p:nvSpPr>
+          <p:cNvPr id="4" name="Date Placeholder 3"/>
+          <p:cNvSpPr>
+            <a:spLocks noGrp="1"/>
+          </p:cNvSpPr>
+          <p:nvPr>
+            <p:ph type="dt" sz="half" idx="10"/>
+          </p:nvPr>
+        </p:nvSpPr>
+        <p:spPr/>
+        <p:txBody>
+          <a:bodyPr/>
+          <a:lstStyle/>
+          <a:p>
+            <a:fld id="{1C565815-05F0-455F-BBD6-9680ABD9D1CB}" type="datetimeFigureOut">
+              <a:rPr lang="en-US" smtClean="0"/>
+              <a:t>2/18/2021</a:t>
+            </a:fld>
+            <a:endParaRPr lang="en-US"/>
+          </a:p>
+        </p:txBody>
+      </p:sp>
+      <p:sp>
+        <p:nvSpPr>
+          <p:cNvPr id="5" name="Footer Placeholder 4"/>
+          <p:cNvSpPr>
+            <a:spLocks noGrp="1"/>
+          </p:cNvSpPr>
+          <p:nvPr>
+            <p:ph type="ftr" sz="quarter" idx="11"/>
+          </p:nvPr>
+        </p:nvSpPr>
+        <p:spPr/>
+        <p:txBody>
+          <a:bodyPr/>
+          <a:lstStyle/>
+          <a:p>
+            <a:endParaRPr lang="en-US"/>
+          </a:p>
+        </p:txBody>
+      </p:sp>
+      <p:sp>
+        <p:nvSpPr>
+          <p:cNvPr id="6" name="Slide Number Placeholder 5"/>
+          <p:cNvSpPr>
+            <a:spLocks noGrp="1"/>
+          </p:cNvSpPr>
+          <p:nvPr>
+            <p:ph type="sldNum" sz="quarter" idx="12"/>
+          </p:nvPr>
+        </p:nvSpPr>
+        <p:spPr/>
+        <p:txBody>
+          <a:bodyPr/>
+          <a:lstStyle/>
+          <a:p>
+            <a:fld id="{2DDE5766-DCCA-445A-AA53-048753A2C1C5}" type="slidenum">
+              <a:rPr lang="en-US" smtClean="0"/>
+              <a:t>‹#›</a:t>
+            </a:fld>
+            <a:endParaRPr lang="en-US"/>
+          </a:p>
+        </p:txBody>
+      </p:sp>
+    </p:spTree>
+    <p:extLst>
+      <p:ext uri="{BB962C8B-B14F-4D97-AF65-F5344CB8AC3E}">
+        <p14:creationId xmlns:p14="http://schemas.microsoft.com/office/powerpoint/2010/main" val="2213316577"/>
       </p:ext>
     </p:extLst>
   </p:cSld>
@@ -2742,6 +5055,544 @@
 </p:sldMaster>
 </file>
 
+<file path=ppt/slideMasters/slideMaster2.xml><?xml version="1.0" encoding="utf-8"?>
+<p:sldMaster xmlns:a="http://schemas.openxmlformats.org/drawingml/2006/main" xmlns:r="http://schemas.openxmlformats.org/officeDocument/2006/relationships" xmlns:p="http://schemas.openxmlformats.org/presentationml/2006/main">
+  <p:cSld>
+    <p:bg>
+      <p:bgRef idx="1001">
+        <a:schemeClr val="bg1"/>
+      </p:bgRef>
+    </p:bg>
+    <p:spTree>
+      <p:nvGrpSpPr>
+        <p:cNvPr id="1" name=""/>
+        <p:cNvGrpSpPr/>
+        <p:nvPr/>
+      </p:nvGrpSpPr>
+      <p:grpSpPr>
+        <a:xfrm>
+          <a:off x="0" y="0"/>
+          <a:ext cx="0" cy="0"/>
+          <a:chOff x="0" y="0"/>
+          <a:chExt cx="0" cy="0"/>
+        </a:xfrm>
+      </p:grpSpPr>
+      <p:sp>
+        <p:nvSpPr>
+          <p:cNvPr id="2" name="Title Placeholder 1"/>
+          <p:cNvSpPr>
+            <a:spLocks noGrp="1"/>
+          </p:cNvSpPr>
+          <p:nvPr>
+            <p:ph type="title"/>
+          </p:nvPr>
+        </p:nvSpPr>
+        <p:spPr>
+          <a:xfrm>
+            <a:off x="838200" y="365125"/>
+            <a:ext cx="10515600" cy="1325563"/>
+          </a:xfrm>
+          <a:prstGeom prst="rect">
+            <a:avLst/>
+          </a:prstGeom>
+        </p:spPr>
+        <p:txBody>
+          <a:bodyPr vert="horz" lIns="91440" tIns="45720" rIns="91440" bIns="45720" rtlCol="0" anchor="ctr">
+            <a:normAutofit/>
+          </a:bodyPr>
+          <a:lstStyle/>
+          <a:p>
+            <a:r>
+              <a:rPr lang="en-US"/>
+              <a:t>Click to edit Master title style</a:t>
+            </a:r>
+          </a:p>
+        </p:txBody>
+      </p:sp>
+      <p:sp>
+        <p:nvSpPr>
+          <p:cNvPr id="3" name="Text Placeholder 2"/>
+          <p:cNvSpPr>
+            <a:spLocks noGrp="1"/>
+          </p:cNvSpPr>
+          <p:nvPr>
+            <p:ph type="body" idx="1"/>
+          </p:nvPr>
+        </p:nvSpPr>
+        <p:spPr>
+          <a:xfrm>
+            <a:off x="838200" y="1825625"/>
+            <a:ext cx="10515600" cy="4351338"/>
+          </a:xfrm>
+          <a:prstGeom prst="rect">
+            <a:avLst/>
+          </a:prstGeom>
+        </p:spPr>
+        <p:txBody>
+          <a:bodyPr vert="horz" lIns="91440" tIns="45720" rIns="91440" bIns="45720" rtlCol="0">
+            <a:normAutofit/>
+          </a:bodyPr>
+          <a:lstStyle/>
+          <a:p>
+            <a:pPr lvl="0"/>
+            <a:r>
+              <a:rPr lang="en-US"/>
+              <a:t>Edit Master text styles</a:t>
+            </a:r>
+          </a:p>
+          <a:p>
+            <a:pPr lvl="1"/>
+            <a:r>
+              <a:rPr lang="en-US"/>
+              <a:t>Second level</a:t>
+            </a:r>
+          </a:p>
+          <a:p>
+            <a:pPr lvl="2"/>
+            <a:r>
+              <a:rPr lang="en-US"/>
+              <a:t>Third level</a:t>
+            </a:r>
+          </a:p>
+          <a:p>
+            <a:pPr lvl="3"/>
+            <a:r>
+              <a:rPr lang="en-US"/>
+              <a:t>Fourth level</a:t>
+            </a:r>
+          </a:p>
+          <a:p>
+            <a:pPr lvl="4"/>
+            <a:r>
+              <a:rPr lang="en-US"/>
+              <a:t>Fifth level</a:t>
+            </a:r>
+          </a:p>
+        </p:txBody>
+      </p:sp>
+      <p:sp>
+        <p:nvSpPr>
+          <p:cNvPr id="4" name="Date Placeholder 3"/>
+          <p:cNvSpPr>
+            <a:spLocks noGrp="1"/>
+          </p:cNvSpPr>
+          <p:nvPr>
+            <p:ph type="dt" sz="half" idx="2"/>
+          </p:nvPr>
+        </p:nvSpPr>
+        <p:spPr>
+          <a:xfrm>
+            <a:off x="838200" y="6356350"/>
+            <a:ext cx="2743200" cy="365125"/>
+          </a:xfrm>
+          <a:prstGeom prst="rect">
+            <a:avLst/>
+          </a:prstGeom>
+        </p:spPr>
+        <p:txBody>
+          <a:bodyPr vert="horz" lIns="91440" tIns="45720" rIns="91440" bIns="45720" rtlCol="0" anchor="ctr"/>
+          <a:lstStyle>
+            <a:lvl1pPr algn="l">
+              <a:defRPr sz="1200">
+                <a:solidFill>
+                  <a:schemeClr val="tx1">
+                    <a:tint val="75000"/>
+                  </a:schemeClr>
+                </a:solidFill>
+              </a:defRPr>
+            </a:lvl1pPr>
+          </a:lstStyle>
+          <a:p>
+            <a:fld id="{1C565815-05F0-455F-BBD6-9680ABD9D1CB}" type="datetimeFigureOut">
+              <a:rPr lang="en-US" smtClean="0"/>
+              <a:t>2/18/2021</a:t>
+            </a:fld>
+            <a:endParaRPr lang="en-US"/>
+          </a:p>
+        </p:txBody>
+      </p:sp>
+      <p:sp>
+        <p:nvSpPr>
+          <p:cNvPr id="5" name="Footer Placeholder 4"/>
+          <p:cNvSpPr>
+            <a:spLocks noGrp="1"/>
+          </p:cNvSpPr>
+          <p:nvPr>
+            <p:ph type="ftr" sz="quarter" idx="3"/>
+          </p:nvPr>
+        </p:nvSpPr>
+        <p:spPr>
+          <a:xfrm>
+            <a:off x="4038600" y="6356350"/>
+            <a:ext cx="4114800" cy="365125"/>
+          </a:xfrm>
+          <a:prstGeom prst="rect">
+            <a:avLst/>
+          </a:prstGeom>
+        </p:spPr>
+        <p:txBody>
+          <a:bodyPr vert="horz" lIns="91440" tIns="45720" rIns="91440" bIns="45720" rtlCol="0" anchor="ctr"/>
+          <a:lstStyle>
+            <a:lvl1pPr algn="ctr">
+              <a:defRPr sz="1200">
+                <a:solidFill>
+                  <a:schemeClr val="tx1">
+                    <a:tint val="75000"/>
+                  </a:schemeClr>
+                </a:solidFill>
+              </a:defRPr>
+            </a:lvl1pPr>
+          </a:lstStyle>
+          <a:p>
+            <a:endParaRPr lang="en-US"/>
+          </a:p>
+        </p:txBody>
+      </p:sp>
+      <p:sp>
+        <p:nvSpPr>
+          <p:cNvPr id="6" name="Slide Number Placeholder 5"/>
+          <p:cNvSpPr>
+            <a:spLocks noGrp="1"/>
+          </p:cNvSpPr>
+          <p:nvPr>
+            <p:ph type="sldNum" sz="quarter" idx="4"/>
+          </p:nvPr>
+        </p:nvSpPr>
+        <p:spPr>
+          <a:xfrm>
+            <a:off x="8610600" y="6356350"/>
+            <a:ext cx="2743200" cy="365125"/>
+          </a:xfrm>
+          <a:prstGeom prst="rect">
+            <a:avLst/>
+          </a:prstGeom>
+        </p:spPr>
+        <p:txBody>
+          <a:bodyPr vert="horz" lIns="91440" tIns="45720" rIns="91440" bIns="45720" rtlCol="0" anchor="ctr"/>
+          <a:lstStyle>
+            <a:lvl1pPr algn="r">
+              <a:defRPr sz="1200">
+                <a:solidFill>
+                  <a:schemeClr val="tx1">
+                    <a:tint val="75000"/>
+                  </a:schemeClr>
+                </a:solidFill>
+              </a:defRPr>
+            </a:lvl1pPr>
+          </a:lstStyle>
+          <a:p>
+            <a:fld id="{2DDE5766-DCCA-445A-AA53-048753A2C1C5}" type="slidenum">
+              <a:rPr lang="en-US" smtClean="0"/>
+              <a:t>‹#›</a:t>
+            </a:fld>
+            <a:endParaRPr lang="en-US"/>
+          </a:p>
+        </p:txBody>
+      </p:sp>
+    </p:spTree>
+    <p:extLst>
+      <p:ext uri="{BB962C8B-B14F-4D97-AF65-F5344CB8AC3E}">
+        <p14:creationId xmlns:p14="http://schemas.microsoft.com/office/powerpoint/2010/main" val="1789407821"/>
+      </p:ext>
+    </p:extLst>
+  </p:cSld>
+  <p:clrMap bg1="lt1" tx1="dk1" bg2="lt2" tx2="dk2" accent1="accent1" accent2="accent2" accent3="accent3" accent4="accent4" accent5="accent5" accent6="accent6" hlink="hlink" folHlink="folHlink"/>
+  <p:sldLayoutIdLst>
+    <p:sldLayoutId id="2147483713" r:id="rId1"/>
+    <p:sldLayoutId id="2147483714" r:id="rId2"/>
+    <p:sldLayoutId id="2147483715" r:id="rId3"/>
+    <p:sldLayoutId id="2147483716" r:id="rId4"/>
+    <p:sldLayoutId id="2147483717" r:id="rId5"/>
+    <p:sldLayoutId id="2147483718" r:id="rId6"/>
+    <p:sldLayoutId id="2147483719" r:id="rId7"/>
+    <p:sldLayoutId id="2147483720" r:id="rId8"/>
+    <p:sldLayoutId id="2147483721" r:id="rId9"/>
+    <p:sldLayoutId id="2147483722" r:id="rId10"/>
+    <p:sldLayoutId id="2147483723" r:id="rId11"/>
+  </p:sldLayoutIdLst>
+  <p:txStyles>
+    <p:titleStyle>
+      <a:lvl1pPr algn="l" defTabSz="914400" rtl="0" eaLnBrk="1" latinLnBrk="0" hangingPunct="1">
+        <a:lnSpc>
+          <a:spcPct val="90000"/>
+        </a:lnSpc>
+        <a:spcBef>
+          <a:spcPct val="0"/>
+        </a:spcBef>
+        <a:buNone/>
+        <a:defRPr sz="4400" kern="1200">
+          <a:solidFill>
+            <a:schemeClr val="tx1"/>
+          </a:solidFill>
+          <a:latin typeface="+mj-lt"/>
+          <a:ea typeface="+mj-ea"/>
+          <a:cs typeface="+mj-cs"/>
+        </a:defRPr>
+      </a:lvl1pPr>
+    </p:titleStyle>
+    <p:bodyStyle>
+      <a:lvl1pPr marL="228600" indent="-228600" algn="l" defTabSz="914400" rtl="0" eaLnBrk="1" latinLnBrk="0" hangingPunct="1">
+        <a:lnSpc>
+          <a:spcPct val="90000"/>
+        </a:lnSpc>
+        <a:spcBef>
+          <a:spcPts val="1000"/>
+        </a:spcBef>
+        <a:buFont typeface="Arial" panose="020B0604020202020204" pitchFamily="34" charset="0"/>
+        <a:buChar char="•"/>
+        <a:defRPr sz="2800" kern="1200">
+          <a:solidFill>
+            <a:schemeClr val="tx1"/>
+          </a:solidFill>
+          <a:latin typeface="+mn-lt"/>
+          <a:ea typeface="+mn-ea"/>
+          <a:cs typeface="+mn-cs"/>
+        </a:defRPr>
+      </a:lvl1pPr>
+      <a:lvl2pPr marL="685800" indent="-228600" algn="l" defTabSz="914400" rtl="0" eaLnBrk="1" latinLnBrk="0" hangingPunct="1">
+        <a:lnSpc>
+          <a:spcPct val="90000"/>
+        </a:lnSpc>
+        <a:spcBef>
+          <a:spcPts val="500"/>
+        </a:spcBef>
+        <a:buFont typeface="Arial" panose="020B0604020202020204" pitchFamily="34" charset="0"/>
+        <a:buChar char="•"/>
+        <a:defRPr sz="2400" kern="1200">
+          <a:solidFill>
+            <a:schemeClr val="tx1"/>
+          </a:solidFill>
+          <a:latin typeface="+mn-lt"/>
+          <a:ea typeface="+mn-ea"/>
+          <a:cs typeface="+mn-cs"/>
+        </a:defRPr>
+      </a:lvl2pPr>
+      <a:lvl3pPr marL="1143000" indent="-228600" algn="l" defTabSz="914400" rtl="0" eaLnBrk="1" latinLnBrk="0" hangingPunct="1">
+        <a:lnSpc>
+          <a:spcPct val="90000"/>
+        </a:lnSpc>
+        <a:spcBef>
+          <a:spcPts val="500"/>
+        </a:spcBef>
+        <a:buFont typeface="Arial" panose="020B0604020202020204" pitchFamily="34" charset="0"/>
+        <a:buChar char="•"/>
+        <a:defRPr sz="2000" kern="1200">
+          <a:solidFill>
+            <a:schemeClr val="tx1"/>
+          </a:solidFill>
+          <a:latin typeface="+mn-lt"/>
+          <a:ea typeface="+mn-ea"/>
+          <a:cs typeface="+mn-cs"/>
+        </a:defRPr>
+      </a:lvl3pPr>
+      <a:lvl4pPr marL="1600200" indent="-228600" algn="l" defTabSz="914400" rtl="0" eaLnBrk="1" latinLnBrk="0" hangingPunct="1">
+        <a:lnSpc>
+          <a:spcPct val="90000"/>
+        </a:lnSpc>
+        <a:spcBef>
+          <a:spcPts val="500"/>
+        </a:spcBef>
+        <a:buFont typeface="Arial" panose="020B0604020202020204" pitchFamily="34" charset="0"/>
+        <a:buChar char="•"/>
+        <a:defRPr sz="1800" kern="1200">
+          <a:solidFill>
+            <a:schemeClr val="tx1"/>
+          </a:solidFill>
+          <a:latin typeface="+mn-lt"/>
+          <a:ea typeface="+mn-ea"/>
+          <a:cs typeface="+mn-cs"/>
+        </a:defRPr>
+      </a:lvl4pPr>
+      <a:lvl5pPr marL="2057400" indent="-228600" algn="l" defTabSz="914400" rtl="0" eaLnBrk="1" latinLnBrk="0" hangingPunct="1">
+        <a:lnSpc>
+          <a:spcPct val="90000"/>
+        </a:lnSpc>
+        <a:spcBef>
+          <a:spcPts val="500"/>
+        </a:spcBef>
+        <a:buFont typeface="Arial" panose="020B0604020202020204" pitchFamily="34" charset="0"/>
+        <a:buChar char="•"/>
+        <a:defRPr sz="1800" kern="1200">
+          <a:solidFill>
+            <a:schemeClr val="tx1"/>
+          </a:solidFill>
+          <a:latin typeface="+mn-lt"/>
+          <a:ea typeface="+mn-ea"/>
+          <a:cs typeface="+mn-cs"/>
+        </a:defRPr>
+      </a:lvl5pPr>
+      <a:lvl6pPr marL="2514600" indent="-228600" algn="l" defTabSz="914400" rtl="0" eaLnBrk="1" latinLnBrk="0" hangingPunct="1">
+        <a:lnSpc>
+          <a:spcPct val="90000"/>
+        </a:lnSpc>
+        <a:spcBef>
+          <a:spcPts val="500"/>
+        </a:spcBef>
+        <a:buFont typeface="Arial" panose="020B0604020202020204" pitchFamily="34" charset="0"/>
+        <a:buChar char="•"/>
+        <a:defRPr sz="1800" kern="1200">
+          <a:solidFill>
+            <a:schemeClr val="tx1"/>
+          </a:solidFill>
+          <a:latin typeface="+mn-lt"/>
+          <a:ea typeface="+mn-ea"/>
+          <a:cs typeface="+mn-cs"/>
+        </a:defRPr>
+      </a:lvl6pPr>
+      <a:lvl7pPr marL="2971800" indent="-228600" algn="l" defTabSz="914400" rtl="0" eaLnBrk="1" latinLnBrk="0" hangingPunct="1">
+        <a:lnSpc>
+          <a:spcPct val="90000"/>
+        </a:lnSpc>
+        <a:spcBef>
+          <a:spcPts val="500"/>
+        </a:spcBef>
+        <a:buFont typeface="Arial" panose="020B0604020202020204" pitchFamily="34" charset="0"/>
+        <a:buChar char="•"/>
+        <a:defRPr sz="1800" kern="1200">
+          <a:solidFill>
+            <a:schemeClr val="tx1"/>
+          </a:solidFill>
+          <a:latin typeface="+mn-lt"/>
+          <a:ea typeface="+mn-ea"/>
+          <a:cs typeface="+mn-cs"/>
+        </a:defRPr>
+      </a:lvl7pPr>
+      <a:lvl8pPr marL="3429000" indent="-228600" algn="l" defTabSz="914400" rtl="0" eaLnBrk="1" latinLnBrk="0" hangingPunct="1">
+        <a:lnSpc>
+          <a:spcPct val="90000"/>
+        </a:lnSpc>
+        <a:spcBef>
+          <a:spcPts val="500"/>
+        </a:spcBef>
+        <a:buFont typeface="Arial" panose="020B0604020202020204" pitchFamily="34" charset="0"/>
+        <a:buChar char="•"/>
+        <a:defRPr sz="1800" kern="1200">
+          <a:solidFill>
+            <a:schemeClr val="tx1"/>
+          </a:solidFill>
+          <a:latin typeface="+mn-lt"/>
+          <a:ea typeface="+mn-ea"/>
+          <a:cs typeface="+mn-cs"/>
+        </a:defRPr>
+      </a:lvl8pPr>
+      <a:lvl9pPr marL="3886200" indent="-228600" algn="l" defTabSz="914400" rtl="0" eaLnBrk="1" latinLnBrk="0" hangingPunct="1">
+        <a:lnSpc>
+          <a:spcPct val="90000"/>
+        </a:lnSpc>
+        <a:spcBef>
+          <a:spcPts val="500"/>
+        </a:spcBef>
+        <a:buFont typeface="Arial" panose="020B0604020202020204" pitchFamily="34" charset="0"/>
+        <a:buChar char="•"/>
+        <a:defRPr sz="1800" kern="1200">
+          <a:solidFill>
+            <a:schemeClr val="tx1"/>
+          </a:solidFill>
+          <a:latin typeface="+mn-lt"/>
+          <a:ea typeface="+mn-ea"/>
+          <a:cs typeface="+mn-cs"/>
+        </a:defRPr>
+      </a:lvl9pPr>
+    </p:bodyStyle>
+    <p:otherStyle>
+      <a:defPPr>
+        <a:defRPr lang="en-US"/>
+      </a:defPPr>
+      <a:lvl1pPr marL="0" algn="l" defTabSz="914400" rtl="0" eaLnBrk="1" latinLnBrk="0" hangingPunct="1">
+        <a:defRPr sz="1800" kern="1200">
+          <a:solidFill>
+            <a:schemeClr val="tx1"/>
+          </a:solidFill>
+          <a:latin typeface="+mn-lt"/>
+          <a:ea typeface="+mn-ea"/>
+          <a:cs typeface="+mn-cs"/>
+        </a:defRPr>
+      </a:lvl1pPr>
+      <a:lvl2pPr marL="457200" algn="l" defTabSz="914400" rtl="0" eaLnBrk="1" latinLnBrk="0" hangingPunct="1">
+        <a:defRPr sz="1800" kern="1200">
+          <a:solidFill>
+            <a:schemeClr val="tx1"/>
+          </a:solidFill>
+          <a:latin typeface="+mn-lt"/>
+          <a:ea typeface="+mn-ea"/>
+          <a:cs typeface="+mn-cs"/>
+        </a:defRPr>
+      </a:lvl2pPr>
+      <a:lvl3pPr marL="914400" algn="l" defTabSz="914400" rtl="0" eaLnBrk="1" latinLnBrk="0" hangingPunct="1">
+        <a:defRPr sz="1800" kern="1200">
+          <a:solidFill>
+            <a:schemeClr val="tx1"/>
+          </a:solidFill>
+          <a:latin typeface="+mn-lt"/>
+          <a:ea typeface="+mn-ea"/>
+          <a:cs typeface="+mn-cs"/>
+        </a:defRPr>
+      </a:lvl3pPr>
+      <a:lvl4pPr marL="1371600" algn="l" defTabSz="914400" rtl="0" eaLnBrk="1" latinLnBrk="0" hangingPunct="1">
+        <a:defRPr sz="1800" kern="1200">
+          <a:solidFill>
+            <a:schemeClr val="tx1"/>
+          </a:solidFill>
+          <a:latin typeface="+mn-lt"/>
+          <a:ea typeface="+mn-ea"/>
+          <a:cs typeface="+mn-cs"/>
+        </a:defRPr>
+      </a:lvl4pPr>
+      <a:lvl5pPr marL="1828800" algn="l" defTabSz="914400" rtl="0" eaLnBrk="1" latinLnBrk="0" hangingPunct="1">
+        <a:defRPr sz="1800" kern="1200">
+          <a:solidFill>
+            <a:schemeClr val="tx1"/>
+          </a:solidFill>
+          <a:latin typeface="+mn-lt"/>
+          <a:ea typeface="+mn-ea"/>
+          <a:cs typeface="+mn-cs"/>
+        </a:defRPr>
+      </a:lvl5pPr>
+      <a:lvl6pPr marL="2286000" algn="l" defTabSz="914400" rtl="0" eaLnBrk="1" latinLnBrk="0" hangingPunct="1">
+        <a:defRPr sz="1800" kern="1200">
+          <a:solidFill>
+            <a:schemeClr val="tx1"/>
+          </a:solidFill>
+          <a:latin typeface="+mn-lt"/>
+          <a:ea typeface="+mn-ea"/>
+          <a:cs typeface="+mn-cs"/>
+        </a:defRPr>
+      </a:lvl6pPr>
+      <a:lvl7pPr marL="2743200" algn="l" defTabSz="914400" rtl="0" eaLnBrk="1" latinLnBrk="0" hangingPunct="1">
+        <a:defRPr sz="1800" kern="1200">
+          <a:solidFill>
+            <a:schemeClr val="tx1"/>
+          </a:solidFill>
+          <a:latin typeface="+mn-lt"/>
+          <a:ea typeface="+mn-ea"/>
+          <a:cs typeface="+mn-cs"/>
+        </a:defRPr>
+      </a:lvl7pPr>
+      <a:lvl8pPr marL="3200400" algn="l" defTabSz="914400" rtl="0" eaLnBrk="1" latinLnBrk="0" hangingPunct="1">
+        <a:defRPr sz="1800" kern="1200">
+          <a:solidFill>
+            <a:schemeClr val="tx1"/>
+          </a:solidFill>
+          <a:latin typeface="+mn-lt"/>
+          <a:ea typeface="+mn-ea"/>
+          <a:cs typeface="+mn-cs"/>
+        </a:defRPr>
+      </a:lvl8pPr>
+      <a:lvl9pPr marL="3657600" algn="l" defTabSz="914400" rtl="0" eaLnBrk="1" latinLnBrk="0" hangingPunct="1">
+        <a:defRPr sz="1800" kern="1200">
+          <a:solidFill>
+            <a:schemeClr val="tx1"/>
+          </a:solidFill>
+          <a:latin typeface="+mn-lt"/>
+          <a:ea typeface="+mn-ea"/>
+          <a:cs typeface="+mn-cs"/>
+        </a:defRPr>
+      </a:lvl9pPr>
+    </p:otherStyle>
+  </p:txStyles>
+</p:sldMaster>
+</file>
+
 <file path=ppt/slides/slide1.xml><?xml version="1.0" encoding="utf-8"?>
 <p:sld xmlns:a="http://schemas.openxmlformats.org/drawingml/2006/main" xmlns:r="http://schemas.openxmlformats.org/officeDocument/2006/relationships" xmlns:p="http://schemas.openxmlformats.org/presentationml/2006/main">
   <p:cSld>
@@ -10075,6 +12926,36 @@
     <p:extLst>
       <p:ext uri="{BB962C8B-B14F-4D97-AF65-F5344CB8AC3E}">
         <p14:creationId xmlns:p14="http://schemas.microsoft.com/office/powerpoint/2010/main" val="2171811963"/>
+      </p:ext>
+    </p:extLst>
+  </p:cSld>
+  <p:clrMapOvr>
+    <a:masterClrMapping/>
+  </p:clrMapOvr>
+</p:sld>
+</file>
+
+<file path=ppt/slides/slide13.xml><?xml version="1.0" encoding="utf-8"?>
+<p:sld xmlns:a="http://schemas.openxmlformats.org/drawingml/2006/main" xmlns:r="http://schemas.openxmlformats.org/officeDocument/2006/relationships" xmlns:p="http://schemas.openxmlformats.org/presentationml/2006/main">
+  <p:cSld>
+    <p:spTree>
+      <p:nvGrpSpPr>
+        <p:cNvPr id="1" name=""/>
+        <p:cNvGrpSpPr/>
+        <p:nvPr/>
+      </p:nvGrpSpPr>
+      <p:grpSpPr>
+        <a:xfrm>
+          <a:off x="0" y="0"/>
+          <a:ext cx="0" cy="0"/>
+          <a:chOff x="0" y="0"/>
+          <a:chExt cx="0" cy="0"/>
+        </a:xfrm>
+      </p:grpSpPr>
+    </p:spTree>
+    <p:extLst>
+      <p:ext uri="{BB962C8B-B14F-4D97-AF65-F5344CB8AC3E}">
+        <p14:creationId xmlns:p14="http://schemas.microsoft.com/office/powerpoint/2010/main" val="1987250441"/>
       </p:ext>
     </p:extLst>
   </p:cSld>
@@ -26212,7 +29093,7 @@
 </file>
 
 <file path=ppt/theme/theme2.xml><?xml version="1.0" encoding="utf-8"?>
-<a:theme xmlns:a="http://schemas.openxmlformats.org/drawingml/2006/main" name="Office Theme">
+<a:theme xmlns:a="http://schemas.openxmlformats.org/drawingml/2006/main" name="1_Office Theme">
   <a:themeElements>
     <a:clrScheme name="Office">
       <a:dk1>
@@ -26733,17 +29614,268 @@
 </a:theme>
 </file>
 
-<file path=customXml/item1.xml><?xml version="1.0" encoding="utf-8"?>
-<?mso-contentType ?>
-<customXsn xmlns="http://schemas.microsoft.com/office/2006/metadata/customXsn">
-  <xsnLocation/>
-  <cached>True</cached>
-  <openByDefault>True</openByDefault>
-  <xsnScope>/sites/hpc</xsnScope>
-</customXsn>
+<file path=ppt/theme/theme4.xml><?xml version="1.0" encoding="utf-8"?>
+<a:theme xmlns:a="http://schemas.openxmlformats.org/drawingml/2006/main" name="Office Theme">
+  <a:themeElements>
+    <a:clrScheme name="Office">
+      <a:dk1>
+        <a:sysClr val="windowText" lastClr="000000"/>
+      </a:dk1>
+      <a:lt1>
+        <a:sysClr val="window" lastClr="FFFFFF"/>
+      </a:lt1>
+      <a:dk2>
+        <a:srgbClr val="44546A"/>
+      </a:dk2>
+      <a:lt2>
+        <a:srgbClr val="E7E6E6"/>
+      </a:lt2>
+      <a:accent1>
+        <a:srgbClr val="5B9BD5"/>
+      </a:accent1>
+      <a:accent2>
+        <a:srgbClr val="ED7D31"/>
+      </a:accent2>
+      <a:accent3>
+        <a:srgbClr val="A5A5A5"/>
+      </a:accent3>
+      <a:accent4>
+        <a:srgbClr val="FFC000"/>
+      </a:accent4>
+      <a:accent5>
+        <a:srgbClr val="4472C4"/>
+      </a:accent5>
+      <a:accent6>
+        <a:srgbClr val="70AD47"/>
+      </a:accent6>
+      <a:hlink>
+        <a:srgbClr val="0563C1"/>
+      </a:hlink>
+      <a:folHlink>
+        <a:srgbClr val="954F72"/>
+      </a:folHlink>
+    </a:clrScheme>
+    <a:fontScheme name="Office">
+      <a:majorFont>
+        <a:latin typeface="Calibri Light" panose="020F0302020204030204"/>
+        <a:ea typeface=""/>
+        <a:cs typeface=""/>
+        <a:font script="Jpan" typeface="游ゴシック Light"/>
+        <a:font script="Hang" typeface="맑은 고딕"/>
+        <a:font script="Hans" typeface="等线 Light"/>
+        <a:font script="Hant" typeface="新細明體"/>
+        <a:font script="Arab" typeface="Times New Roman"/>
+        <a:font script="Hebr" typeface="Times New Roman"/>
+        <a:font script="Thai" typeface="Angsana New"/>
+        <a:font script="Ethi" typeface="Nyala"/>
+        <a:font script="Beng" typeface="Vrinda"/>
+        <a:font script="Gujr" typeface="Shruti"/>
+        <a:font script="Khmr" typeface="MoolBoran"/>
+        <a:font script="Knda" typeface="Tunga"/>
+        <a:font script="Guru" typeface="Raavi"/>
+        <a:font script="Cans" typeface="Euphemia"/>
+        <a:font script="Cher" typeface="Plantagenet Cherokee"/>
+        <a:font script="Yiii" typeface="Microsoft Yi Baiti"/>
+        <a:font script="Tibt" typeface="Microsoft Himalaya"/>
+        <a:font script="Thaa" typeface="MV Boli"/>
+        <a:font script="Deva" typeface="Mangal"/>
+        <a:font script="Telu" typeface="Gautami"/>
+        <a:font script="Taml" typeface="Latha"/>
+        <a:font script="Syrc" typeface="Estrangelo Edessa"/>
+        <a:font script="Orya" typeface="Kalinga"/>
+        <a:font script="Mlym" typeface="Kartika"/>
+        <a:font script="Laoo" typeface="DokChampa"/>
+        <a:font script="Sinh" typeface="Iskoola Pota"/>
+        <a:font script="Mong" typeface="Mongolian Baiti"/>
+        <a:font script="Viet" typeface="Times New Roman"/>
+        <a:font script="Uigh" typeface="Microsoft Uighur"/>
+        <a:font script="Geor" typeface="Sylfaen"/>
+      </a:majorFont>
+      <a:minorFont>
+        <a:latin typeface="Calibri" panose="020F0502020204030204"/>
+        <a:ea typeface=""/>
+        <a:cs typeface=""/>
+        <a:font script="Jpan" typeface="游ゴシック"/>
+        <a:font script="Hang" typeface="맑은 고딕"/>
+        <a:font script="Hans" typeface="等线"/>
+        <a:font script="Hant" typeface="新細明體"/>
+        <a:font script="Arab" typeface="Arial"/>
+        <a:font script="Hebr" typeface="Arial"/>
+        <a:font script="Thai" typeface="Cordia New"/>
+        <a:font script="Ethi" typeface="Nyala"/>
+        <a:font script="Beng" typeface="Vrinda"/>
+        <a:font script="Gujr" typeface="Shruti"/>
+        <a:font script="Khmr" typeface="DaunPenh"/>
+        <a:font script="Knda" typeface="Tunga"/>
+        <a:font script="Guru" typeface="Raavi"/>
+        <a:font script="Cans" typeface="Euphemia"/>
+        <a:font script="Cher" typeface="Plantagenet Cherokee"/>
+        <a:font script="Yiii" typeface="Microsoft Yi Baiti"/>
+        <a:font script="Tibt" typeface="Microsoft Himalaya"/>
+        <a:font script="Thaa" typeface="MV Boli"/>
+        <a:font script="Deva" typeface="Mangal"/>
+        <a:font script="Telu" typeface="Gautami"/>
+        <a:font script="Taml" typeface="Latha"/>
+        <a:font script="Syrc" typeface="Estrangelo Edessa"/>
+        <a:font script="Orya" typeface="Kalinga"/>
+        <a:font script="Mlym" typeface="Kartika"/>
+        <a:font script="Laoo" typeface="DokChampa"/>
+        <a:font script="Sinh" typeface="Iskoola Pota"/>
+        <a:font script="Mong" typeface="Mongolian Baiti"/>
+        <a:font script="Viet" typeface="Arial"/>
+        <a:font script="Uigh" typeface="Microsoft Uighur"/>
+        <a:font script="Geor" typeface="Sylfaen"/>
+      </a:minorFont>
+    </a:fontScheme>
+    <a:fmtScheme name="Office">
+      <a:fillStyleLst>
+        <a:solidFill>
+          <a:schemeClr val="phClr"/>
+        </a:solidFill>
+        <a:gradFill rotWithShape="1">
+          <a:gsLst>
+            <a:gs pos="0">
+              <a:schemeClr val="phClr">
+                <a:lumMod val="110000"/>
+                <a:satMod val="105000"/>
+                <a:tint val="67000"/>
+              </a:schemeClr>
+            </a:gs>
+            <a:gs pos="50000">
+              <a:schemeClr val="phClr">
+                <a:lumMod val="105000"/>
+                <a:satMod val="103000"/>
+                <a:tint val="73000"/>
+              </a:schemeClr>
+            </a:gs>
+            <a:gs pos="100000">
+              <a:schemeClr val="phClr">
+                <a:lumMod val="105000"/>
+                <a:satMod val="109000"/>
+                <a:tint val="81000"/>
+              </a:schemeClr>
+            </a:gs>
+          </a:gsLst>
+          <a:lin ang="5400000" scaled="0"/>
+        </a:gradFill>
+        <a:gradFill rotWithShape="1">
+          <a:gsLst>
+            <a:gs pos="0">
+              <a:schemeClr val="phClr">
+                <a:satMod val="103000"/>
+                <a:lumMod val="102000"/>
+                <a:tint val="94000"/>
+              </a:schemeClr>
+            </a:gs>
+            <a:gs pos="50000">
+              <a:schemeClr val="phClr">
+                <a:satMod val="110000"/>
+                <a:lumMod val="100000"/>
+                <a:shade val="100000"/>
+              </a:schemeClr>
+            </a:gs>
+            <a:gs pos="100000">
+              <a:schemeClr val="phClr">
+                <a:lumMod val="99000"/>
+                <a:satMod val="120000"/>
+                <a:shade val="78000"/>
+              </a:schemeClr>
+            </a:gs>
+          </a:gsLst>
+          <a:lin ang="5400000" scaled="0"/>
+        </a:gradFill>
+      </a:fillStyleLst>
+      <a:lnStyleLst>
+        <a:ln w="6350" cap="flat" cmpd="sng" algn="ctr">
+          <a:solidFill>
+            <a:schemeClr val="phClr"/>
+          </a:solidFill>
+          <a:prstDash val="solid"/>
+          <a:miter lim="800000"/>
+        </a:ln>
+        <a:ln w="12700" cap="flat" cmpd="sng" algn="ctr">
+          <a:solidFill>
+            <a:schemeClr val="phClr"/>
+          </a:solidFill>
+          <a:prstDash val="solid"/>
+          <a:miter lim="800000"/>
+        </a:ln>
+        <a:ln w="19050" cap="flat" cmpd="sng" algn="ctr">
+          <a:solidFill>
+            <a:schemeClr val="phClr"/>
+          </a:solidFill>
+          <a:prstDash val="solid"/>
+          <a:miter lim="800000"/>
+        </a:ln>
+      </a:lnStyleLst>
+      <a:effectStyleLst>
+        <a:effectStyle>
+          <a:effectLst/>
+        </a:effectStyle>
+        <a:effectStyle>
+          <a:effectLst/>
+        </a:effectStyle>
+        <a:effectStyle>
+          <a:effectLst>
+            <a:outerShdw blurRad="57150" dist="19050" dir="5400000" algn="ctr" rotWithShape="0">
+              <a:srgbClr val="000000">
+                <a:alpha val="63000"/>
+              </a:srgbClr>
+            </a:outerShdw>
+          </a:effectLst>
+        </a:effectStyle>
+      </a:effectStyleLst>
+      <a:bgFillStyleLst>
+        <a:solidFill>
+          <a:schemeClr val="phClr"/>
+        </a:solidFill>
+        <a:solidFill>
+          <a:schemeClr val="phClr">
+            <a:tint val="95000"/>
+            <a:satMod val="170000"/>
+          </a:schemeClr>
+        </a:solidFill>
+        <a:gradFill rotWithShape="1">
+          <a:gsLst>
+            <a:gs pos="0">
+              <a:schemeClr val="phClr">
+                <a:tint val="93000"/>
+                <a:satMod val="150000"/>
+                <a:shade val="98000"/>
+                <a:lumMod val="102000"/>
+              </a:schemeClr>
+            </a:gs>
+            <a:gs pos="50000">
+              <a:schemeClr val="phClr">
+                <a:tint val="98000"/>
+                <a:satMod val="130000"/>
+                <a:shade val="90000"/>
+                <a:lumMod val="103000"/>
+              </a:schemeClr>
+            </a:gs>
+            <a:gs pos="100000">
+              <a:schemeClr val="phClr">
+                <a:shade val="63000"/>
+                <a:satMod val="120000"/>
+              </a:schemeClr>
+            </a:gs>
+          </a:gsLst>
+          <a:lin ang="5400000" scaled="0"/>
+        </a:gradFill>
+      </a:bgFillStyleLst>
+    </a:fmtScheme>
+  </a:themeElements>
+  <a:objectDefaults/>
+  <a:extraClrSchemeLst/>
+  <a:extLst>
+    <a:ext uri="{05A4C25C-085E-4340-85A3-A5531E510DB2}">
+      <thm15:themeFamily xmlns:thm15="http://schemas.microsoft.com/office/thememl/2012/main" name="Office Theme" id="{62F939B6-93AF-4DB8-9C6B-D6C7DFDC589F}" vid="{4A3C46E8-61CC-4603-A589-7422A47A8E4A}"/>
+    </a:ext>
+  </a:extLst>
+</a:theme>
 </file>
 
-<file path=customXml/item2.xml><?xml version="1.0" encoding="utf-8"?>
+<file path=customXml/item1.xml><?xml version="1.0" encoding="utf-8"?>
 <?mso-contentType ?>
 <spe:Receivers xmlns:spe="http://schemas.microsoft.com/sharepoint/events">
   <Receiver>
@@ -26789,16 +29921,23 @@
 </spe:Receivers>
 </file>
 
+<file path=customXml/item2.xml><?xml version="1.0" encoding="utf-8"?>
+<?mso-contentType ?>
+<customXsn xmlns="http://schemas.microsoft.com/office/2006/metadata/customXsn">
+  <xsnLocation/>
+  <cached>True</cached>
+  <openByDefault>True</openByDefault>
+  <xsnScope>/sites/hpc</xsnScope>
+</customXsn>
+</file>
+
 <file path=customXml/item3.xml><?xml version="1.0" encoding="utf-8"?>
-<p:properties xmlns:p="http://schemas.microsoft.com/office/2006/metadata/properties" xmlns:xsi="http://www.w3.org/2001/XMLSchema-instance" xmlns:pc="http://schemas.microsoft.com/office/infopath/2007/PartnerControls">
-  <documentManagement>
-    <_dlc_DocId xmlns="aff7d12c-bb71-4270-bd29-9c4d45ff3327">346bfafb-41a4-4705-9274-1725a8a4651c</_dlc_DocId>
-    <_dlc_DocIdUrl xmlns="aff7d12c-bb71-4270-bd29-9c4d45ff3327">
-      <Url>https://www.groupware.kuleuven.be/sites/hpc/_layouts/15/DocIdRedir.aspx?ID=346bfafb-41a4-4705-9274-1725a8a4651c</Url>
-      <Description>346bfafb-41a4-4705-9274-1725a8a4651c</Description>
-    </_dlc_DocIdUrl>
-  </documentManagement>
-</p:properties>
+<?mso-contentType ?>
+<FormTemplates xmlns="http://schemas.microsoft.com/sharepoint/v3/contenttype/forms">
+  <Display>DocumentLibraryForm</Display>
+  <Edit>DocumentLibraryForm</Edit>
+  <New>DocumentLibraryForm</New>
+</FormTemplates>
 </file>
 
 <file path=customXml/item4.xml><?xml version="1.0" encoding="utf-8"?>
@@ -26947,15 +30086,26 @@
 </file>
 
 <file path=customXml/item5.xml><?xml version="1.0" encoding="utf-8"?>
-<?mso-contentType ?>
-<FormTemplates xmlns="http://schemas.microsoft.com/sharepoint/v3/contenttype/forms">
-  <Display>DocumentLibraryForm</Display>
-  <Edit>DocumentLibraryForm</Edit>
-  <New>DocumentLibraryForm</New>
-</FormTemplates>
+<p:properties xmlns:p="http://schemas.microsoft.com/office/2006/metadata/properties" xmlns:xsi="http://www.w3.org/2001/XMLSchema-instance" xmlns:pc="http://schemas.microsoft.com/office/infopath/2007/PartnerControls">
+  <documentManagement>
+    <_dlc_DocId xmlns="aff7d12c-bb71-4270-bd29-9c4d45ff3327">346bfafb-41a4-4705-9274-1725a8a4651c</_dlc_DocId>
+    <_dlc_DocIdUrl xmlns="aff7d12c-bb71-4270-bd29-9c4d45ff3327">
+      <Url>https://www.groupware.kuleuven.be/sites/hpc/_layouts/15/DocIdRedir.aspx?ID=346bfafb-41a4-4705-9274-1725a8a4651c</Url>
+      <Description>346bfafb-41a4-4705-9274-1725a8a4651c</Description>
+    </_dlc_DocIdUrl>
+  </documentManagement>
+</p:properties>
 </file>
 
 <file path=customXml/itemProps1.xml><?xml version="1.0" encoding="utf-8"?>
+<ds:datastoreItem xmlns:ds="http://schemas.openxmlformats.org/officeDocument/2006/customXml" ds:itemID="{7732E273-8A47-4E01-AC36-8FF8A6317757}">
+  <ds:schemaRefs>
+    <ds:schemaRef ds:uri="http://schemas.microsoft.com/sharepoint/events"/>
+  </ds:schemaRefs>
+</ds:datastoreItem>
+</file>
+
+<file path=customXml/itemProps2.xml><?xml version="1.0" encoding="utf-8"?>
 <ds:datastoreItem xmlns:ds="http://schemas.openxmlformats.org/officeDocument/2006/customXml" ds:itemID="{F0EF99C1-AFFA-4072-A3F6-6A9C90E28E63}">
   <ds:schemaRefs>
     <ds:schemaRef ds:uri="http://schemas.microsoft.com/office/2006/metadata/customXsn"/>
@@ -26963,26 +30113,10 @@
 </ds:datastoreItem>
 </file>
 
-<file path=customXml/itemProps2.xml><?xml version="1.0" encoding="utf-8"?>
-<ds:datastoreItem xmlns:ds="http://schemas.openxmlformats.org/officeDocument/2006/customXml" ds:itemID="{7732E273-8A47-4E01-AC36-8FF8A6317757}">
+<file path=customXml/itemProps3.xml><?xml version="1.0" encoding="utf-8"?>
+<ds:datastoreItem xmlns:ds="http://schemas.openxmlformats.org/officeDocument/2006/customXml" ds:itemID="{564EE3F2-D13D-4835-816B-74B5A421851B}">
   <ds:schemaRefs>
-    <ds:schemaRef ds:uri="http://schemas.microsoft.com/sharepoint/events"/>
-  </ds:schemaRefs>
-</ds:datastoreItem>
-</file>
-
-<file path=customXml/itemProps3.xml><?xml version="1.0" encoding="utf-8"?>
-<ds:datastoreItem xmlns:ds="http://schemas.openxmlformats.org/officeDocument/2006/customXml" ds:itemID="{F0D56244-60B2-41FD-96AD-7AC25F221D7C}">
-  <ds:schemaRefs>
-    <ds:schemaRef ds:uri="http://purl.org/dc/elements/1.1/"/>
-    <ds:schemaRef ds:uri="http://purl.org/dc/terms/"/>
-    <ds:schemaRef ds:uri="http://schemas.microsoft.com/office/2006/documentManagement/types"/>
-    <ds:schemaRef ds:uri="http://purl.org/dc/dcmitype/"/>
-    <ds:schemaRef ds:uri="http://schemas.microsoft.com/office/infopath/2007/PartnerControls"/>
-    <ds:schemaRef ds:uri="aff7d12c-bb71-4270-bd29-9c4d45ff3327"/>
-    <ds:schemaRef ds:uri="http://schemas.openxmlformats.org/package/2006/metadata/core-properties"/>
-    <ds:schemaRef ds:uri="http://schemas.microsoft.com/office/2006/metadata/properties"/>
-    <ds:schemaRef ds:uri="http://www.w3.org/XML/1998/namespace"/>
+    <ds:schemaRef ds:uri="http://schemas.microsoft.com/sharepoint/v3/contenttype/forms"/>
   </ds:schemaRefs>
 </ds:datastoreItem>
 </file>
@@ -27006,9 +30140,17 @@
 </file>
 
 <file path=customXml/itemProps5.xml><?xml version="1.0" encoding="utf-8"?>
-<ds:datastoreItem xmlns:ds="http://schemas.openxmlformats.org/officeDocument/2006/customXml" ds:itemID="{564EE3F2-D13D-4835-816B-74B5A421851B}">
+<ds:datastoreItem xmlns:ds="http://schemas.openxmlformats.org/officeDocument/2006/customXml" ds:itemID="{F0D56244-60B2-41FD-96AD-7AC25F221D7C}">
   <ds:schemaRefs>
-    <ds:schemaRef ds:uri="http://schemas.microsoft.com/sharepoint/v3/contenttype/forms"/>
+    <ds:schemaRef ds:uri="http://purl.org/dc/elements/1.1/"/>
+    <ds:schemaRef ds:uri="http://purl.org/dc/terms/"/>
+    <ds:schemaRef ds:uri="http://schemas.microsoft.com/office/2006/documentManagement/types"/>
+    <ds:schemaRef ds:uri="http://purl.org/dc/dcmitype/"/>
+    <ds:schemaRef ds:uri="http://schemas.microsoft.com/office/infopath/2007/PartnerControls"/>
+    <ds:schemaRef ds:uri="aff7d12c-bb71-4270-bd29-9c4d45ff3327"/>
+    <ds:schemaRef ds:uri="http://schemas.openxmlformats.org/package/2006/metadata/core-properties"/>
+    <ds:schemaRef ds:uri="http://schemas.microsoft.com/office/2006/metadata/properties"/>
+    <ds:schemaRef ds:uri="http://www.w3.org/XML/1998/namespace"/>
   </ds:schemaRefs>
 </ds:datastoreItem>
 </file>
</xml_diff>

<commit_message>
The .snapshot comment added
</commit_message>
<xml_diff>
--- a/VSCintro-demo.pptx
+++ b/VSCintro-demo.pptx
@@ -221,7 +221,7 @@
           <a:p>
             <a:fld id="{01F519A0-78CB-4E85-BDD7-0175329041AC}" type="datetimeFigureOut">
               <a:rPr lang="en-US" smtClean="0"/>
-              <a:t>6/14/2021</a:t>
+              <a:t>4/5/2022</a:t>
             </a:fld>
             <a:endParaRPr lang="en-US"/>
           </a:p>
@@ -387,7 +387,7 @@
           <a:p>
             <a:fld id="{337BDF4F-FAE4-4E7A-B003-7AAF79F14F3C}" type="datetimeFigureOut">
               <a:rPr lang="en-US" smtClean="0"/>
-              <a:t>6/14/2021</a:t>
+              <a:t>4/5/2022</a:t>
             </a:fld>
             <a:endParaRPr lang="en-US"/>
           </a:p>
@@ -852,7 +852,7 @@
           <a:p>
             <a:fld id="{12D417FB-DB75-4510-8AD7-5416595AADD8}" type="datetime1">
               <a:rPr lang="en-US" smtClean="0"/>
-              <a:t>6/14/2021</a:t>
+              <a:t>4/5/2022</a:t>
             </a:fld>
             <a:endParaRPr lang="en-US"/>
           </a:p>
@@ -1397,7 +1397,7 @@
           <a:p>
             <a:fld id="{1C565815-05F0-455F-BBD6-9680ABD9D1CB}" type="datetimeFigureOut">
               <a:rPr lang="en-US" smtClean="0"/>
-              <a:t>6/14/2021</a:t>
+              <a:t>4/5/2022</a:t>
             </a:fld>
             <a:endParaRPr lang="en-US"/>
           </a:p>
@@ -1761,7 +1761,7 @@
           <a:p>
             <a:fld id="{1C565815-05F0-455F-BBD6-9680ABD9D1CB}" type="datetimeFigureOut">
               <a:rPr lang="en-US" smtClean="0"/>
-              <a:t>6/14/2021</a:t>
+              <a:t>4/5/2022</a:t>
             </a:fld>
             <a:endParaRPr lang="en-US"/>
           </a:p>
@@ -1878,7 +1878,7 @@
           <a:p>
             <a:fld id="{1C565815-05F0-455F-BBD6-9680ABD9D1CB}" type="datetimeFigureOut">
               <a:rPr lang="en-US" smtClean="0"/>
-              <a:t>6/14/2021</a:t>
+              <a:t>4/5/2022</a:t>
             </a:fld>
             <a:endParaRPr lang="en-US"/>
           </a:p>
@@ -1973,7 +1973,7 @@
           <a:p>
             <a:fld id="{1C565815-05F0-455F-BBD6-9680ABD9D1CB}" type="datetimeFigureOut">
               <a:rPr lang="en-US" smtClean="0"/>
-              <a:t>6/14/2021</a:t>
+              <a:t>4/5/2022</a:t>
             </a:fld>
             <a:endParaRPr lang="en-US"/>
           </a:p>
@@ -2248,7 +2248,7 @@
           <a:p>
             <a:fld id="{1C565815-05F0-455F-BBD6-9680ABD9D1CB}" type="datetimeFigureOut">
               <a:rPr lang="en-US" smtClean="0"/>
-              <a:t>6/14/2021</a:t>
+              <a:t>4/5/2022</a:t>
             </a:fld>
             <a:endParaRPr lang="en-US"/>
           </a:p>
@@ -2500,7 +2500,7 @@
           <a:p>
             <a:fld id="{1C565815-05F0-455F-BBD6-9680ABD9D1CB}" type="datetimeFigureOut">
               <a:rPr lang="en-US" smtClean="0"/>
-              <a:t>6/14/2021</a:t>
+              <a:t>4/5/2022</a:t>
             </a:fld>
             <a:endParaRPr lang="en-US"/>
           </a:p>
@@ -2668,7 +2668,7 @@
           <a:p>
             <a:fld id="{1C565815-05F0-455F-BBD6-9680ABD9D1CB}" type="datetimeFigureOut">
               <a:rPr lang="en-US" smtClean="0"/>
-              <a:t>6/14/2021</a:t>
+              <a:t>4/5/2022</a:t>
             </a:fld>
             <a:endParaRPr lang="en-US"/>
           </a:p>
@@ -2846,7 +2846,7 @@
           <a:p>
             <a:fld id="{1C565815-05F0-455F-BBD6-9680ABD9D1CB}" type="datetimeFigureOut">
               <a:rPr lang="en-US" smtClean="0"/>
-              <a:t>6/14/2021</a:t>
+              <a:t>4/5/2022</a:t>
             </a:fld>
             <a:endParaRPr lang="en-US"/>
           </a:p>
@@ -3653,7 +3653,7 @@
           <a:p>
             <a:fld id="{A1FA2290-0477-46BB-87A2-28AB474124F3}" type="datetime1">
               <a:rPr lang="nl-BE" smtClean="0"/>
-              <a:t>14/06/2021</a:t>
+              <a:t>5/04/2022</a:t>
             </a:fld>
             <a:endParaRPr lang="nl-BE" dirty="0"/>
           </a:p>
@@ -3919,7 +3919,7 @@
           <a:p>
             <a:fld id="{1C565815-05F0-455F-BBD6-9680ABD9D1CB}" type="datetimeFigureOut">
               <a:rPr lang="en-US" smtClean="0"/>
-              <a:t>6/14/2021</a:t>
+              <a:t>4/5/2022</a:t>
             </a:fld>
             <a:endParaRPr lang="en-US"/>
           </a:p>
@@ -4117,7 +4117,7 @@
           <a:p>
             <a:fld id="{1C565815-05F0-455F-BBD6-9680ABD9D1CB}" type="datetimeFigureOut">
               <a:rPr lang="en-US" smtClean="0"/>
-              <a:t>6/14/2021</a:t>
+              <a:t>4/5/2022</a:t>
             </a:fld>
             <a:endParaRPr lang="en-US"/>
           </a:p>
@@ -4362,7 +4362,7 @@
           <a:p>
             <a:fld id="{1C565815-05F0-455F-BBD6-9680ABD9D1CB}" type="datetimeFigureOut">
               <a:rPr lang="en-US" smtClean="0"/>
-              <a:t>6/14/2021</a:t>
+              <a:t>4/5/2022</a:t>
             </a:fld>
             <a:endParaRPr lang="en-US"/>
           </a:p>
@@ -5202,7 +5202,7 @@
           <a:p>
             <a:fld id="{1C565815-05F0-455F-BBD6-9680ABD9D1CB}" type="datetimeFigureOut">
               <a:rPr lang="en-US" smtClean="0"/>
-              <a:t>6/14/2021</a:t>
+              <a:t>4/5/2022</a:t>
             </a:fld>
             <a:endParaRPr lang="en-US"/>
           </a:p>
@@ -5950,7 +5950,7 @@
         <p:spPr>
           <a:xfrm>
             <a:off x="524691" y="1620000"/>
-            <a:ext cx="11112000" cy="4428000"/>
+            <a:ext cx="11112000" cy="4185714"/>
           </a:xfrm>
         </p:spPr>
         <p:txBody>
@@ -5974,7 +5974,9 @@
                 <a:solidFill>
                   <a:srgbClr val="4E5865"/>
                 </a:solidFill>
+                <a:latin typeface="Courier New" panose="02070309020205020404" pitchFamily="49" charset="0"/>
                 <a:ea typeface="新細明體" panose="02020500000000000000" pitchFamily="18" charset="-120"/>
+                <a:cs typeface="Courier New" panose="02070309020205020404" pitchFamily="49" charset="0"/>
               </a:rPr>
               <a:t>lp_hpcinfo_training</a:t>
             </a:r>
@@ -5983,15 +5985,95 @@
                 <a:solidFill>
                   <a:srgbClr val="4E5865"/>
                 </a:solidFill>
+                <a:latin typeface="Courier New" panose="02070309020205020404" pitchFamily="49" charset="0"/>
                 <a:ea typeface="新細明體" panose="02020500000000000000" pitchFamily="18" charset="-120"/>
-              </a:rPr>
-              <a:t> group (account.vscentrum.be)</a:t>
+                <a:cs typeface="Courier New" panose="02070309020205020404" pitchFamily="49" charset="0"/>
+              </a:rPr>
+              <a:t> </a:t>
+            </a:r>
+            <a:r>
+              <a:rPr lang="en-US" altLang="zh-TW" sz="2400">
+                <a:solidFill>
+                  <a:srgbClr val="4E5865"/>
+                </a:solidFill>
+                <a:ea typeface="新細明體" panose="02020500000000000000" pitchFamily="18" charset="-120"/>
+              </a:rPr>
+              <a:t>group (Browse </a:t>
+            </a:r>
+            <a:r>
+              <a:rPr lang="en-US" altLang="zh-TW" sz="2400" dirty="0">
+                <a:solidFill>
+                  <a:srgbClr val="4E5865"/>
+                </a:solidFill>
+                <a:ea typeface="新細明體" panose="02020500000000000000" pitchFamily="18" charset="-120"/>
+              </a:rPr>
+              <a:t>to </a:t>
+            </a:r>
+            <a:r>
+              <a:rPr lang="en-US" altLang="zh-TW" sz="2400" dirty="0">
+                <a:solidFill>
+                  <a:srgbClr val="4E5865"/>
+                </a:solidFill>
+                <a:ea typeface="新細明體" panose="02020500000000000000" pitchFamily="18" charset="-120"/>
+                <a:hlinkClick r:id="rId2"/>
+              </a:rPr>
+              <a:t>www.account.vscentrum.be</a:t>
+            </a:r>
+            <a:r>
+              <a:rPr lang="en-US" altLang="zh-TW" sz="2400" dirty="0">
+                <a:solidFill>
+                  <a:srgbClr val="4E5865"/>
+                </a:solidFill>
+                <a:ea typeface="新細明體" panose="02020500000000000000" pitchFamily="18" charset="-120"/>
+              </a:rPr>
+              <a:t> )</a:t>
             </a:r>
           </a:p>
           <a:p>
             <a:pPr marL="914400" lvl="2" indent="0">
               <a:buNone/>
             </a:pPr>
+            <a:r>
+              <a:rPr lang="en-US" altLang="zh-TW" sz="2400" dirty="0">
+                <a:solidFill>
+                  <a:srgbClr val="4E5865"/>
+                </a:solidFill>
+                <a:ea typeface="新細明體" panose="02020500000000000000" pitchFamily="18" charset="-120"/>
+              </a:rPr>
+              <a:t>Login with putty</a:t>
+            </a:r>
+          </a:p>
+          <a:p>
+            <a:pPr marL="914400" lvl="2" indent="0">
+              <a:buNone/>
+            </a:pPr>
+            <a:r>
+              <a:rPr lang="en-US" altLang="zh-TW" sz="2400" dirty="0" err="1">
+                <a:solidFill>
+                  <a:srgbClr val="4E5865"/>
+                </a:solidFill>
+                <a:ea typeface="新細明體" panose="02020500000000000000" pitchFamily="18" charset="-120"/>
+              </a:rPr>
+              <a:t>Filetransfer</a:t>
+            </a:r>
+            <a:r>
+              <a:rPr lang="en-US" altLang="zh-TW" sz="2400" dirty="0">
+                <a:solidFill>
+                  <a:srgbClr val="4E5865"/>
+                </a:solidFill>
+                <a:ea typeface="新細明體" panose="02020500000000000000" pitchFamily="18" charset="-120"/>
+              </a:rPr>
+              <a:t> with </a:t>
+            </a:r>
+            <a:r>
+              <a:rPr lang="en-US" altLang="zh-TW" sz="2400" dirty="0" err="1">
+                <a:solidFill>
+                  <a:srgbClr val="4E5865"/>
+                </a:solidFill>
+                <a:ea typeface="新細明體" panose="02020500000000000000" pitchFamily="18" charset="-120"/>
+              </a:rPr>
+              <a:t>Filezilla</a:t>
+            </a:r>
             <a:endParaRPr lang="en-US" altLang="zh-TW" sz="2400" dirty="0">
               <a:solidFill>
                 <a:srgbClr val="4E5865"/>
@@ -6010,7 +6092,7 @@
                 </a:solidFill>
                 <a:ea typeface="新細明體" panose="02020500000000000000" pitchFamily="18" charset="-120"/>
               </a:rPr>
-              <a:t>Login with putty</a:t>
+              <a:t>Login with NX</a:t>
             </a:r>
           </a:p>
           <a:p>
@@ -6018,38 +6100,14 @@
               <a:buNone/>
             </a:pPr>
             <a:r>
-              <a:rPr lang="en-US" altLang="zh-TW" sz="2400" dirty="0" err="1">
+              <a:rPr lang="en-US" altLang="zh-TW" sz="2400" dirty="0">
                 <a:solidFill>
                   <a:srgbClr val="4E5865"/>
                 </a:solidFill>
                 <a:ea typeface="新細明體" panose="02020500000000000000" pitchFamily="18" charset="-120"/>
               </a:rPr>
-              <a:t>Filetransfer</a:t>
-            </a:r>
-            <a:r>
-              <a:rPr lang="en-US" altLang="zh-TW" sz="2400" dirty="0">
-                <a:solidFill>
-                  <a:srgbClr val="4E5865"/>
-                </a:solidFill>
-                <a:ea typeface="新細明體" panose="02020500000000000000" pitchFamily="18" charset="-120"/>
-              </a:rPr>
-              <a:t> with </a:t>
-            </a:r>
-            <a:r>
-              <a:rPr lang="en-US" altLang="zh-TW" sz="2400" dirty="0" err="1">
-                <a:solidFill>
-                  <a:srgbClr val="4E5865"/>
-                </a:solidFill>
-                <a:ea typeface="新細明體" panose="02020500000000000000" pitchFamily="18" charset="-120"/>
-              </a:rPr>
-              <a:t>Filezilla</a:t>
-            </a:r>
-            <a:endParaRPr lang="en-US" altLang="zh-TW" sz="2400" dirty="0">
-              <a:solidFill>
-                <a:srgbClr val="4E5865"/>
-              </a:solidFill>
-              <a:ea typeface="新細明體" panose="02020500000000000000" pitchFamily="18" charset="-120"/>
-            </a:endParaRPr>
+              <a:t>Check disk quota</a:t>
+            </a:r>
           </a:p>
           <a:p>
             <a:pPr marL="914400" lvl="2" indent="0">
@@ -6062,7 +6120,7 @@
                 </a:solidFill>
                 <a:ea typeface="新細明體" panose="02020500000000000000" pitchFamily="18" charset="-120"/>
               </a:rPr>
-              <a:t>Login with NX</a:t>
+              <a:t>Check the credits</a:t>
             </a:r>
           </a:p>
           <a:p>
@@ -6076,21 +6134,18 @@
                 </a:solidFill>
                 <a:ea typeface="新細明體" panose="02020500000000000000" pitchFamily="18" charset="-120"/>
               </a:rPr>
-              <a:t>Check disk quota</a:t>
-            </a:r>
-          </a:p>
-          <a:p>
-            <a:pPr marL="914400" lvl="2" indent="0">
-              <a:buNone/>
-            </a:pPr>
+              <a:t>Restoring files from </a:t>
+            </a:r>
             <a:r>
               <a:rPr lang="en-US" altLang="zh-TW" sz="2400" dirty="0">
                 <a:solidFill>
                   <a:srgbClr val="4E5865"/>
                 </a:solidFill>
+                <a:latin typeface="Courier New" panose="02070309020205020404" pitchFamily="49" charset="0"/>
                 <a:ea typeface="新細明體" panose="02020500000000000000" pitchFamily="18" charset="-120"/>
-              </a:rPr>
-              <a:t>Check the credits</a:t>
+                <a:cs typeface="Courier New" panose="02070309020205020404" pitchFamily="49" charset="0"/>
+              </a:rPr>
+              <a:t>.snapshot</a:t>
             </a:r>
           </a:p>
           <a:p>
@@ -8272,6 +8327,355 @@
         <p:spPr bwMode="auto">
           <a:xfrm>
             <a:off x="1086903" y="4019594"/>
+            <a:ext cx="214397" cy="216632"/>
+          </a:xfrm>
+          <a:custGeom>
+            <a:avLst/>
+            <a:gdLst>
+              <a:gd name="T0" fmla="*/ 135 w 145"/>
+              <a:gd name="T1" fmla="*/ 37 h 146"/>
+              <a:gd name="T2" fmla="*/ 145 w 145"/>
+              <a:gd name="T3" fmla="*/ 73 h 146"/>
+              <a:gd name="T4" fmla="*/ 135 w 145"/>
+              <a:gd name="T5" fmla="*/ 109 h 146"/>
+              <a:gd name="T6" fmla="*/ 109 w 145"/>
+              <a:gd name="T7" fmla="*/ 136 h 146"/>
+              <a:gd name="T8" fmla="*/ 72 w 145"/>
+              <a:gd name="T9" fmla="*/ 146 h 146"/>
+              <a:gd name="T10" fmla="*/ 36 w 145"/>
+              <a:gd name="T11" fmla="*/ 136 h 146"/>
+              <a:gd name="T12" fmla="*/ 9 w 145"/>
+              <a:gd name="T13" fmla="*/ 109 h 146"/>
+              <a:gd name="T14" fmla="*/ 0 w 145"/>
+              <a:gd name="T15" fmla="*/ 73 h 146"/>
+              <a:gd name="T16" fmla="*/ 9 w 145"/>
+              <a:gd name="T17" fmla="*/ 37 h 146"/>
+              <a:gd name="T18" fmla="*/ 36 w 145"/>
+              <a:gd name="T19" fmla="*/ 10 h 146"/>
+              <a:gd name="T20" fmla="*/ 72 w 145"/>
+              <a:gd name="T21" fmla="*/ 0 h 146"/>
+              <a:gd name="T22" fmla="*/ 109 w 145"/>
+              <a:gd name="T23" fmla="*/ 10 h 146"/>
+              <a:gd name="T24" fmla="*/ 135 w 145"/>
+              <a:gd name="T25" fmla="*/ 37 h 146"/>
+              <a:gd name="T26" fmla="*/ 121 w 145"/>
+              <a:gd name="T27" fmla="*/ 58 h 146"/>
+              <a:gd name="T28" fmla="*/ 119 w 145"/>
+              <a:gd name="T29" fmla="*/ 53 h 146"/>
+              <a:gd name="T30" fmla="*/ 111 w 145"/>
+              <a:gd name="T31" fmla="*/ 45 h 146"/>
+              <a:gd name="T32" fmla="*/ 107 w 145"/>
+              <a:gd name="T33" fmla="*/ 43 h 146"/>
+              <a:gd name="T34" fmla="*/ 102 w 145"/>
+              <a:gd name="T35" fmla="*/ 45 h 146"/>
+              <a:gd name="T36" fmla="*/ 64 w 145"/>
+              <a:gd name="T37" fmla="*/ 83 h 146"/>
+              <a:gd name="T38" fmla="*/ 42 w 145"/>
+              <a:gd name="T39" fmla="*/ 62 h 146"/>
+              <a:gd name="T40" fmla="*/ 38 w 145"/>
+              <a:gd name="T41" fmla="*/ 60 h 146"/>
+              <a:gd name="T42" fmla="*/ 34 w 145"/>
+              <a:gd name="T43" fmla="*/ 62 h 146"/>
+              <a:gd name="T44" fmla="*/ 25 w 145"/>
+              <a:gd name="T45" fmla="*/ 70 h 146"/>
+              <a:gd name="T46" fmla="*/ 24 w 145"/>
+              <a:gd name="T47" fmla="*/ 75 h 146"/>
+              <a:gd name="T48" fmla="*/ 25 w 145"/>
+              <a:gd name="T49" fmla="*/ 79 h 146"/>
+              <a:gd name="T50" fmla="*/ 59 w 145"/>
+              <a:gd name="T51" fmla="*/ 113 h 146"/>
+              <a:gd name="T52" fmla="*/ 64 w 145"/>
+              <a:gd name="T53" fmla="*/ 115 h 146"/>
+              <a:gd name="T54" fmla="*/ 68 w 145"/>
+              <a:gd name="T55" fmla="*/ 113 h 146"/>
+              <a:gd name="T56" fmla="*/ 119 w 145"/>
+              <a:gd name="T57" fmla="*/ 62 h 146"/>
+              <a:gd name="T58" fmla="*/ 121 w 145"/>
+              <a:gd name="T59" fmla="*/ 58 h 146"/>
+            </a:gdLst>
+            <a:ahLst/>
+            <a:cxnLst>
+              <a:cxn ang="0">
+                <a:pos x="T0" y="T1"/>
+              </a:cxn>
+              <a:cxn ang="0">
+                <a:pos x="T2" y="T3"/>
+              </a:cxn>
+              <a:cxn ang="0">
+                <a:pos x="T4" y="T5"/>
+              </a:cxn>
+              <a:cxn ang="0">
+                <a:pos x="T6" y="T7"/>
+              </a:cxn>
+              <a:cxn ang="0">
+                <a:pos x="T8" y="T9"/>
+              </a:cxn>
+              <a:cxn ang="0">
+                <a:pos x="T10" y="T11"/>
+              </a:cxn>
+              <a:cxn ang="0">
+                <a:pos x="T12" y="T13"/>
+              </a:cxn>
+              <a:cxn ang="0">
+                <a:pos x="T14" y="T15"/>
+              </a:cxn>
+              <a:cxn ang="0">
+                <a:pos x="T16" y="T17"/>
+              </a:cxn>
+              <a:cxn ang="0">
+                <a:pos x="T18" y="T19"/>
+              </a:cxn>
+              <a:cxn ang="0">
+                <a:pos x="T20" y="T21"/>
+              </a:cxn>
+              <a:cxn ang="0">
+                <a:pos x="T22" y="T23"/>
+              </a:cxn>
+              <a:cxn ang="0">
+                <a:pos x="T24" y="T25"/>
+              </a:cxn>
+              <a:cxn ang="0">
+                <a:pos x="T26" y="T27"/>
+              </a:cxn>
+              <a:cxn ang="0">
+                <a:pos x="T28" y="T29"/>
+              </a:cxn>
+              <a:cxn ang="0">
+                <a:pos x="T30" y="T31"/>
+              </a:cxn>
+              <a:cxn ang="0">
+                <a:pos x="T32" y="T33"/>
+              </a:cxn>
+              <a:cxn ang="0">
+                <a:pos x="T34" y="T35"/>
+              </a:cxn>
+              <a:cxn ang="0">
+                <a:pos x="T36" y="T37"/>
+              </a:cxn>
+              <a:cxn ang="0">
+                <a:pos x="T38" y="T39"/>
+              </a:cxn>
+              <a:cxn ang="0">
+                <a:pos x="T40" y="T41"/>
+              </a:cxn>
+              <a:cxn ang="0">
+                <a:pos x="T42" y="T43"/>
+              </a:cxn>
+              <a:cxn ang="0">
+                <a:pos x="T44" y="T45"/>
+              </a:cxn>
+              <a:cxn ang="0">
+                <a:pos x="T46" y="T47"/>
+              </a:cxn>
+              <a:cxn ang="0">
+                <a:pos x="T48" y="T49"/>
+              </a:cxn>
+              <a:cxn ang="0">
+                <a:pos x="T50" y="T51"/>
+              </a:cxn>
+              <a:cxn ang="0">
+                <a:pos x="T52" y="T53"/>
+              </a:cxn>
+              <a:cxn ang="0">
+                <a:pos x="T54" y="T55"/>
+              </a:cxn>
+              <a:cxn ang="0">
+                <a:pos x="T56" y="T57"/>
+              </a:cxn>
+              <a:cxn ang="0">
+                <a:pos x="T58" y="T59"/>
+              </a:cxn>
+            </a:cxnLst>
+            <a:rect l="0" t="0" r="r" b="b"/>
+            <a:pathLst>
+              <a:path w="145" h="146">
+                <a:moveTo>
+                  <a:pt x="135" y="37"/>
+                </a:moveTo>
+                <a:cubicBezTo>
+                  <a:pt x="142" y="48"/>
+                  <a:pt x="145" y="60"/>
+                  <a:pt x="145" y="73"/>
+                </a:cubicBezTo>
+                <a:cubicBezTo>
+                  <a:pt x="145" y="86"/>
+                  <a:pt x="142" y="98"/>
+                  <a:pt x="135" y="109"/>
+                </a:cubicBezTo>
+                <a:cubicBezTo>
+                  <a:pt x="129" y="121"/>
+                  <a:pt x="120" y="129"/>
+                  <a:pt x="109" y="136"/>
+                </a:cubicBezTo>
+                <a:cubicBezTo>
+                  <a:pt x="98" y="142"/>
+                  <a:pt x="85" y="146"/>
+                  <a:pt x="72" y="146"/>
+                </a:cubicBezTo>
+                <a:cubicBezTo>
+                  <a:pt x="59" y="146"/>
+                  <a:pt x="47" y="142"/>
+                  <a:pt x="36" y="136"/>
+                </a:cubicBezTo>
+                <a:cubicBezTo>
+                  <a:pt x="25" y="129"/>
+                  <a:pt x="16" y="121"/>
+                  <a:pt x="9" y="109"/>
+                </a:cubicBezTo>
+                <a:cubicBezTo>
+                  <a:pt x="3" y="98"/>
+                  <a:pt x="0" y="86"/>
+                  <a:pt x="0" y="73"/>
+                </a:cubicBezTo>
+                <a:cubicBezTo>
+                  <a:pt x="0" y="60"/>
+                  <a:pt x="3" y="48"/>
+                  <a:pt x="9" y="37"/>
+                </a:cubicBezTo>
+                <a:cubicBezTo>
+                  <a:pt x="16" y="25"/>
+                  <a:pt x="25" y="17"/>
+                  <a:pt x="36" y="10"/>
+                </a:cubicBezTo>
+                <a:cubicBezTo>
+                  <a:pt x="47" y="4"/>
+                  <a:pt x="59" y="0"/>
+                  <a:pt x="72" y="0"/>
+                </a:cubicBezTo>
+                <a:cubicBezTo>
+                  <a:pt x="85" y="0"/>
+                  <a:pt x="98" y="4"/>
+                  <a:pt x="109" y="10"/>
+                </a:cubicBezTo>
+                <a:cubicBezTo>
+                  <a:pt x="120" y="17"/>
+                  <a:pt x="129" y="25"/>
+                  <a:pt x="135" y="37"/>
+                </a:cubicBezTo>
+                <a:close/>
+                <a:moveTo>
+                  <a:pt x="121" y="58"/>
+                </a:moveTo>
+                <a:cubicBezTo>
+                  <a:pt x="121" y="56"/>
+                  <a:pt x="121" y="54"/>
+                  <a:pt x="119" y="53"/>
+                </a:cubicBezTo>
+                <a:cubicBezTo>
+                  <a:pt x="111" y="45"/>
+                  <a:pt x="111" y="45"/>
+                  <a:pt x="111" y="45"/>
+                </a:cubicBezTo>
+                <a:cubicBezTo>
+                  <a:pt x="110" y="44"/>
+                  <a:pt x="108" y="43"/>
+                  <a:pt x="107" y="43"/>
+                </a:cubicBezTo>
+                <a:cubicBezTo>
+                  <a:pt x="105" y="43"/>
+                  <a:pt x="103" y="44"/>
+                  <a:pt x="102" y="45"/>
+                </a:cubicBezTo>
+                <a:cubicBezTo>
+                  <a:pt x="64" y="83"/>
+                  <a:pt x="64" y="83"/>
+                  <a:pt x="64" y="83"/>
+                </a:cubicBezTo>
+                <a:cubicBezTo>
+                  <a:pt x="42" y="62"/>
+                  <a:pt x="42" y="62"/>
+                  <a:pt x="42" y="62"/>
+                </a:cubicBezTo>
+                <a:cubicBezTo>
+                  <a:pt x="41" y="61"/>
+                  <a:pt x="40" y="60"/>
+                  <a:pt x="38" y="60"/>
+                </a:cubicBezTo>
+                <a:cubicBezTo>
+                  <a:pt x="36" y="60"/>
+                  <a:pt x="35" y="61"/>
+                  <a:pt x="34" y="62"/>
+                </a:cubicBezTo>
+                <a:cubicBezTo>
+                  <a:pt x="25" y="70"/>
+                  <a:pt x="25" y="70"/>
+                  <a:pt x="25" y="70"/>
+                </a:cubicBezTo>
+                <a:cubicBezTo>
+                  <a:pt x="24" y="72"/>
+                  <a:pt x="24" y="73"/>
+                  <a:pt x="24" y="75"/>
+                </a:cubicBezTo>
+                <a:cubicBezTo>
+                  <a:pt x="24" y="76"/>
+                  <a:pt x="24" y="78"/>
+                  <a:pt x="25" y="79"/>
+                </a:cubicBezTo>
+                <a:cubicBezTo>
+                  <a:pt x="59" y="113"/>
+                  <a:pt x="59" y="113"/>
+                  <a:pt x="59" y="113"/>
+                </a:cubicBezTo>
+                <a:cubicBezTo>
+                  <a:pt x="61" y="114"/>
+                  <a:pt x="62" y="115"/>
+                  <a:pt x="64" y="115"/>
+                </a:cubicBezTo>
+                <a:cubicBezTo>
+                  <a:pt x="65" y="115"/>
+                  <a:pt x="67" y="114"/>
+                  <a:pt x="68" y="113"/>
+                </a:cubicBezTo>
+                <a:cubicBezTo>
+                  <a:pt x="119" y="62"/>
+                  <a:pt x="119" y="62"/>
+                  <a:pt x="119" y="62"/>
+                </a:cubicBezTo>
+                <a:cubicBezTo>
+                  <a:pt x="121" y="61"/>
+                  <a:pt x="121" y="59"/>
+                  <a:pt x="121" y="58"/>
+                </a:cubicBezTo>
+                <a:close/>
+              </a:path>
+            </a:pathLst>
+          </a:custGeom>
+          <a:solidFill>
+            <a:schemeClr val="accent5"/>
+          </a:solidFill>
+          <a:ln>
+            <a:noFill/>
+          </a:ln>
+        </p:spPr>
+        <p:txBody>
+          <a:bodyPr vert="horz" wrap="square" lIns="91440" tIns="45720" rIns="91440" bIns="45720" numCol="1" anchor="t" anchorCtr="0" compatLnSpc="1">
+            <a:prstTxWarp prst="textNoShape">
+              <a:avLst/>
+            </a:prstTxWarp>
+          </a:bodyPr>
+          <a:lstStyle/>
+          <a:p>
+            <a:endParaRPr lang="en-US" dirty="0"/>
+          </a:p>
+        </p:txBody>
+      </p:sp>
+      <p:sp>
+        <p:nvSpPr>
+          <p:cNvPr id="13" name="Freeform 88">
+            <a:extLst>
+              <a:ext uri="{FF2B5EF4-FFF2-40B4-BE49-F238E27FC236}">
+                <a16:creationId xmlns:a16="http://schemas.microsoft.com/office/drawing/2014/main" id="{4E9C1D15-FF72-4CC6-B39A-E98DCBF6A1D6}"/>
+              </a:ext>
+            </a:extLst>
+          </p:cNvPr>
+          <p:cNvSpPr>
+            <a:spLocks noEditPoints="1"/>
+          </p:cNvSpPr>
+          <p:nvPr/>
+        </p:nvSpPr>
+        <p:spPr bwMode="auto">
+          <a:xfrm>
+            <a:off x="1106285" y="4804517"/>
             <a:ext cx="214397" cy="216632"/>
           </a:xfrm>
           <a:custGeom>
@@ -22558,25 +22962,18 @@
 </file>
 
 <file path=customXml/item1.xml><?xml version="1.0" encoding="utf-8"?>
-<?mso-contentType ?>
-<FormTemplates xmlns="http://schemas.microsoft.com/sharepoint/v3/contenttype/forms">
-  <Display>DocumentLibraryForm</Display>
-  <Edit>DocumentLibraryForm</Edit>
-  <New>DocumentLibraryForm</New>
-</FormTemplates>
+<p:properties xmlns:p="http://schemas.microsoft.com/office/2006/metadata/properties" xmlns:xsi="http://www.w3.org/2001/XMLSchema-instance" xmlns:pc="http://schemas.microsoft.com/office/infopath/2007/PartnerControls">
+  <documentManagement>
+    <_dlc_DocId xmlns="aff7d12c-bb71-4270-bd29-9c4d45ff3327">346bfafb-41a4-4705-9274-1725a8a4651c</_dlc_DocId>
+    <_dlc_DocIdUrl xmlns="aff7d12c-bb71-4270-bd29-9c4d45ff3327">
+      <Url>https://www.groupware.kuleuven.be/sites/hpc/_layouts/15/DocIdRedir.aspx?ID=346bfafb-41a4-4705-9274-1725a8a4651c</Url>
+      <Description>346bfafb-41a4-4705-9274-1725a8a4651c</Description>
+    </_dlc_DocIdUrl>
+  </documentManagement>
+</p:properties>
 </file>
 
 <file path=customXml/item2.xml><?xml version="1.0" encoding="utf-8"?>
-<?mso-contentType ?>
-<customXsn xmlns="http://schemas.microsoft.com/office/2006/metadata/customXsn">
-  <xsnLocation/>
-  <cached>True</cached>
-  <openByDefault>True</openByDefault>
-  <xsnScope>/sites/hpc</xsnScope>
-</customXsn>
-</file>
-
-<file path=customXml/item3.xml><?xml version="1.0" encoding="utf-8"?>
 <?mso-contentType ?>
 <spe:Receivers xmlns:spe="http://schemas.microsoft.com/sharepoint/events">
   <Receiver>
@@ -22622,16 +23019,23 @@
 </spe:Receivers>
 </file>
 
+<file path=customXml/item3.xml><?xml version="1.0" encoding="utf-8"?>
+<?mso-contentType ?>
+<customXsn xmlns="http://schemas.microsoft.com/office/2006/metadata/customXsn">
+  <xsnLocation/>
+  <cached>True</cached>
+  <openByDefault>True</openByDefault>
+  <xsnScope>/sites/hpc</xsnScope>
+</customXsn>
+</file>
+
 <file path=customXml/item4.xml><?xml version="1.0" encoding="utf-8"?>
-<p:properties xmlns:p="http://schemas.microsoft.com/office/2006/metadata/properties" xmlns:xsi="http://www.w3.org/2001/XMLSchema-instance" xmlns:pc="http://schemas.microsoft.com/office/infopath/2007/PartnerControls">
-  <documentManagement>
-    <_dlc_DocId xmlns="aff7d12c-bb71-4270-bd29-9c4d45ff3327">346bfafb-41a4-4705-9274-1725a8a4651c</_dlc_DocId>
-    <_dlc_DocIdUrl xmlns="aff7d12c-bb71-4270-bd29-9c4d45ff3327">
-      <Url>https://www.groupware.kuleuven.be/sites/hpc/_layouts/15/DocIdRedir.aspx?ID=346bfafb-41a4-4705-9274-1725a8a4651c</Url>
-      <Description>346bfafb-41a4-4705-9274-1725a8a4651c</Description>
-    </_dlc_DocIdUrl>
-  </documentManagement>
-</p:properties>
+<?mso-contentType ?>
+<FormTemplates xmlns="http://schemas.microsoft.com/sharepoint/v3/contenttype/forms">
+  <Display>DocumentLibraryForm</Display>
+  <Edit>DocumentLibraryForm</Edit>
+  <New>DocumentLibraryForm</New>
+</FormTemplates>
 </file>
 
 <file path=customXml/item5.xml><?xml version="1.0" encoding="utf-8"?>
@@ -22780,30 +23184,6 @@
 </file>
 
 <file path=customXml/itemProps1.xml><?xml version="1.0" encoding="utf-8"?>
-<ds:datastoreItem xmlns:ds="http://schemas.openxmlformats.org/officeDocument/2006/customXml" ds:itemID="{564EE3F2-D13D-4835-816B-74B5A421851B}">
-  <ds:schemaRefs>
-    <ds:schemaRef ds:uri="http://schemas.microsoft.com/sharepoint/v3/contenttype/forms"/>
-  </ds:schemaRefs>
-</ds:datastoreItem>
-</file>
-
-<file path=customXml/itemProps2.xml><?xml version="1.0" encoding="utf-8"?>
-<ds:datastoreItem xmlns:ds="http://schemas.openxmlformats.org/officeDocument/2006/customXml" ds:itemID="{F0EF99C1-AFFA-4072-A3F6-6A9C90E28E63}">
-  <ds:schemaRefs>
-    <ds:schemaRef ds:uri="http://schemas.microsoft.com/office/2006/metadata/customXsn"/>
-  </ds:schemaRefs>
-</ds:datastoreItem>
-</file>
-
-<file path=customXml/itemProps3.xml><?xml version="1.0" encoding="utf-8"?>
-<ds:datastoreItem xmlns:ds="http://schemas.openxmlformats.org/officeDocument/2006/customXml" ds:itemID="{7732E273-8A47-4E01-AC36-8FF8A6317757}">
-  <ds:schemaRefs>
-    <ds:schemaRef ds:uri="http://schemas.microsoft.com/sharepoint/events"/>
-  </ds:schemaRefs>
-</ds:datastoreItem>
-</file>
-
-<file path=customXml/itemProps4.xml><?xml version="1.0" encoding="utf-8"?>
 <ds:datastoreItem xmlns:ds="http://schemas.openxmlformats.org/officeDocument/2006/customXml" ds:itemID="{F0D56244-60B2-41FD-96AD-7AC25F221D7C}">
   <ds:schemaRefs>
     <ds:schemaRef ds:uri="http://purl.org/dc/elements/1.1/"/>
@@ -22815,6 +23195,30 @@
     <ds:schemaRef ds:uri="http://schemas.openxmlformats.org/package/2006/metadata/core-properties"/>
     <ds:schemaRef ds:uri="http://schemas.microsoft.com/office/2006/metadata/properties"/>
     <ds:schemaRef ds:uri="http://www.w3.org/XML/1998/namespace"/>
+  </ds:schemaRefs>
+</ds:datastoreItem>
+</file>
+
+<file path=customXml/itemProps2.xml><?xml version="1.0" encoding="utf-8"?>
+<ds:datastoreItem xmlns:ds="http://schemas.openxmlformats.org/officeDocument/2006/customXml" ds:itemID="{7732E273-8A47-4E01-AC36-8FF8A6317757}">
+  <ds:schemaRefs>
+    <ds:schemaRef ds:uri="http://schemas.microsoft.com/sharepoint/events"/>
+  </ds:schemaRefs>
+</ds:datastoreItem>
+</file>
+
+<file path=customXml/itemProps3.xml><?xml version="1.0" encoding="utf-8"?>
+<ds:datastoreItem xmlns:ds="http://schemas.openxmlformats.org/officeDocument/2006/customXml" ds:itemID="{F0EF99C1-AFFA-4072-A3F6-6A9C90E28E63}">
+  <ds:schemaRefs>
+    <ds:schemaRef ds:uri="http://schemas.microsoft.com/office/2006/metadata/customXsn"/>
+  </ds:schemaRefs>
+</ds:datastoreItem>
+</file>
+
+<file path=customXml/itemProps4.xml><?xml version="1.0" encoding="utf-8"?>
+<ds:datastoreItem xmlns:ds="http://schemas.openxmlformats.org/officeDocument/2006/customXml" ds:itemID="{564EE3F2-D13D-4835-816B-74B5A421851B}">
+  <ds:schemaRefs>
+    <ds:schemaRef ds:uri="http://schemas.microsoft.com/sharepoint/v3/contenttype/forms"/>
   </ds:schemaRefs>
 </ds:datastoreItem>
 </file>

</xml_diff>

<commit_message>
saved changes. Still more work needs to be done for update
</commit_message>
<xml_diff>
--- a/VSCintro-demo.pptx
+++ b/VSCintro-demo.pptx
@@ -221,7 +221,7 @@
           <a:p>
             <a:fld id="{01F519A0-78CB-4E85-BDD7-0175329041AC}" type="datetimeFigureOut">
               <a:rPr lang="en-US" smtClean="0"/>
-              <a:t>4/5/2022</a:t>
+              <a:t>1/20/2023</a:t>
             </a:fld>
             <a:endParaRPr lang="en-US"/>
           </a:p>
@@ -387,7 +387,7 @@
           <a:p>
             <a:fld id="{337BDF4F-FAE4-4E7A-B003-7AAF79F14F3C}" type="datetimeFigureOut">
               <a:rPr lang="en-US" smtClean="0"/>
-              <a:t>4/5/2022</a:t>
+              <a:t>1/20/2023</a:t>
             </a:fld>
             <a:endParaRPr lang="en-US"/>
           </a:p>
@@ -852,7 +852,7 @@
           <a:p>
             <a:fld id="{12D417FB-DB75-4510-8AD7-5416595AADD8}" type="datetime1">
               <a:rPr lang="en-US" smtClean="0"/>
-              <a:t>4/5/2022</a:t>
+              <a:t>1/20/2023</a:t>
             </a:fld>
             <a:endParaRPr lang="en-US"/>
           </a:p>
@@ -1397,7 +1397,7 @@
           <a:p>
             <a:fld id="{1C565815-05F0-455F-BBD6-9680ABD9D1CB}" type="datetimeFigureOut">
               <a:rPr lang="en-US" smtClean="0"/>
-              <a:t>4/5/2022</a:t>
+              <a:t>1/20/2023</a:t>
             </a:fld>
             <a:endParaRPr lang="en-US"/>
           </a:p>
@@ -1761,7 +1761,7 @@
           <a:p>
             <a:fld id="{1C565815-05F0-455F-BBD6-9680ABD9D1CB}" type="datetimeFigureOut">
               <a:rPr lang="en-US" smtClean="0"/>
-              <a:t>4/5/2022</a:t>
+              <a:t>1/20/2023</a:t>
             </a:fld>
             <a:endParaRPr lang="en-US"/>
           </a:p>
@@ -1878,7 +1878,7 @@
           <a:p>
             <a:fld id="{1C565815-05F0-455F-BBD6-9680ABD9D1CB}" type="datetimeFigureOut">
               <a:rPr lang="en-US" smtClean="0"/>
-              <a:t>4/5/2022</a:t>
+              <a:t>1/20/2023</a:t>
             </a:fld>
             <a:endParaRPr lang="en-US"/>
           </a:p>
@@ -1973,7 +1973,7 @@
           <a:p>
             <a:fld id="{1C565815-05F0-455F-BBD6-9680ABD9D1CB}" type="datetimeFigureOut">
               <a:rPr lang="en-US" smtClean="0"/>
-              <a:t>4/5/2022</a:t>
+              <a:t>1/20/2023</a:t>
             </a:fld>
             <a:endParaRPr lang="en-US"/>
           </a:p>
@@ -2248,7 +2248,7 @@
           <a:p>
             <a:fld id="{1C565815-05F0-455F-BBD6-9680ABD9D1CB}" type="datetimeFigureOut">
               <a:rPr lang="en-US" smtClean="0"/>
-              <a:t>4/5/2022</a:t>
+              <a:t>1/20/2023</a:t>
             </a:fld>
             <a:endParaRPr lang="en-US"/>
           </a:p>
@@ -2500,7 +2500,7 @@
           <a:p>
             <a:fld id="{1C565815-05F0-455F-BBD6-9680ABD9D1CB}" type="datetimeFigureOut">
               <a:rPr lang="en-US" smtClean="0"/>
-              <a:t>4/5/2022</a:t>
+              <a:t>1/20/2023</a:t>
             </a:fld>
             <a:endParaRPr lang="en-US"/>
           </a:p>
@@ -2668,7 +2668,7 @@
           <a:p>
             <a:fld id="{1C565815-05F0-455F-BBD6-9680ABD9D1CB}" type="datetimeFigureOut">
               <a:rPr lang="en-US" smtClean="0"/>
-              <a:t>4/5/2022</a:t>
+              <a:t>1/20/2023</a:t>
             </a:fld>
             <a:endParaRPr lang="en-US"/>
           </a:p>
@@ -2846,7 +2846,7 @@
           <a:p>
             <a:fld id="{1C565815-05F0-455F-BBD6-9680ABD9D1CB}" type="datetimeFigureOut">
               <a:rPr lang="en-US" smtClean="0"/>
-              <a:t>4/5/2022</a:t>
+              <a:t>1/20/2023</a:t>
             </a:fld>
             <a:endParaRPr lang="en-US"/>
           </a:p>
@@ -3653,7 +3653,7 @@
           <a:p>
             <a:fld id="{A1FA2290-0477-46BB-87A2-28AB474124F3}" type="datetime1">
               <a:rPr lang="nl-BE" smtClean="0"/>
-              <a:t>5/04/2022</a:t>
+              <a:t>20/01/2023</a:t>
             </a:fld>
             <a:endParaRPr lang="nl-BE" dirty="0"/>
           </a:p>
@@ -3919,7 +3919,7 @@
           <a:p>
             <a:fld id="{1C565815-05F0-455F-BBD6-9680ABD9D1CB}" type="datetimeFigureOut">
               <a:rPr lang="en-US" smtClean="0"/>
-              <a:t>4/5/2022</a:t>
+              <a:t>1/20/2023</a:t>
             </a:fld>
             <a:endParaRPr lang="en-US"/>
           </a:p>
@@ -4117,7 +4117,7 @@
           <a:p>
             <a:fld id="{1C565815-05F0-455F-BBD6-9680ABD9D1CB}" type="datetimeFigureOut">
               <a:rPr lang="en-US" smtClean="0"/>
-              <a:t>4/5/2022</a:t>
+              <a:t>1/20/2023</a:t>
             </a:fld>
             <a:endParaRPr lang="en-US"/>
           </a:p>
@@ -4362,7 +4362,7 @@
           <a:p>
             <a:fld id="{1C565815-05F0-455F-BBD6-9680ABD9D1CB}" type="datetimeFigureOut">
               <a:rPr lang="en-US" smtClean="0"/>
-              <a:t>4/5/2022</a:t>
+              <a:t>1/20/2023</a:t>
             </a:fld>
             <a:endParaRPr lang="en-US"/>
           </a:p>
@@ -5202,7 +5202,7 @@
           <a:p>
             <a:fld id="{1C565815-05F0-455F-BBD6-9680ABD9D1CB}" type="datetimeFigureOut">
               <a:rPr lang="en-US" smtClean="0"/>
-              <a:t>4/5/2022</a:t>
+              <a:t>1/20/2023</a:t>
             </a:fld>
             <a:endParaRPr lang="en-US"/>
           </a:p>
@@ -5992,22 +5992,13 @@
               <a:t> </a:t>
             </a:r>
             <a:r>
-              <a:rPr lang="en-US" altLang="zh-TW" sz="2400">
+              <a:rPr lang="en-US" altLang="zh-TW" sz="2400" dirty="0">
                 <a:solidFill>
                   <a:srgbClr val="4E5865"/>
                 </a:solidFill>
                 <a:ea typeface="新細明體" panose="02020500000000000000" pitchFamily="18" charset="-120"/>
               </a:rPr>
-              <a:t>group (Browse </a:t>
-            </a:r>
-            <a:r>
-              <a:rPr lang="en-US" altLang="zh-TW" sz="2400" dirty="0">
-                <a:solidFill>
-                  <a:srgbClr val="4E5865"/>
-                </a:solidFill>
-                <a:ea typeface="新細明體" panose="02020500000000000000" pitchFamily="18" charset="-120"/>
-              </a:rPr>
-              <a:t>to </a:t>
+              <a:t>group (Browse to </a:t>
             </a:r>
             <a:r>
               <a:rPr lang="en-US" altLang="zh-TW" sz="2400" dirty="0">
@@ -6040,8 +6031,23 @@
                 </a:solidFill>
                 <a:ea typeface="新細明體" panose="02020500000000000000" pitchFamily="18" charset="-120"/>
               </a:rPr>
-              <a:t>Login with putty</a:t>
-            </a:r>
+              <a:t>Login with </a:t>
+            </a:r>
+            <a:r>
+              <a:rPr lang="en-US" altLang="zh-TW" sz="2400" dirty="0" err="1">
+                <a:solidFill>
+                  <a:srgbClr val="4E5865"/>
+                </a:solidFill>
+                <a:ea typeface="新細明體" panose="02020500000000000000" pitchFamily="18" charset="-120"/>
+              </a:rPr>
+              <a:t>MobaXterm</a:t>
+            </a:r>
+            <a:endParaRPr lang="en-US" altLang="zh-TW" sz="2400" dirty="0">
+              <a:solidFill>
+                <a:srgbClr val="4E5865"/>
+              </a:solidFill>
+              <a:ea typeface="新細明體" panose="02020500000000000000" pitchFamily="18" charset="-120"/>
+            </a:endParaRPr>
           </a:p>
           <a:p>
             <a:pPr marL="914400" lvl="2" indent="0">
@@ -22962,18 +22968,25 @@
 </file>
 
 <file path=customXml/item1.xml><?xml version="1.0" encoding="utf-8"?>
-<p:properties xmlns:p="http://schemas.microsoft.com/office/2006/metadata/properties" xmlns:xsi="http://www.w3.org/2001/XMLSchema-instance" xmlns:pc="http://schemas.microsoft.com/office/infopath/2007/PartnerControls">
-  <documentManagement>
-    <_dlc_DocId xmlns="aff7d12c-bb71-4270-bd29-9c4d45ff3327">346bfafb-41a4-4705-9274-1725a8a4651c</_dlc_DocId>
-    <_dlc_DocIdUrl xmlns="aff7d12c-bb71-4270-bd29-9c4d45ff3327">
-      <Url>https://www.groupware.kuleuven.be/sites/hpc/_layouts/15/DocIdRedir.aspx?ID=346bfafb-41a4-4705-9274-1725a8a4651c</Url>
-      <Description>346bfafb-41a4-4705-9274-1725a8a4651c</Description>
-    </_dlc_DocIdUrl>
-  </documentManagement>
-</p:properties>
+<?mso-contentType ?>
+<FormTemplates xmlns="http://schemas.microsoft.com/sharepoint/v3/contenttype/forms">
+  <Display>DocumentLibraryForm</Display>
+  <Edit>DocumentLibraryForm</Edit>
+  <New>DocumentLibraryForm</New>
+</FormTemplates>
 </file>
 
 <file path=customXml/item2.xml><?xml version="1.0" encoding="utf-8"?>
+<?mso-contentType ?>
+<customXsn xmlns="http://schemas.microsoft.com/office/2006/metadata/customXsn">
+  <xsnLocation/>
+  <cached>True</cached>
+  <openByDefault>True</openByDefault>
+  <xsnScope>/sites/hpc</xsnScope>
+</customXsn>
+</file>
+
+<file path=customXml/item3.xml><?xml version="1.0" encoding="utf-8"?>
 <?mso-contentType ?>
 <spe:Receivers xmlns:spe="http://schemas.microsoft.com/sharepoint/events">
   <Receiver>
@@ -23019,23 +23032,16 @@
 </spe:Receivers>
 </file>
 
-<file path=customXml/item3.xml><?xml version="1.0" encoding="utf-8"?>
-<?mso-contentType ?>
-<customXsn xmlns="http://schemas.microsoft.com/office/2006/metadata/customXsn">
-  <xsnLocation/>
-  <cached>True</cached>
-  <openByDefault>True</openByDefault>
-  <xsnScope>/sites/hpc</xsnScope>
-</customXsn>
-</file>
-
 <file path=customXml/item4.xml><?xml version="1.0" encoding="utf-8"?>
-<?mso-contentType ?>
-<FormTemplates xmlns="http://schemas.microsoft.com/sharepoint/v3/contenttype/forms">
-  <Display>DocumentLibraryForm</Display>
-  <Edit>DocumentLibraryForm</Edit>
-  <New>DocumentLibraryForm</New>
-</FormTemplates>
+<p:properties xmlns:p="http://schemas.microsoft.com/office/2006/metadata/properties" xmlns:xsi="http://www.w3.org/2001/XMLSchema-instance" xmlns:pc="http://schemas.microsoft.com/office/infopath/2007/PartnerControls">
+  <documentManagement>
+    <_dlc_DocId xmlns="aff7d12c-bb71-4270-bd29-9c4d45ff3327">346bfafb-41a4-4705-9274-1725a8a4651c</_dlc_DocId>
+    <_dlc_DocIdUrl xmlns="aff7d12c-bb71-4270-bd29-9c4d45ff3327">
+      <Url>https://www.groupware.kuleuven.be/sites/hpc/_layouts/15/DocIdRedir.aspx?ID=346bfafb-41a4-4705-9274-1725a8a4651c</Url>
+      <Description>346bfafb-41a4-4705-9274-1725a8a4651c</Description>
+    </_dlc_DocIdUrl>
+  </documentManagement>
+</p:properties>
 </file>
 
 <file path=customXml/item5.xml><?xml version="1.0" encoding="utf-8"?>
@@ -23184,6 +23190,30 @@
 </file>
 
 <file path=customXml/itemProps1.xml><?xml version="1.0" encoding="utf-8"?>
+<ds:datastoreItem xmlns:ds="http://schemas.openxmlformats.org/officeDocument/2006/customXml" ds:itemID="{564EE3F2-D13D-4835-816B-74B5A421851B}">
+  <ds:schemaRefs>
+    <ds:schemaRef ds:uri="http://schemas.microsoft.com/sharepoint/v3/contenttype/forms"/>
+  </ds:schemaRefs>
+</ds:datastoreItem>
+</file>
+
+<file path=customXml/itemProps2.xml><?xml version="1.0" encoding="utf-8"?>
+<ds:datastoreItem xmlns:ds="http://schemas.openxmlformats.org/officeDocument/2006/customXml" ds:itemID="{F0EF99C1-AFFA-4072-A3F6-6A9C90E28E63}">
+  <ds:schemaRefs>
+    <ds:schemaRef ds:uri="http://schemas.microsoft.com/office/2006/metadata/customXsn"/>
+  </ds:schemaRefs>
+</ds:datastoreItem>
+</file>
+
+<file path=customXml/itemProps3.xml><?xml version="1.0" encoding="utf-8"?>
+<ds:datastoreItem xmlns:ds="http://schemas.openxmlformats.org/officeDocument/2006/customXml" ds:itemID="{7732E273-8A47-4E01-AC36-8FF8A6317757}">
+  <ds:schemaRefs>
+    <ds:schemaRef ds:uri="http://schemas.microsoft.com/sharepoint/events"/>
+  </ds:schemaRefs>
+</ds:datastoreItem>
+</file>
+
+<file path=customXml/itemProps4.xml><?xml version="1.0" encoding="utf-8"?>
 <ds:datastoreItem xmlns:ds="http://schemas.openxmlformats.org/officeDocument/2006/customXml" ds:itemID="{F0D56244-60B2-41FD-96AD-7AC25F221D7C}">
   <ds:schemaRefs>
     <ds:schemaRef ds:uri="http://purl.org/dc/elements/1.1/"/>
@@ -23195,30 +23225,6 @@
     <ds:schemaRef ds:uri="http://schemas.openxmlformats.org/package/2006/metadata/core-properties"/>
     <ds:schemaRef ds:uri="http://schemas.microsoft.com/office/2006/metadata/properties"/>
     <ds:schemaRef ds:uri="http://www.w3.org/XML/1998/namespace"/>
-  </ds:schemaRefs>
-</ds:datastoreItem>
-</file>
-
-<file path=customXml/itemProps2.xml><?xml version="1.0" encoding="utf-8"?>
-<ds:datastoreItem xmlns:ds="http://schemas.openxmlformats.org/officeDocument/2006/customXml" ds:itemID="{7732E273-8A47-4E01-AC36-8FF8A6317757}">
-  <ds:schemaRefs>
-    <ds:schemaRef ds:uri="http://schemas.microsoft.com/sharepoint/events"/>
-  </ds:schemaRefs>
-</ds:datastoreItem>
-</file>
-
-<file path=customXml/itemProps3.xml><?xml version="1.0" encoding="utf-8"?>
-<ds:datastoreItem xmlns:ds="http://schemas.openxmlformats.org/officeDocument/2006/customXml" ds:itemID="{F0EF99C1-AFFA-4072-A3F6-6A9C90E28E63}">
-  <ds:schemaRefs>
-    <ds:schemaRef ds:uri="http://schemas.microsoft.com/office/2006/metadata/customXsn"/>
-  </ds:schemaRefs>
-</ds:datastoreItem>
-</file>
-
-<file path=customXml/itemProps4.xml><?xml version="1.0" encoding="utf-8"?>
-<ds:datastoreItem xmlns:ds="http://schemas.openxmlformats.org/officeDocument/2006/customXml" ds:itemID="{564EE3F2-D13D-4835-816B-74B5A421851B}">
-  <ds:schemaRefs>
-    <ds:schemaRef ds:uri="http://schemas.microsoft.com/sharepoint/v3/contenttype/forms"/>
   </ds:schemaRefs>
 </ds:datastoreItem>
 </file>

</xml_diff>

<commit_message>
updating demo slides to include OOD
</commit_message>
<xml_diff>
--- a/VSCintro-demo.pptx
+++ b/VSCintro-demo.pptx
@@ -233,7 +233,7 @@
           <a:p>
             <a:fld id="{01F519A0-78CB-4E85-BDD7-0175329041AC}" type="datetimeFigureOut">
               <a:rPr lang="en-US" smtClean="0"/>
-              <a:t>4/18/2023</a:t>
+              <a:t>12/13/2023</a:t>
             </a:fld>
             <a:endParaRPr lang="en-US"/>
           </a:p>
@@ -399,7 +399,7 @@
           <a:p>
             <a:fld id="{337BDF4F-FAE4-4E7A-B003-7AAF79F14F3C}" type="datetimeFigureOut">
               <a:rPr lang="en-US" smtClean="0"/>
-              <a:t>4/18/2023</a:t>
+              <a:t>12/13/2023</a:t>
             </a:fld>
             <a:endParaRPr lang="en-US"/>
           </a:p>
@@ -1303,7 +1303,7 @@
           <a:p>
             <a:fld id="{12D417FB-DB75-4510-8AD7-5416595AADD8}" type="datetime1">
               <a:rPr lang="en-US" smtClean="0"/>
-              <a:t>4/18/2023</a:t>
+              <a:t>12/13/2023</a:t>
             </a:fld>
             <a:endParaRPr lang="en-US"/>
           </a:p>
@@ -1848,7 +1848,7 @@
           <a:p>
             <a:fld id="{1C565815-05F0-455F-BBD6-9680ABD9D1CB}" type="datetimeFigureOut">
               <a:rPr lang="en-US" smtClean="0"/>
-              <a:t>4/18/2023</a:t>
+              <a:t>12/13/2023</a:t>
             </a:fld>
             <a:endParaRPr lang="en-US"/>
           </a:p>
@@ -2212,7 +2212,7 @@
           <a:p>
             <a:fld id="{1C565815-05F0-455F-BBD6-9680ABD9D1CB}" type="datetimeFigureOut">
               <a:rPr lang="en-US" smtClean="0"/>
-              <a:t>4/18/2023</a:t>
+              <a:t>12/13/2023</a:t>
             </a:fld>
             <a:endParaRPr lang="en-US"/>
           </a:p>
@@ -2329,7 +2329,7 @@
           <a:p>
             <a:fld id="{1C565815-05F0-455F-BBD6-9680ABD9D1CB}" type="datetimeFigureOut">
               <a:rPr lang="en-US" smtClean="0"/>
-              <a:t>4/18/2023</a:t>
+              <a:t>12/13/2023</a:t>
             </a:fld>
             <a:endParaRPr lang="en-US"/>
           </a:p>
@@ -2424,7 +2424,7 @@
           <a:p>
             <a:fld id="{1C565815-05F0-455F-BBD6-9680ABD9D1CB}" type="datetimeFigureOut">
               <a:rPr lang="en-US" smtClean="0"/>
-              <a:t>4/18/2023</a:t>
+              <a:t>12/13/2023</a:t>
             </a:fld>
             <a:endParaRPr lang="en-US"/>
           </a:p>
@@ -2699,7 +2699,7 @@
           <a:p>
             <a:fld id="{1C565815-05F0-455F-BBD6-9680ABD9D1CB}" type="datetimeFigureOut">
               <a:rPr lang="en-US" smtClean="0"/>
-              <a:t>4/18/2023</a:t>
+              <a:t>12/13/2023</a:t>
             </a:fld>
             <a:endParaRPr lang="en-US"/>
           </a:p>
@@ -2951,7 +2951,7 @@
           <a:p>
             <a:fld id="{1C565815-05F0-455F-BBD6-9680ABD9D1CB}" type="datetimeFigureOut">
               <a:rPr lang="en-US" smtClean="0"/>
-              <a:t>4/18/2023</a:t>
+              <a:t>12/13/2023</a:t>
             </a:fld>
             <a:endParaRPr lang="en-US"/>
           </a:p>
@@ -3119,7 +3119,7 @@
           <a:p>
             <a:fld id="{1C565815-05F0-455F-BBD6-9680ABD9D1CB}" type="datetimeFigureOut">
               <a:rPr lang="en-US" smtClean="0"/>
-              <a:t>4/18/2023</a:t>
+              <a:t>12/13/2023</a:t>
             </a:fld>
             <a:endParaRPr lang="en-US"/>
           </a:p>
@@ -3297,7 +3297,7 @@
           <a:p>
             <a:fld id="{1C565815-05F0-455F-BBD6-9680ABD9D1CB}" type="datetimeFigureOut">
               <a:rPr lang="en-US" smtClean="0"/>
-              <a:t>4/18/2023</a:t>
+              <a:t>12/13/2023</a:t>
             </a:fld>
             <a:endParaRPr lang="en-US"/>
           </a:p>
@@ -4104,7 +4104,7 @@
           <a:p>
             <a:fld id="{A1FA2290-0477-46BB-87A2-28AB474124F3}" type="datetime1">
               <a:rPr lang="nl-BE" smtClean="0"/>
-              <a:t>18/04/2023</a:t>
+              <a:t>13/12/2023</a:t>
             </a:fld>
             <a:endParaRPr lang="nl-BE" dirty="0"/>
           </a:p>
@@ -4370,7 +4370,7 @@
           <a:p>
             <a:fld id="{1C565815-05F0-455F-BBD6-9680ABD9D1CB}" type="datetimeFigureOut">
               <a:rPr lang="en-US" smtClean="0"/>
-              <a:t>4/18/2023</a:t>
+              <a:t>12/13/2023</a:t>
             </a:fld>
             <a:endParaRPr lang="en-US"/>
           </a:p>
@@ -4568,7 +4568,7 @@
           <a:p>
             <a:fld id="{1C565815-05F0-455F-BBD6-9680ABD9D1CB}" type="datetimeFigureOut">
               <a:rPr lang="en-US" smtClean="0"/>
-              <a:t>4/18/2023</a:t>
+              <a:t>12/13/2023</a:t>
             </a:fld>
             <a:endParaRPr lang="en-US"/>
           </a:p>
@@ -4813,7 +4813,7 @@
           <a:p>
             <a:fld id="{1C565815-05F0-455F-BBD6-9680ABD9D1CB}" type="datetimeFigureOut">
               <a:rPr lang="en-US" smtClean="0"/>
-              <a:t>4/18/2023</a:t>
+              <a:t>12/13/2023</a:t>
             </a:fld>
             <a:endParaRPr lang="en-US"/>
           </a:p>
@@ -5653,7 +5653,7 @@
           <a:p>
             <a:fld id="{1C565815-05F0-455F-BBD6-9680ABD9D1CB}" type="datetimeFigureOut">
               <a:rPr lang="en-US" smtClean="0"/>
-              <a:t>4/18/2023</a:t>
+              <a:t>12/13/2023</a:t>
             </a:fld>
             <a:endParaRPr lang="en-US"/>
           </a:p>
@@ -6366,7 +6366,12 @@
             <p:ph type="title"/>
           </p:nvPr>
         </p:nvSpPr>
-        <p:spPr/>
+        <p:spPr>
+          <a:xfrm>
+            <a:off x="406691" y="294437"/>
+            <a:ext cx="10515600" cy="1325563"/>
+          </a:xfrm>
+        </p:spPr>
         <p:txBody>
           <a:bodyPr/>
           <a:lstStyle/>
@@ -6454,7 +6459,7 @@
                 </a:solidFill>
                 <a:ea typeface="新細明體" panose="02020500000000000000" pitchFamily="18" charset="-120"/>
               </a:rPr>
-              <a:t>Login with </a:t>
+              <a:t>Login via </a:t>
             </a:r>
             <a:r>
               <a:rPr lang="en-US" altLang="zh-TW" sz="2400" dirty="0" err="1">
@@ -6463,7 +6468,7 @@
                 </a:solidFill>
                 <a:ea typeface="新細明體" panose="02020500000000000000" pitchFamily="18" charset="-120"/>
               </a:rPr>
-              <a:t>MobaXterm</a:t>
+              <a:t>OpenOnDemand</a:t>
             </a:r>
             <a:r>
               <a:rPr lang="en-US" altLang="zh-TW" sz="2400" dirty="0">
@@ -6472,7 +6477,43 @@
                 </a:solidFill>
                 <a:ea typeface="新細明體" panose="02020500000000000000" pitchFamily="18" charset="-120"/>
               </a:rPr>
-              <a:t> or terminal</a:t>
+              <a:t>: </a:t>
+            </a:r>
+            <a:r>
+              <a:rPr lang="en-US" altLang="zh-TW" sz="2400" dirty="0">
+                <a:solidFill>
+                  <a:srgbClr val="4E5865"/>
+                </a:solidFill>
+                <a:ea typeface="新細明體" panose="02020500000000000000" pitchFamily="18" charset="-120"/>
+                <a:hlinkClick r:id="rId4"/>
+              </a:rPr>
+              <a:t>www.ondemand.hpc.kuleuven.be</a:t>
+            </a:r>
+            <a:r>
+              <a:rPr lang="en-US" altLang="zh-TW" sz="2400" dirty="0">
+                <a:solidFill>
+                  <a:srgbClr val="4E5865"/>
+                </a:solidFill>
+                <a:ea typeface="新細明體" panose="02020500000000000000" pitchFamily="18" charset="-120"/>
+              </a:rPr>
+              <a:t> </a:t>
+            </a:r>
+            <a:br>
+              <a:rPr lang="en-US" altLang="zh-TW" sz="2400" dirty="0">
+                <a:solidFill>
+                  <a:srgbClr val="4E5865"/>
+                </a:solidFill>
+                <a:ea typeface="新細明體" panose="02020500000000000000" pitchFamily="18" charset="-120"/>
+              </a:rPr>
+            </a:br>
+            <a:r>
+              <a:rPr lang="en-US" altLang="zh-TW" sz="2400" dirty="0">
+                <a:solidFill>
+                  <a:srgbClr val="4E5865"/>
+                </a:solidFill>
+                <a:ea typeface="新細明體" panose="02020500000000000000" pitchFamily="18" charset="-120"/>
+              </a:rPr>
+              <a:t>Features: File transfer, File editor, interactive apps, Jobs’ overview</a:t>
             </a:r>
           </a:p>
           <a:p>
@@ -6488,17 +6529,16 @@
                 </a:solidFill>
                 <a:ea typeface="新細明體" panose="02020500000000000000" pitchFamily="18" charset="-120"/>
               </a:rPr>
-              <a:t>File transfer with </a:t>
-            </a:r>
-            <a:r>
-              <a:rPr lang="en-US" altLang="zh-TW" sz="2400" dirty="0" err="1">
+              <a:t>Check disk quota:</a:t>
+            </a:r>
+            <a:br>
+              <a:rPr lang="en-US" altLang="zh-TW" sz="2400" dirty="0">
                 <a:solidFill>
                   <a:srgbClr val="4E5865"/>
                 </a:solidFill>
                 <a:ea typeface="新細明體" panose="02020500000000000000" pitchFamily="18" charset="-120"/>
               </a:rPr>
-              <a:t>Filezilla</a:t>
-            </a:r>
+            </a:br>
             <a:r>
               <a:rPr lang="en-US" altLang="zh-TW" sz="2400" dirty="0">
                 <a:solidFill>
@@ -6506,22 +6546,37 @@
                 </a:solidFill>
                 <a:ea typeface="新細明體" panose="02020500000000000000" pitchFamily="18" charset="-120"/>
               </a:rPr>
-              <a:t> or WinSCP </a:t>
-            </a:r>
-            <a:r>
-              <a:rPr lang="en-US" altLang="zh-TW" sz="2400">
-                <a:solidFill>
-                  <a:srgbClr val="4E5865"/>
-                </a:solidFill>
+              <a:t>  </a:t>
+            </a:r>
+            <a:r>
+              <a:rPr lang="en-US" altLang="zh-TW" sz="2000" dirty="0">
+                <a:solidFill>
+                  <a:srgbClr val="4E5865"/>
+                </a:solidFill>
+                <a:latin typeface="Courier New" panose="02070309020205020404" pitchFamily="49" charset="0"/>
                 <a:ea typeface="新細明體" panose="02020500000000000000" pitchFamily="18" charset="-120"/>
-              </a:rPr>
-              <a:t>(Windows)</a:t>
-            </a:r>
-            <a:endParaRPr lang="en-US" altLang="zh-TW" sz="2400" dirty="0">
+                <a:cs typeface="Courier New" panose="02070309020205020404" pitchFamily="49" charset="0"/>
+              </a:rPr>
+              <a:t>$ </a:t>
+            </a:r>
+            <a:r>
+              <a:rPr lang="en-US" altLang="zh-TW" sz="2000" dirty="0" err="1">
+                <a:solidFill>
+                  <a:srgbClr val="4E5865"/>
+                </a:solidFill>
+                <a:latin typeface="Courier New" panose="02070309020205020404" pitchFamily="49" charset="0"/>
+                <a:ea typeface="新細明體" panose="02020500000000000000" pitchFamily="18" charset="-120"/>
+                <a:cs typeface="Courier New" panose="02070309020205020404" pitchFamily="49" charset="0"/>
+              </a:rPr>
+              <a:t>myquota</a:t>
+            </a:r>
+            <a:endParaRPr lang="en-US" altLang="zh-TW" sz="2000" dirty="0">
               <a:solidFill>
                 <a:srgbClr val="4E5865"/>
               </a:solidFill>
+              <a:latin typeface="Courier New" panose="02070309020205020404" pitchFamily="49" charset="0"/>
               <a:ea typeface="新細明體" panose="02020500000000000000" pitchFamily="18" charset="-120"/>
+              <a:cs typeface="Courier New" panose="02070309020205020404" pitchFamily="49" charset="0"/>
             </a:endParaRPr>
           </a:p>
           <a:p>
@@ -6537,7 +6592,108 @@
                 </a:solidFill>
                 <a:ea typeface="新細明體" panose="02020500000000000000" pitchFamily="18" charset="-120"/>
               </a:rPr>
-              <a:t>Login with NX</a:t>
+              <a:t>Check the credits</a:t>
+            </a:r>
+            <a:br>
+              <a:rPr lang="en-US" altLang="zh-TW" sz="2400" dirty="0">
+                <a:solidFill>
+                  <a:srgbClr val="4E5865"/>
+                </a:solidFill>
+                <a:ea typeface="新細明體" panose="02020500000000000000" pitchFamily="18" charset="-120"/>
+              </a:rPr>
+            </a:br>
+            <a:r>
+              <a:rPr lang="en-US" altLang="zh-TW" sz="2400" dirty="0">
+                <a:solidFill>
+                  <a:srgbClr val="4E5865"/>
+                </a:solidFill>
+                <a:ea typeface="新細明體" panose="02020500000000000000" pitchFamily="18" charset="-120"/>
+              </a:rPr>
+              <a:t>  </a:t>
+            </a:r>
+            <a:r>
+              <a:rPr lang="en-US" altLang="zh-TW" sz="2000" dirty="0">
+                <a:solidFill>
+                  <a:srgbClr val="4E5865"/>
+                </a:solidFill>
+                <a:latin typeface="Courier New" panose="02070309020205020404" pitchFamily="49" charset="0"/>
+                <a:ea typeface="新細明體" panose="02020500000000000000" pitchFamily="18" charset="-120"/>
+                <a:cs typeface="Courier New" panose="02070309020205020404" pitchFamily="49" charset="0"/>
+              </a:rPr>
+              <a:t>$ </a:t>
+            </a:r>
+            <a:r>
+              <a:rPr lang="en-US" altLang="zh-TW" sz="2000" dirty="0" err="1">
+                <a:solidFill>
+                  <a:srgbClr val="4E5865"/>
+                </a:solidFill>
+                <a:latin typeface="Courier New" panose="02070309020205020404" pitchFamily="49" charset="0"/>
+                <a:ea typeface="新細明體" panose="02020500000000000000" pitchFamily="18" charset="-120"/>
+                <a:cs typeface="Courier New" panose="02070309020205020404" pitchFamily="49" charset="0"/>
+              </a:rPr>
+              <a:t>sam</a:t>
+            </a:r>
+            <a:r>
+              <a:rPr lang="en-US" altLang="zh-TW" sz="2000" dirty="0">
+                <a:solidFill>
+                  <a:srgbClr val="4E5865"/>
+                </a:solidFill>
+                <a:latin typeface="Courier New" panose="02070309020205020404" pitchFamily="49" charset="0"/>
+                <a:ea typeface="新細明體" panose="02020500000000000000" pitchFamily="18" charset="-120"/>
+                <a:cs typeface="Courier New" panose="02070309020205020404" pitchFamily="49" charset="0"/>
+              </a:rPr>
+              <a:t>-balance      </a:t>
+            </a:r>
+            <a:r>
+              <a:rPr lang="en-US" altLang="zh-TW" sz="2400" dirty="0">
+                <a:solidFill>
+                  <a:srgbClr val="4E5865"/>
+                </a:solidFill>
+                <a:ea typeface="新細明體" panose="02020500000000000000" pitchFamily="18" charset="-120"/>
+              </a:rPr>
+              <a:t>and</a:t>
+            </a:r>
+            <a:r>
+              <a:rPr lang="en-US" altLang="zh-TW" sz="2000" dirty="0">
+                <a:solidFill>
+                  <a:srgbClr val="4E5865"/>
+                </a:solidFill>
+                <a:ea typeface="新細明體" panose="02020500000000000000" pitchFamily="18" charset="-120"/>
+              </a:rPr>
+              <a:t>           </a:t>
+            </a:r>
+            <a:r>
+              <a:rPr lang="en-US" altLang="zh-TW" sz="2000" dirty="0">
+                <a:solidFill>
+                  <a:srgbClr val="4E5865"/>
+                </a:solidFill>
+                <a:latin typeface="Courier New" panose="02070309020205020404" pitchFamily="49" charset="0"/>
+                <a:ea typeface="新細明體" panose="02020500000000000000" pitchFamily="18" charset="-120"/>
+                <a:cs typeface="Courier New" panose="02070309020205020404" pitchFamily="49" charset="0"/>
+              </a:rPr>
+              <a:t>$ </a:t>
+            </a:r>
+            <a:r>
+              <a:rPr lang="en-US" altLang="zh-TW" sz="2000" dirty="0" err="1">
+                <a:solidFill>
+                  <a:srgbClr val="4E5865"/>
+                </a:solidFill>
+                <a:latin typeface="Courier New" panose="02070309020205020404" pitchFamily="49" charset="0"/>
+                <a:ea typeface="新細明體" panose="02020500000000000000" pitchFamily="18" charset="-120"/>
+                <a:cs typeface="Courier New" panose="02070309020205020404" pitchFamily="49" charset="0"/>
+              </a:rPr>
+              <a:t>sam</a:t>
+            </a:r>
+            <a:r>
+              <a:rPr lang="en-US" altLang="zh-TW" sz="2000" dirty="0">
+                <a:solidFill>
+                  <a:srgbClr val="4E5865"/>
+                </a:solidFill>
+                <a:latin typeface="Courier New" panose="02070309020205020404" pitchFamily="49" charset="0"/>
+                <a:ea typeface="新細明體" panose="02020500000000000000" pitchFamily="18" charset="-120"/>
+                <a:cs typeface="Courier New" panose="02070309020205020404" pitchFamily="49" charset="0"/>
+              </a:rPr>
+              <a:t>-list-allocations</a:t>
             </a:r>
           </a:p>
           <a:p>
@@ -6553,31 +6709,16 @@
                 </a:solidFill>
                 <a:ea typeface="新細明體" panose="02020500000000000000" pitchFamily="18" charset="-120"/>
               </a:rPr>
-              <a:t>Check disk quota</a:t>
-            </a:r>
-          </a:p>
-          <a:p>
-            <a:pPr>
-              <a:buBlip>
-                <a:blip r:embed="rId3"/>
-              </a:buBlip>
-            </a:pPr>
-            <a:r>
+              <a:t>Software modules:</a:t>
+            </a:r>
+            <a:br>
               <a:rPr lang="en-US" altLang="zh-TW" sz="2400" dirty="0">
                 <a:solidFill>
                   <a:srgbClr val="4E5865"/>
                 </a:solidFill>
                 <a:ea typeface="新細明體" panose="02020500000000000000" pitchFamily="18" charset="-120"/>
               </a:rPr>
-              <a:t>Check the credits</a:t>
-            </a:r>
-          </a:p>
-          <a:p>
-            <a:pPr>
-              <a:buBlip>
-                <a:blip r:embed="rId3"/>
-              </a:buBlip>
-            </a:pPr>
+            </a:br>
             <a:r>
               <a:rPr lang="en-US" altLang="zh-TW" sz="2400" dirty="0">
                 <a:solidFill>
@@ -6585,14 +6726,47 @@
                 </a:solidFill>
                 <a:ea typeface="新細明體" panose="02020500000000000000" pitchFamily="18" charset="-120"/>
               </a:rPr>
-              <a:t>Check/load/list/unload/purge module</a:t>
-            </a:r>
-          </a:p>
-          <a:p>
-            <a:endParaRPr lang="nl-BE" sz="2400" dirty="0">
+              <a:t> </a:t>
+            </a:r>
+            <a:r>
+              <a:rPr lang="en-US" altLang="zh-TW" sz="2000" dirty="0">
+                <a:solidFill>
+                  <a:srgbClr val="4E5865"/>
+                </a:solidFill>
+                <a:latin typeface="Courier New" panose="02070309020205020404" pitchFamily="49" charset="0"/>
+                <a:ea typeface="新細明體" panose="02020500000000000000" pitchFamily="18" charset="-120"/>
+                <a:cs typeface="Courier New" panose="02070309020205020404" pitchFamily="49" charset="0"/>
+              </a:rPr>
+              <a:t>$ module {</a:t>
+            </a:r>
+            <a:r>
+              <a:rPr lang="en-US" altLang="zh-TW" sz="2000" dirty="0" err="1">
+                <a:solidFill>
+                  <a:srgbClr val="4E5865"/>
+                </a:solidFill>
+                <a:latin typeface="Courier New" panose="02070309020205020404" pitchFamily="49" charset="0"/>
+                <a:ea typeface="新細明體" panose="02020500000000000000" pitchFamily="18" charset="-120"/>
+                <a:cs typeface="Courier New" panose="02070309020205020404" pitchFamily="49" charset="0"/>
+              </a:rPr>
+              <a:t>avail|list|load|unload|purge</a:t>
+            </a:r>
+            <a:r>
+              <a:rPr lang="en-US" altLang="zh-TW" sz="2000" dirty="0">
+                <a:solidFill>
+                  <a:srgbClr val="4E5865"/>
+                </a:solidFill>
+                <a:latin typeface="Courier New" panose="02070309020205020404" pitchFamily="49" charset="0"/>
+                <a:ea typeface="新細明體" panose="02020500000000000000" pitchFamily="18" charset="-120"/>
+                <a:cs typeface="Courier New" panose="02070309020205020404" pitchFamily="49" charset="0"/>
+              </a:rPr>
+              <a:t>}</a:t>
+            </a:r>
+            <a:endParaRPr lang="nl-BE" sz="2000" dirty="0">
               <a:solidFill>
                 <a:srgbClr val="4E5865"/>
               </a:solidFill>
+              <a:latin typeface="Courier New" panose="02070309020205020404" pitchFamily="49" charset="0"/>
+              <a:cs typeface="Courier New" panose="02070309020205020404" pitchFamily="49" charset="0"/>
             </a:endParaRPr>
           </a:p>
         </p:txBody>
@@ -6671,7 +6845,12 @@
             <p:ph type="title"/>
           </p:nvPr>
         </p:nvSpPr>
-        <p:spPr/>
+        <p:spPr>
+          <a:xfrm>
+            <a:off x="447782" y="147218"/>
+            <a:ext cx="10515600" cy="1325563"/>
+          </a:xfrm>
+        </p:spPr>
         <p:txBody>
           <a:bodyPr/>
           <a:lstStyle/>
@@ -7025,22 +7204,35 @@
               <a:t>Modify the </a:t>
             </a:r>
             <a:r>
-              <a:rPr lang="en-US" altLang="zh-TW" sz="2400" dirty="0" err="1">
-                <a:solidFill>
-                  <a:srgbClr val="4E5865"/>
-                </a:solidFill>
+              <a:rPr lang="en-US" altLang="zh-TW" sz="2000" dirty="0" err="1">
+                <a:solidFill>
+                  <a:srgbClr val="4E5865"/>
+                </a:solidFill>
+                <a:latin typeface="Courier New" panose="02070309020205020404" pitchFamily="49" charset="0"/>
                 <a:ea typeface="新細明體" panose="02020500000000000000" pitchFamily="18" charset="-120"/>
+                <a:cs typeface="Courier New" panose="02070309020205020404" pitchFamily="49" charset="0"/>
               </a:rPr>
               <a:t>mpi.slurm</a:t>
             </a:r>
             <a:r>
+              <a:rPr lang="en-US" altLang="zh-TW" sz="2000" dirty="0">
+                <a:solidFill>
+                  <a:srgbClr val="4E5865"/>
+                </a:solidFill>
+                <a:latin typeface="Courier New" panose="02070309020205020404" pitchFamily="49" charset="0"/>
+                <a:ea typeface="新細明體" panose="02020500000000000000" pitchFamily="18" charset="-120"/>
+                <a:cs typeface="Courier New" panose="02070309020205020404" pitchFamily="49" charset="0"/>
+              </a:rPr>
+              <a:t> </a:t>
+            </a:r>
+            <a:r>
               <a:rPr lang="en-US" altLang="zh-TW" sz="2400" dirty="0">
                 <a:solidFill>
                   <a:srgbClr val="4E5865"/>
                 </a:solidFill>
                 <a:ea typeface="新細明體" panose="02020500000000000000" pitchFamily="18" charset="-120"/>
               </a:rPr>
-              <a:t> script to request 1 node, 72 cores for 30 minutes and get the notification about job start/end by e-mail</a:t>
+              <a:t>script to request 1 node, 72 cores for 30 minutes and get the notification about job start/end by e-mail</a:t>
             </a:r>
           </a:p>
           <a:p>
@@ -8403,7 +8595,12 @@
             <p:ph type="title"/>
           </p:nvPr>
         </p:nvSpPr>
-        <p:spPr/>
+        <p:spPr>
+          <a:xfrm>
+            <a:off x="499153" y="282343"/>
+            <a:ext cx="10515600" cy="1325563"/>
+          </a:xfrm>
+        </p:spPr>
         <p:txBody>
           <a:bodyPr/>
           <a:lstStyle/>
@@ -8438,7 +8635,7 @@
         <p:spPr>
           <a:xfrm>
             <a:off x="287384" y="1619999"/>
-            <a:ext cx="11817530" cy="4872875"/>
+            <a:ext cx="11817530" cy="3630095"/>
           </a:xfrm>
         </p:spPr>
         <p:txBody>
@@ -8517,7 +8714,7 @@
                 </a:solidFill>
                 <a:ea typeface="新細明體" panose="02020500000000000000" pitchFamily="18" charset="-120"/>
               </a:rPr>
-              <a:t>	Check the resources usage (</a:t>
+              <a:t>	Check the resource usage (</a:t>
             </a:r>
             <a:r>
               <a:rPr lang="en-US" altLang="zh-TW" sz="2400" dirty="0" err="1">
@@ -8762,7 +8959,12 @@
             <p:ph type="title"/>
           </p:nvPr>
         </p:nvSpPr>
-        <p:spPr/>
+        <p:spPr>
+          <a:xfrm>
+            <a:off x="509427" y="289692"/>
+            <a:ext cx="10515600" cy="1325563"/>
+          </a:xfrm>
+        </p:spPr>
         <p:txBody>
           <a:bodyPr/>
           <a:lstStyle/>
@@ -9498,7 +9700,12 @@
             <p:ph type="title"/>
           </p:nvPr>
         </p:nvSpPr>
-        <p:spPr/>
+        <p:spPr>
+          <a:xfrm>
+            <a:off x="509427" y="294437"/>
+            <a:ext cx="10515600" cy="1325563"/>
+          </a:xfrm>
+        </p:spPr>
         <p:txBody>
           <a:bodyPr/>
           <a:lstStyle/>
@@ -9999,7 +10206,12 @@
             <p:ph type="title"/>
           </p:nvPr>
         </p:nvSpPr>
-        <p:spPr/>
+        <p:spPr>
+          <a:xfrm>
+            <a:off x="530874" y="329043"/>
+            <a:ext cx="10515600" cy="1325563"/>
+          </a:xfrm>
+        </p:spPr>
         <p:txBody>
           <a:bodyPr/>
           <a:lstStyle/>
@@ -10033,8 +10245,8 @@
         </p:nvSpPr>
         <p:spPr>
           <a:xfrm>
-            <a:off x="957942" y="1639662"/>
-            <a:ext cx="11234057" cy="4428000"/>
+            <a:off x="316477" y="1654606"/>
+            <a:ext cx="10904428" cy="3548787"/>
           </a:xfrm>
         </p:spPr>
         <p:txBody>
@@ -11893,6 +12105,83 @@
 </file>
 
 <file path=customXml/item1.xml><?xml version="1.0" encoding="utf-8"?>
+<?mso-contentType ?>
+<FormTemplates xmlns="http://schemas.microsoft.com/sharepoint/v3/contenttype/forms">
+  <Display>DocumentLibraryForm</Display>
+  <Edit>DocumentLibraryForm</Edit>
+  <New>DocumentLibraryForm</New>
+</FormTemplates>
+</file>
+
+<file path=customXml/item2.xml><?xml version="1.0" encoding="utf-8"?>
+<?mso-contentType ?>
+<customXsn xmlns="http://schemas.microsoft.com/office/2006/metadata/customXsn">
+  <xsnLocation/>
+  <cached>True</cached>
+  <openByDefault>True</openByDefault>
+  <xsnScope>/sites/hpc</xsnScope>
+</customXsn>
+</file>
+
+<file path=customXml/item3.xml><?xml version="1.0" encoding="utf-8"?>
+<?mso-contentType ?>
+<spe:Receivers xmlns:spe="http://schemas.microsoft.com/sharepoint/events">
+  <Receiver>
+    <Name>Document ID Generator</Name>
+    <Synchronization>Synchronous</Synchronization>
+    <Type>10001</Type>
+    <SequenceNumber>1000</SequenceNumber>
+    <Assembly>Microsoft.Office.DocumentManagement, Version=14.0.0.0, Culture=neutral, PublicKeyToken=71e9bce111e9429c</Assembly>
+    <Class>Microsoft.Office.DocumentManagement.Internal.DocIdHandler</Class>
+    <Data/>
+    <Filter/>
+  </Receiver>
+  <Receiver>
+    <Name>Document ID Generator</Name>
+    <Synchronization>Synchronous</Synchronization>
+    <Type>10002</Type>
+    <SequenceNumber>1001</SequenceNumber>
+    <Assembly>Microsoft.Office.DocumentManagement, Version=14.0.0.0, Culture=neutral, PublicKeyToken=71e9bce111e9429c</Assembly>
+    <Class>Microsoft.Office.DocumentManagement.Internal.DocIdHandler</Class>
+    <Data/>
+    <Filter/>
+  </Receiver>
+  <Receiver>
+    <Name>Document ID Generator</Name>
+    <Synchronization>Synchronous</Synchronization>
+    <Type>10004</Type>
+    <SequenceNumber>1002</SequenceNumber>
+    <Assembly>Microsoft.Office.DocumentManagement, Version=14.0.0.0, Culture=neutral, PublicKeyToken=71e9bce111e9429c</Assembly>
+    <Class>Microsoft.Office.DocumentManagement.Internal.DocIdHandler</Class>
+    <Data/>
+    <Filter/>
+  </Receiver>
+  <Receiver>
+    <Name>Document ID Generator</Name>
+    <Synchronization>Synchronous</Synchronization>
+    <Type>10006</Type>
+    <SequenceNumber>1003</SequenceNumber>
+    <Assembly>Microsoft.Office.DocumentManagement, Version=14.0.0.0, Culture=neutral, PublicKeyToken=71e9bce111e9429c</Assembly>
+    <Class>Microsoft.Office.DocumentManagement.Internal.DocIdHandler</Class>
+    <Data/>
+    <Filter/>
+  </Receiver>
+</spe:Receivers>
+</file>
+
+<file path=customXml/item4.xml><?xml version="1.0" encoding="utf-8"?>
+<p:properties xmlns:p="http://schemas.microsoft.com/office/2006/metadata/properties" xmlns:xsi="http://www.w3.org/2001/XMLSchema-instance" xmlns:pc="http://schemas.microsoft.com/office/infopath/2007/PartnerControls">
+  <documentManagement>
+    <_dlc_DocId xmlns="aff7d12c-bb71-4270-bd29-9c4d45ff3327">346bfafb-41a4-4705-9274-1725a8a4651c</_dlc_DocId>
+    <_dlc_DocIdUrl xmlns="aff7d12c-bb71-4270-bd29-9c4d45ff3327">
+      <Url>https://www.groupware.kuleuven.be/sites/hpc/_layouts/15/DocIdRedir.aspx?ID=346bfafb-41a4-4705-9274-1725a8a4651c</Url>
+      <Description>346bfafb-41a4-4705-9274-1725a8a4651c</Description>
+    </_dlc_DocIdUrl>
+  </documentManagement>
+</p:properties>
+</file>
+
+<file path=customXml/item5.xml><?xml version="1.0" encoding="utf-8"?>
 <ct:contentTypeSchema xmlns:ct="http://schemas.microsoft.com/office/2006/metadata/contentType" xmlns:ma="http://schemas.microsoft.com/office/2006/metadata/properties/metaAttributes" ct:_="" ma:_="" ma:contentTypeName="Document" ma:contentTypeID="0x010100317C36A1CAF973428CFB8DC9B5B73D030400A741C9874CC89F4CB7C7A5AE62CBCD36" ma:contentTypeVersion="2" ma:contentTypeDescription="" ma:contentTypeScope="" ma:versionID="2a5b37c1a06f9995b1548b8fc9b10188">
   <xsd:schema xmlns:xsd="http://www.w3.org/2001/XMLSchema" xmlns:xs="http://www.w3.org/2001/XMLSchema" xmlns:p="http://schemas.microsoft.com/office/2006/metadata/properties" xmlns:ns2="aff7d12c-bb71-4270-bd29-9c4d45ff3327" targetNamespace="http://schemas.microsoft.com/office/2006/metadata/properties" ma:root="true" ma:fieldsID="535495b15c0addd8af32a03863086e70" ns2:_="">
     <xsd:import namespace="aff7d12c-bb71-4270-bd29-9c4d45ff3327"/>
@@ -12037,84 +12326,47 @@
 </ct:contentTypeSchema>
 </file>
 
-<file path=customXml/item2.xml><?xml version="1.0" encoding="utf-8"?>
-<p:properties xmlns:p="http://schemas.microsoft.com/office/2006/metadata/properties" xmlns:xsi="http://www.w3.org/2001/XMLSchema-instance" xmlns:pc="http://schemas.microsoft.com/office/infopath/2007/PartnerControls">
-  <documentManagement>
-    <_dlc_DocId xmlns="aff7d12c-bb71-4270-bd29-9c4d45ff3327">346bfafb-41a4-4705-9274-1725a8a4651c</_dlc_DocId>
-    <_dlc_DocIdUrl xmlns="aff7d12c-bb71-4270-bd29-9c4d45ff3327">
-      <Url>https://www.groupware.kuleuven.be/sites/hpc/_layouts/15/DocIdRedir.aspx?ID=346bfafb-41a4-4705-9274-1725a8a4651c</Url>
-      <Description>346bfafb-41a4-4705-9274-1725a8a4651c</Description>
-    </_dlc_DocIdUrl>
-  </documentManagement>
-</p:properties>
+<file path=customXml/itemProps1.xml><?xml version="1.0" encoding="utf-8"?>
+<ds:datastoreItem xmlns:ds="http://schemas.openxmlformats.org/officeDocument/2006/customXml" ds:itemID="{564EE3F2-D13D-4835-816B-74B5A421851B}">
+  <ds:schemaRefs>
+    <ds:schemaRef ds:uri="http://schemas.microsoft.com/sharepoint/v3/contenttype/forms"/>
+  </ds:schemaRefs>
+</ds:datastoreItem>
 </file>
 
-<file path=customXml/item3.xml><?xml version="1.0" encoding="utf-8"?>
-<?mso-contentType ?>
-<spe:Receivers xmlns:spe="http://schemas.microsoft.com/sharepoint/events">
-  <Receiver>
-    <Name>Document ID Generator</Name>
-    <Synchronization>Synchronous</Synchronization>
-    <Type>10001</Type>
-    <SequenceNumber>1000</SequenceNumber>
-    <Assembly>Microsoft.Office.DocumentManagement, Version=14.0.0.0, Culture=neutral, PublicKeyToken=71e9bce111e9429c</Assembly>
-    <Class>Microsoft.Office.DocumentManagement.Internal.DocIdHandler</Class>
-    <Data/>
-    <Filter/>
-  </Receiver>
-  <Receiver>
-    <Name>Document ID Generator</Name>
-    <Synchronization>Synchronous</Synchronization>
-    <Type>10002</Type>
-    <SequenceNumber>1001</SequenceNumber>
-    <Assembly>Microsoft.Office.DocumentManagement, Version=14.0.0.0, Culture=neutral, PublicKeyToken=71e9bce111e9429c</Assembly>
-    <Class>Microsoft.Office.DocumentManagement.Internal.DocIdHandler</Class>
-    <Data/>
-    <Filter/>
-  </Receiver>
-  <Receiver>
-    <Name>Document ID Generator</Name>
-    <Synchronization>Synchronous</Synchronization>
-    <Type>10004</Type>
-    <SequenceNumber>1002</SequenceNumber>
-    <Assembly>Microsoft.Office.DocumentManagement, Version=14.0.0.0, Culture=neutral, PublicKeyToken=71e9bce111e9429c</Assembly>
-    <Class>Microsoft.Office.DocumentManagement.Internal.DocIdHandler</Class>
-    <Data/>
-    <Filter/>
-  </Receiver>
-  <Receiver>
-    <Name>Document ID Generator</Name>
-    <Synchronization>Synchronous</Synchronization>
-    <Type>10006</Type>
-    <SequenceNumber>1003</SequenceNumber>
-    <Assembly>Microsoft.Office.DocumentManagement, Version=14.0.0.0, Culture=neutral, PublicKeyToken=71e9bce111e9429c</Assembly>
-    <Class>Microsoft.Office.DocumentManagement.Internal.DocIdHandler</Class>
-    <Data/>
-    <Filter/>
-  </Receiver>
-</spe:Receivers>
+<file path=customXml/itemProps2.xml><?xml version="1.0" encoding="utf-8"?>
+<ds:datastoreItem xmlns:ds="http://schemas.openxmlformats.org/officeDocument/2006/customXml" ds:itemID="{F0EF99C1-AFFA-4072-A3F6-6A9C90E28E63}">
+  <ds:schemaRefs>
+    <ds:schemaRef ds:uri="http://schemas.microsoft.com/office/2006/metadata/customXsn"/>
+  </ds:schemaRefs>
+</ds:datastoreItem>
 </file>
 
-<file path=customXml/item4.xml><?xml version="1.0" encoding="utf-8"?>
-<?mso-contentType ?>
-<customXsn xmlns="http://schemas.microsoft.com/office/2006/metadata/customXsn">
-  <xsnLocation/>
-  <cached>True</cached>
-  <openByDefault>True</openByDefault>
-  <xsnScope>/sites/hpc</xsnScope>
-</customXsn>
+<file path=customXml/itemProps3.xml><?xml version="1.0" encoding="utf-8"?>
+<ds:datastoreItem xmlns:ds="http://schemas.openxmlformats.org/officeDocument/2006/customXml" ds:itemID="{7732E273-8A47-4E01-AC36-8FF8A6317757}">
+  <ds:schemaRefs>
+    <ds:schemaRef ds:uri="http://schemas.microsoft.com/sharepoint/events"/>
+  </ds:schemaRefs>
+</ds:datastoreItem>
 </file>
 
-<file path=customXml/item5.xml><?xml version="1.0" encoding="utf-8"?>
-<?mso-contentType ?>
-<FormTemplates xmlns="http://schemas.microsoft.com/sharepoint/v3/contenttype/forms">
-  <Display>DocumentLibraryForm</Display>
-  <Edit>DocumentLibraryForm</Edit>
-  <New>DocumentLibraryForm</New>
-</FormTemplates>
+<file path=customXml/itemProps4.xml><?xml version="1.0" encoding="utf-8"?>
+<ds:datastoreItem xmlns:ds="http://schemas.openxmlformats.org/officeDocument/2006/customXml" ds:itemID="{F0D56244-60B2-41FD-96AD-7AC25F221D7C}">
+  <ds:schemaRefs>
+    <ds:schemaRef ds:uri="http://schemas.microsoft.com/office/2006/documentManagement/types"/>
+    <ds:schemaRef ds:uri="http://purl.org/dc/terms/"/>
+    <ds:schemaRef ds:uri="aff7d12c-bb71-4270-bd29-9c4d45ff3327"/>
+    <ds:schemaRef ds:uri="http://purl.org/dc/dcmitype/"/>
+    <ds:schemaRef ds:uri="http://schemas.microsoft.com/office/infopath/2007/PartnerControls"/>
+    <ds:schemaRef ds:uri="http://purl.org/dc/elements/1.1/"/>
+    <ds:schemaRef ds:uri="http://schemas.microsoft.com/office/2006/metadata/properties"/>
+    <ds:schemaRef ds:uri="http://schemas.openxmlformats.org/package/2006/metadata/core-properties"/>
+    <ds:schemaRef ds:uri="http://www.w3.org/XML/1998/namespace"/>
+  </ds:schemaRefs>
+</ds:datastoreItem>
 </file>
 
-<file path=customXml/itemProps1.xml><?xml version="1.0" encoding="utf-8"?>
+<file path=customXml/itemProps5.xml><?xml version="1.0" encoding="utf-8"?>
 <ds:datastoreItem xmlns:ds="http://schemas.openxmlformats.org/officeDocument/2006/customXml" ds:itemID="{5D5B35C9-35F5-4278-990B-48710415D639}">
   <ds:schemaRefs>
     <ds:schemaRef ds:uri="http://schemas.microsoft.com/office/2006/metadata/contentType"/>
@@ -12130,44 +12382,4 @@
     <ds:schemaRef ds:uri="http://schemas.microsoft.com/internal/obd"/>
   </ds:schemaRefs>
 </ds:datastoreItem>
-</file>
-
-<file path=customXml/itemProps2.xml><?xml version="1.0" encoding="utf-8"?>
-<ds:datastoreItem xmlns:ds="http://schemas.openxmlformats.org/officeDocument/2006/customXml" ds:itemID="{F0D56244-60B2-41FD-96AD-7AC25F221D7C}">
-  <ds:schemaRefs>
-    <ds:schemaRef ds:uri="http://schemas.microsoft.com/office/2006/documentManagement/types"/>
-    <ds:schemaRef ds:uri="http://purl.org/dc/terms/"/>
-    <ds:schemaRef ds:uri="aff7d12c-bb71-4270-bd29-9c4d45ff3327"/>
-    <ds:schemaRef ds:uri="http://purl.org/dc/dcmitype/"/>
-    <ds:schemaRef ds:uri="http://schemas.microsoft.com/office/infopath/2007/PartnerControls"/>
-    <ds:schemaRef ds:uri="http://purl.org/dc/elements/1.1/"/>
-    <ds:schemaRef ds:uri="http://schemas.microsoft.com/office/2006/metadata/properties"/>
-    <ds:schemaRef ds:uri="http://schemas.openxmlformats.org/package/2006/metadata/core-properties"/>
-    <ds:schemaRef ds:uri="http://www.w3.org/XML/1998/namespace"/>
-  </ds:schemaRefs>
-</ds:datastoreItem>
-</file>
-
-<file path=customXml/itemProps3.xml><?xml version="1.0" encoding="utf-8"?>
-<ds:datastoreItem xmlns:ds="http://schemas.openxmlformats.org/officeDocument/2006/customXml" ds:itemID="{7732E273-8A47-4E01-AC36-8FF8A6317757}">
-  <ds:schemaRefs>
-    <ds:schemaRef ds:uri="http://schemas.microsoft.com/sharepoint/events"/>
-  </ds:schemaRefs>
-</ds:datastoreItem>
-</file>
-
-<file path=customXml/itemProps4.xml><?xml version="1.0" encoding="utf-8"?>
-<ds:datastoreItem xmlns:ds="http://schemas.openxmlformats.org/officeDocument/2006/customXml" ds:itemID="{F0EF99C1-AFFA-4072-A3F6-6A9C90E28E63}">
-  <ds:schemaRefs>
-    <ds:schemaRef ds:uri="http://schemas.microsoft.com/office/2006/metadata/customXsn"/>
-  </ds:schemaRefs>
-</ds:datastoreItem>
-</file>
-
-<file path=customXml/itemProps5.xml><?xml version="1.0" encoding="utf-8"?>
-<ds:datastoreItem xmlns:ds="http://schemas.openxmlformats.org/officeDocument/2006/customXml" ds:itemID="{564EE3F2-D13D-4835-816B-74B5A421851B}">
-  <ds:schemaRefs>
-    <ds:schemaRef ds:uri="http://schemas.microsoft.com/sharepoint/v3/contenttype/forms"/>
-  </ds:schemaRefs>
-</ds:datastoreItem>
 </file>
</xml_diff>

<commit_message>
update status page url
</commit_message>
<xml_diff>
--- a/VSCintro-demo.pptx
+++ b/VSCintro-demo.pptx
@@ -233,7 +233,7 @@
           <a:p>
             <a:fld id="{01F519A0-78CB-4E85-BDD7-0175329041AC}" type="datetimeFigureOut">
               <a:rPr lang="en-US" smtClean="0"/>
-              <a:t>12/13/2023</a:t>
+              <a:t>1/11/2024</a:t>
             </a:fld>
             <a:endParaRPr lang="en-US"/>
           </a:p>
@@ -399,7 +399,7 @@
           <a:p>
             <a:fld id="{337BDF4F-FAE4-4E7A-B003-7AAF79F14F3C}" type="datetimeFigureOut">
               <a:rPr lang="en-US" smtClean="0"/>
-              <a:t>12/13/2023</a:t>
+              <a:t>1/11/2024</a:t>
             </a:fld>
             <a:endParaRPr lang="en-US"/>
           </a:p>
@@ -1303,7 +1303,7 @@
           <a:p>
             <a:fld id="{12D417FB-DB75-4510-8AD7-5416595AADD8}" type="datetime1">
               <a:rPr lang="en-US" smtClean="0"/>
-              <a:t>12/13/2023</a:t>
+              <a:t>1/11/2024</a:t>
             </a:fld>
             <a:endParaRPr lang="en-US"/>
           </a:p>
@@ -1848,7 +1848,7 @@
           <a:p>
             <a:fld id="{1C565815-05F0-455F-BBD6-9680ABD9D1CB}" type="datetimeFigureOut">
               <a:rPr lang="en-US" smtClean="0"/>
-              <a:t>12/13/2023</a:t>
+              <a:t>1/11/2024</a:t>
             </a:fld>
             <a:endParaRPr lang="en-US"/>
           </a:p>
@@ -2212,7 +2212,7 @@
           <a:p>
             <a:fld id="{1C565815-05F0-455F-BBD6-9680ABD9D1CB}" type="datetimeFigureOut">
               <a:rPr lang="en-US" smtClean="0"/>
-              <a:t>12/13/2023</a:t>
+              <a:t>1/11/2024</a:t>
             </a:fld>
             <a:endParaRPr lang="en-US"/>
           </a:p>
@@ -2329,7 +2329,7 @@
           <a:p>
             <a:fld id="{1C565815-05F0-455F-BBD6-9680ABD9D1CB}" type="datetimeFigureOut">
               <a:rPr lang="en-US" smtClean="0"/>
-              <a:t>12/13/2023</a:t>
+              <a:t>1/11/2024</a:t>
             </a:fld>
             <a:endParaRPr lang="en-US"/>
           </a:p>
@@ -2424,7 +2424,7 @@
           <a:p>
             <a:fld id="{1C565815-05F0-455F-BBD6-9680ABD9D1CB}" type="datetimeFigureOut">
               <a:rPr lang="en-US" smtClean="0"/>
-              <a:t>12/13/2023</a:t>
+              <a:t>1/11/2024</a:t>
             </a:fld>
             <a:endParaRPr lang="en-US"/>
           </a:p>
@@ -2699,7 +2699,7 @@
           <a:p>
             <a:fld id="{1C565815-05F0-455F-BBD6-9680ABD9D1CB}" type="datetimeFigureOut">
               <a:rPr lang="en-US" smtClean="0"/>
-              <a:t>12/13/2023</a:t>
+              <a:t>1/11/2024</a:t>
             </a:fld>
             <a:endParaRPr lang="en-US"/>
           </a:p>
@@ -2951,7 +2951,7 @@
           <a:p>
             <a:fld id="{1C565815-05F0-455F-BBD6-9680ABD9D1CB}" type="datetimeFigureOut">
               <a:rPr lang="en-US" smtClean="0"/>
-              <a:t>12/13/2023</a:t>
+              <a:t>1/11/2024</a:t>
             </a:fld>
             <a:endParaRPr lang="en-US"/>
           </a:p>
@@ -3119,7 +3119,7 @@
           <a:p>
             <a:fld id="{1C565815-05F0-455F-BBD6-9680ABD9D1CB}" type="datetimeFigureOut">
               <a:rPr lang="en-US" smtClean="0"/>
-              <a:t>12/13/2023</a:t>
+              <a:t>1/11/2024</a:t>
             </a:fld>
             <a:endParaRPr lang="en-US"/>
           </a:p>
@@ -3297,7 +3297,7 @@
           <a:p>
             <a:fld id="{1C565815-05F0-455F-BBD6-9680ABD9D1CB}" type="datetimeFigureOut">
               <a:rPr lang="en-US" smtClean="0"/>
-              <a:t>12/13/2023</a:t>
+              <a:t>1/11/2024</a:t>
             </a:fld>
             <a:endParaRPr lang="en-US"/>
           </a:p>
@@ -4104,7 +4104,7 @@
           <a:p>
             <a:fld id="{A1FA2290-0477-46BB-87A2-28AB474124F3}" type="datetime1">
               <a:rPr lang="nl-BE" smtClean="0"/>
-              <a:t>13/12/2023</a:t>
+              <a:t>11/01/2024</a:t>
             </a:fld>
             <a:endParaRPr lang="nl-BE" dirty="0"/>
           </a:p>
@@ -4370,7 +4370,7 @@
           <a:p>
             <a:fld id="{1C565815-05F0-455F-BBD6-9680ABD9D1CB}" type="datetimeFigureOut">
               <a:rPr lang="en-US" smtClean="0"/>
-              <a:t>12/13/2023</a:t>
+              <a:t>1/11/2024</a:t>
             </a:fld>
             <a:endParaRPr lang="en-US"/>
           </a:p>
@@ -4568,7 +4568,7 @@
           <a:p>
             <a:fld id="{1C565815-05F0-455F-BBD6-9680ABD9D1CB}" type="datetimeFigureOut">
               <a:rPr lang="en-US" smtClean="0"/>
-              <a:t>12/13/2023</a:t>
+              <a:t>1/11/2024</a:t>
             </a:fld>
             <a:endParaRPr lang="en-US"/>
           </a:p>
@@ -4813,7 +4813,7 @@
           <a:p>
             <a:fld id="{1C565815-05F0-455F-BBD6-9680ABD9D1CB}" type="datetimeFigureOut">
               <a:rPr lang="en-US" smtClean="0"/>
-              <a:t>12/13/2023</a:t>
+              <a:t>1/11/2024</a:t>
             </a:fld>
             <a:endParaRPr lang="en-US"/>
           </a:p>
@@ -5653,7 +5653,7 @@
           <a:p>
             <a:fld id="{1C565815-05F0-455F-BBD6-9680ABD9D1CB}" type="datetimeFigureOut">
               <a:rPr lang="en-US" smtClean="0"/>
-              <a:t>12/13/2023</a:t>
+              <a:t>1/11/2024</a:t>
             </a:fld>
             <a:endParaRPr lang="en-US"/>
           </a:p>
@@ -11048,19 +11048,12 @@
               <a:rPr lang="en-US" altLang="en-US" sz="2200" dirty="0"/>
             </a:br>
             <a:r>
-              <a:rPr lang="nl-BE" altLang="en-US" sz="2200" dirty="0">
+              <a:rPr lang="nl-BE" altLang="en-US" sz="2200">
                 <a:solidFill>
                   <a:srgbClr val="DB6C30"/>
                 </a:solidFill>
-                <a:hlinkClick r:id="rId5">
-                  <a:extLst>
-                    <a:ext uri="{A12FA001-AC4F-418D-AE19-62706E023703}">
-                      <ahyp:hlinkClr xmlns:ahyp="http://schemas.microsoft.com/office/drawing/2018/hyperlinkcolor" val="tx"/>
-                    </a:ext>
-                  </a:extLst>
-                </a:hlinkClick>
-              </a:rPr>
-              <a:t>http://status.kuleuven.be/hpc</a:t>
+              </a:rPr>
+              <a:t>https://status.vscentrum.be</a:t>
             </a:r>
             <a:endParaRPr lang="pl-PL" altLang="en-US" sz="2200" dirty="0">
               <a:solidFill>
@@ -12105,83 +12098,6 @@
 </file>
 
 <file path=customXml/item1.xml><?xml version="1.0" encoding="utf-8"?>
-<?mso-contentType ?>
-<FormTemplates xmlns="http://schemas.microsoft.com/sharepoint/v3/contenttype/forms">
-  <Display>DocumentLibraryForm</Display>
-  <Edit>DocumentLibraryForm</Edit>
-  <New>DocumentLibraryForm</New>
-</FormTemplates>
-</file>
-
-<file path=customXml/item2.xml><?xml version="1.0" encoding="utf-8"?>
-<?mso-contentType ?>
-<customXsn xmlns="http://schemas.microsoft.com/office/2006/metadata/customXsn">
-  <xsnLocation/>
-  <cached>True</cached>
-  <openByDefault>True</openByDefault>
-  <xsnScope>/sites/hpc</xsnScope>
-</customXsn>
-</file>
-
-<file path=customXml/item3.xml><?xml version="1.0" encoding="utf-8"?>
-<?mso-contentType ?>
-<spe:Receivers xmlns:spe="http://schemas.microsoft.com/sharepoint/events">
-  <Receiver>
-    <Name>Document ID Generator</Name>
-    <Synchronization>Synchronous</Synchronization>
-    <Type>10001</Type>
-    <SequenceNumber>1000</SequenceNumber>
-    <Assembly>Microsoft.Office.DocumentManagement, Version=14.0.0.0, Culture=neutral, PublicKeyToken=71e9bce111e9429c</Assembly>
-    <Class>Microsoft.Office.DocumentManagement.Internal.DocIdHandler</Class>
-    <Data/>
-    <Filter/>
-  </Receiver>
-  <Receiver>
-    <Name>Document ID Generator</Name>
-    <Synchronization>Synchronous</Synchronization>
-    <Type>10002</Type>
-    <SequenceNumber>1001</SequenceNumber>
-    <Assembly>Microsoft.Office.DocumentManagement, Version=14.0.0.0, Culture=neutral, PublicKeyToken=71e9bce111e9429c</Assembly>
-    <Class>Microsoft.Office.DocumentManagement.Internal.DocIdHandler</Class>
-    <Data/>
-    <Filter/>
-  </Receiver>
-  <Receiver>
-    <Name>Document ID Generator</Name>
-    <Synchronization>Synchronous</Synchronization>
-    <Type>10004</Type>
-    <SequenceNumber>1002</SequenceNumber>
-    <Assembly>Microsoft.Office.DocumentManagement, Version=14.0.0.0, Culture=neutral, PublicKeyToken=71e9bce111e9429c</Assembly>
-    <Class>Microsoft.Office.DocumentManagement.Internal.DocIdHandler</Class>
-    <Data/>
-    <Filter/>
-  </Receiver>
-  <Receiver>
-    <Name>Document ID Generator</Name>
-    <Synchronization>Synchronous</Synchronization>
-    <Type>10006</Type>
-    <SequenceNumber>1003</SequenceNumber>
-    <Assembly>Microsoft.Office.DocumentManagement, Version=14.0.0.0, Culture=neutral, PublicKeyToken=71e9bce111e9429c</Assembly>
-    <Class>Microsoft.Office.DocumentManagement.Internal.DocIdHandler</Class>
-    <Data/>
-    <Filter/>
-  </Receiver>
-</spe:Receivers>
-</file>
-
-<file path=customXml/item4.xml><?xml version="1.0" encoding="utf-8"?>
-<p:properties xmlns:p="http://schemas.microsoft.com/office/2006/metadata/properties" xmlns:xsi="http://www.w3.org/2001/XMLSchema-instance" xmlns:pc="http://schemas.microsoft.com/office/infopath/2007/PartnerControls">
-  <documentManagement>
-    <_dlc_DocId xmlns="aff7d12c-bb71-4270-bd29-9c4d45ff3327">346bfafb-41a4-4705-9274-1725a8a4651c</_dlc_DocId>
-    <_dlc_DocIdUrl xmlns="aff7d12c-bb71-4270-bd29-9c4d45ff3327">
-      <Url>https://www.groupware.kuleuven.be/sites/hpc/_layouts/15/DocIdRedir.aspx?ID=346bfafb-41a4-4705-9274-1725a8a4651c</Url>
-      <Description>346bfafb-41a4-4705-9274-1725a8a4651c</Description>
-    </_dlc_DocIdUrl>
-  </documentManagement>
-</p:properties>
-</file>
-
-<file path=customXml/item5.xml><?xml version="1.0" encoding="utf-8"?>
 <ct:contentTypeSchema xmlns:ct="http://schemas.microsoft.com/office/2006/metadata/contentType" xmlns:ma="http://schemas.microsoft.com/office/2006/metadata/properties/metaAttributes" ct:_="" ma:_="" ma:contentTypeName="Document" ma:contentTypeID="0x010100317C36A1CAF973428CFB8DC9B5B73D030400A741C9874CC89F4CB7C7A5AE62CBCD36" ma:contentTypeVersion="2" ma:contentTypeDescription="" ma:contentTypeScope="" ma:versionID="2a5b37c1a06f9995b1548b8fc9b10188">
   <xsd:schema xmlns:xsd="http://www.w3.org/2001/XMLSchema" xmlns:xs="http://www.w3.org/2001/XMLSchema" xmlns:p="http://schemas.microsoft.com/office/2006/metadata/properties" xmlns:ns2="aff7d12c-bb71-4270-bd29-9c4d45ff3327" targetNamespace="http://schemas.microsoft.com/office/2006/metadata/properties" ma:root="true" ma:fieldsID="535495b15c0addd8af32a03863086e70" ns2:_="">
     <xsd:import namespace="aff7d12c-bb71-4270-bd29-9c4d45ff3327"/>
@@ -12326,31 +12242,102 @@
 </ct:contentTypeSchema>
 </file>
 
+<file path=customXml/item2.xml><?xml version="1.0" encoding="utf-8"?>
+<p:properties xmlns:p="http://schemas.microsoft.com/office/2006/metadata/properties" xmlns:xsi="http://www.w3.org/2001/XMLSchema-instance" xmlns:pc="http://schemas.microsoft.com/office/infopath/2007/PartnerControls">
+  <documentManagement>
+    <_dlc_DocId xmlns="aff7d12c-bb71-4270-bd29-9c4d45ff3327">346bfafb-41a4-4705-9274-1725a8a4651c</_dlc_DocId>
+    <_dlc_DocIdUrl xmlns="aff7d12c-bb71-4270-bd29-9c4d45ff3327">
+      <Url>https://www.groupware.kuleuven.be/sites/hpc/_layouts/15/DocIdRedir.aspx?ID=346bfafb-41a4-4705-9274-1725a8a4651c</Url>
+      <Description>346bfafb-41a4-4705-9274-1725a8a4651c</Description>
+    </_dlc_DocIdUrl>
+  </documentManagement>
+</p:properties>
+</file>
+
+<file path=customXml/item3.xml><?xml version="1.0" encoding="utf-8"?>
+<?mso-contentType ?>
+<spe:Receivers xmlns:spe="http://schemas.microsoft.com/sharepoint/events">
+  <Receiver>
+    <Name>Document ID Generator</Name>
+    <Synchronization>Synchronous</Synchronization>
+    <Type>10001</Type>
+    <SequenceNumber>1000</SequenceNumber>
+    <Assembly>Microsoft.Office.DocumentManagement, Version=14.0.0.0, Culture=neutral, PublicKeyToken=71e9bce111e9429c</Assembly>
+    <Class>Microsoft.Office.DocumentManagement.Internal.DocIdHandler</Class>
+    <Data/>
+    <Filter/>
+  </Receiver>
+  <Receiver>
+    <Name>Document ID Generator</Name>
+    <Synchronization>Synchronous</Synchronization>
+    <Type>10002</Type>
+    <SequenceNumber>1001</SequenceNumber>
+    <Assembly>Microsoft.Office.DocumentManagement, Version=14.0.0.0, Culture=neutral, PublicKeyToken=71e9bce111e9429c</Assembly>
+    <Class>Microsoft.Office.DocumentManagement.Internal.DocIdHandler</Class>
+    <Data/>
+    <Filter/>
+  </Receiver>
+  <Receiver>
+    <Name>Document ID Generator</Name>
+    <Synchronization>Synchronous</Synchronization>
+    <Type>10004</Type>
+    <SequenceNumber>1002</SequenceNumber>
+    <Assembly>Microsoft.Office.DocumentManagement, Version=14.0.0.0, Culture=neutral, PublicKeyToken=71e9bce111e9429c</Assembly>
+    <Class>Microsoft.Office.DocumentManagement.Internal.DocIdHandler</Class>
+    <Data/>
+    <Filter/>
+  </Receiver>
+  <Receiver>
+    <Name>Document ID Generator</Name>
+    <Synchronization>Synchronous</Synchronization>
+    <Type>10006</Type>
+    <SequenceNumber>1003</SequenceNumber>
+    <Assembly>Microsoft.Office.DocumentManagement, Version=14.0.0.0, Culture=neutral, PublicKeyToken=71e9bce111e9429c</Assembly>
+    <Class>Microsoft.Office.DocumentManagement.Internal.DocIdHandler</Class>
+    <Data/>
+    <Filter/>
+  </Receiver>
+</spe:Receivers>
+</file>
+
+<file path=customXml/item4.xml><?xml version="1.0" encoding="utf-8"?>
+<?mso-contentType ?>
+<customXsn xmlns="http://schemas.microsoft.com/office/2006/metadata/customXsn">
+  <xsnLocation/>
+  <cached>True</cached>
+  <openByDefault>True</openByDefault>
+  <xsnScope>/sites/hpc</xsnScope>
+</customXsn>
+</file>
+
+<file path=customXml/item5.xml><?xml version="1.0" encoding="utf-8"?>
+<?mso-contentType ?>
+<FormTemplates xmlns="http://schemas.microsoft.com/sharepoint/v3/contenttype/forms">
+  <Display>DocumentLibraryForm</Display>
+  <Edit>DocumentLibraryForm</Edit>
+  <New>DocumentLibraryForm</New>
+</FormTemplates>
+</file>
+
 <file path=customXml/itemProps1.xml><?xml version="1.0" encoding="utf-8"?>
-<ds:datastoreItem xmlns:ds="http://schemas.openxmlformats.org/officeDocument/2006/customXml" ds:itemID="{564EE3F2-D13D-4835-816B-74B5A421851B}">
+<ds:datastoreItem xmlns:ds="http://schemas.openxmlformats.org/officeDocument/2006/customXml" ds:itemID="{5D5B35C9-35F5-4278-990B-48710415D639}">
   <ds:schemaRefs>
-    <ds:schemaRef ds:uri="http://schemas.microsoft.com/sharepoint/v3/contenttype/forms"/>
+    <ds:schemaRef ds:uri="http://schemas.microsoft.com/office/2006/metadata/contentType"/>
+    <ds:schemaRef ds:uri="http://schemas.microsoft.com/office/2006/metadata/properties/metaAttributes"/>
+    <ds:schemaRef ds:uri="http://www.w3.org/2001/XMLSchema"/>
+    <ds:schemaRef ds:uri="http://schemas.microsoft.com/office/2006/metadata/properties"/>
+    <ds:schemaRef ds:uri="aff7d12c-bb71-4270-bd29-9c4d45ff3327"/>
+    <ds:schemaRef ds:uri="http://schemas.microsoft.com/office/2006/documentManagement/types"/>
+    <ds:schemaRef ds:uri="http://schemas.microsoft.com/office/infopath/2007/PartnerControls"/>
+    <ds:schemaRef ds:uri="http://schemas.openxmlformats.org/package/2006/metadata/core-properties"/>
+    <ds:schemaRef ds:uri="http://purl.org/dc/elements/1.1/"/>
+    <ds:schemaRef ds:uri="http://purl.org/dc/terms/"/>
+    <ds:schemaRef ds:uri="http://schemas.microsoft.com/internal/obd"/>
   </ds:schemaRefs>
 </ds:datastoreItem>
 </file>
 
 <file path=customXml/itemProps2.xml><?xml version="1.0" encoding="utf-8"?>
-<ds:datastoreItem xmlns:ds="http://schemas.openxmlformats.org/officeDocument/2006/customXml" ds:itemID="{F0EF99C1-AFFA-4072-A3F6-6A9C90E28E63}">
-  <ds:schemaRefs>
-    <ds:schemaRef ds:uri="http://schemas.microsoft.com/office/2006/metadata/customXsn"/>
-  </ds:schemaRefs>
-</ds:datastoreItem>
-</file>
-
-<file path=customXml/itemProps3.xml><?xml version="1.0" encoding="utf-8"?>
-<ds:datastoreItem xmlns:ds="http://schemas.openxmlformats.org/officeDocument/2006/customXml" ds:itemID="{7732E273-8A47-4E01-AC36-8FF8A6317757}">
-  <ds:schemaRefs>
-    <ds:schemaRef ds:uri="http://schemas.microsoft.com/sharepoint/events"/>
-  </ds:schemaRefs>
-</ds:datastoreItem>
-</file>
-
-<file path=customXml/itemProps4.xml><?xml version="1.0" encoding="utf-8"?>
 <ds:datastoreItem xmlns:ds="http://schemas.openxmlformats.org/officeDocument/2006/customXml" ds:itemID="{F0D56244-60B2-41FD-96AD-7AC25F221D7C}">
   <ds:schemaRefs>
     <ds:schemaRef ds:uri="http://schemas.microsoft.com/office/2006/documentManagement/types"/>
@@ -12366,20 +12353,26 @@
 </ds:datastoreItem>
 </file>
 
+<file path=customXml/itemProps3.xml><?xml version="1.0" encoding="utf-8"?>
+<ds:datastoreItem xmlns:ds="http://schemas.openxmlformats.org/officeDocument/2006/customXml" ds:itemID="{7732E273-8A47-4E01-AC36-8FF8A6317757}">
+  <ds:schemaRefs>
+    <ds:schemaRef ds:uri="http://schemas.microsoft.com/sharepoint/events"/>
+  </ds:schemaRefs>
+</ds:datastoreItem>
+</file>
+
+<file path=customXml/itemProps4.xml><?xml version="1.0" encoding="utf-8"?>
+<ds:datastoreItem xmlns:ds="http://schemas.openxmlformats.org/officeDocument/2006/customXml" ds:itemID="{F0EF99C1-AFFA-4072-A3F6-6A9C90E28E63}">
+  <ds:schemaRefs>
+    <ds:schemaRef ds:uri="http://schemas.microsoft.com/office/2006/metadata/customXsn"/>
+  </ds:schemaRefs>
+</ds:datastoreItem>
+</file>
+
 <file path=customXml/itemProps5.xml><?xml version="1.0" encoding="utf-8"?>
-<ds:datastoreItem xmlns:ds="http://schemas.openxmlformats.org/officeDocument/2006/customXml" ds:itemID="{5D5B35C9-35F5-4278-990B-48710415D639}">
+<ds:datastoreItem xmlns:ds="http://schemas.openxmlformats.org/officeDocument/2006/customXml" ds:itemID="{564EE3F2-D13D-4835-816B-74B5A421851B}">
   <ds:schemaRefs>
-    <ds:schemaRef ds:uri="http://schemas.microsoft.com/office/2006/metadata/contentType"/>
-    <ds:schemaRef ds:uri="http://schemas.microsoft.com/office/2006/metadata/properties/metaAttributes"/>
-    <ds:schemaRef ds:uri="http://www.w3.org/2001/XMLSchema"/>
-    <ds:schemaRef ds:uri="http://schemas.microsoft.com/office/2006/metadata/properties"/>
-    <ds:schemaRef ds:uri="aff7d12c-bb71-4270-bd29-9c4d45ff3327"/>
-    <ds:schemaRef ds:uri="http://schemas.microsoft.com/office/2006/documentManagement/types"/>
-    <ds:schemaRef ds:uri="http://schemas.microsoft.com/office/infopath/2007/PartnerControls"/>
-    <ds:schemaRef ds:uri="http://schemas.openxmlformats.org/package/2006/metadata/core-properties"/>
-    <ds:schemaRef ds:uri="http://purl.org/dc/elements/1.1/"/>
-    <ds:schemaRef ds:uri="http://purl.org/dc/terms/"/>
-    <ds:schemaRef ds:uri="http://schemas.microsoft.com/internal/obd"/>
+    <ds:schemaRef ds:uri="http://schemas.microsoft.com/sharepoint/v3/contenttype/forms"/>
   </ds:schemaRefs>
 </ds:datastoreItem>
 </file>
</xml_diff>

<commit_message>
adding user day to events
</commit_message>
<xml_diff>
--- a/VSCintro-demo.pptx
+++ b/VSCintro-demo.pptx
@@ -233,7 +233,7 @@
           <a:p>
             <a:fld id="{01F519A0-78CB-4E85-BDD7-0175329041AC}" type="datetimeFigureOut">
               <a:rPr lang="en-US" smtClean="0"/>
-              <a:t>1/11/2024</a:t>
+              <a:t>6/13/2025</a:t>
             </a:fld>
             <a:endParaRPr lang="en-US"/>
           </a:p>
@@ -399,7 +399,7 @@
           <a:p>
             <a:fld id="{337BDF4F-FAE4-4E7A-B003-7AAF79F14F3C}" type="datetimeFigureOut">
               <a:rPr lang="en-US" smtClean="0"/>
-              <a:t>1/11/2024</a:t>
+              <a:t>6/13/2025</a:t>
             </a:fld>
             <a:endParaRPr lang="en-US"/>
           </a:p>
@@ -1303,7 +1303,7 @@
           <a:p>
             <a:fld id="{12D417FB-DB75-4510-8AD7-5416595AADD8}" type="datetime1">
               <a:rPr lang="en-US" smtClean="0"/>
-              <a:t>1/11/2024</a:t>
+              <a:t>6/13/2025</a:t>
             </a:fld>
             <a:endParaRPr lang="en-US"/>
           </a:p>
@@ -1848,7 +1848,7 @@
           <a:p>
             <a:fld id="{1C565815-05F0-455F-BBD6-9680ABD9D1CB}" type="datetimeFigureOut">
               <a:rPr lang="en-US" smtClean="0"/>
-              <a:t>1/11/2024</a:t>
+              <a:t>6/13/2025</a:t>
             </a:fld>
             <a:endParaRPr lang="en-US"/>
           </a:p>
@@ -2212,7 +2212,7 @@
           <a:p>
             <a:fld id="{1C565815-05F0-455F-BBD6-9680ABD9D1CB}" type="datetimeFigureOut">
               <a:rPr lang="en-US" smtClean="0"/>
-              <a:t>1/11/2024</a:t>
+              <a:t>6/13/2025</a:t>
             </a:fld>
             <a:endParaRPr lang="en-US"/>
           </a:p>
@@ -2329,7 +2329,7 @@
           <a:p>
             <a:fld id="{1C565815-05F0-455F-BBD6-9680ABD9D1CB}" type="datetimeFigureOut">
               <a:rPr lang="en-US" smtClean="0"/>
-              <a:t>1/11/2024</a:t>
+              <a:t>6/13/2025</a:t>
             </a:fld>
             <a:endParaRPr lang="en-US"/>
           </a:p>
@@ -2424,7 +2424,7 @@
           <a:p>
             <a:fld id="{1C565815-05F0-455F-BBD6-9680ABD9D1CB}" type="datetimeFigureOut">
               <a:rPr lang="en-US" smtClean="0"/>
-              <a:t>1/11/2024</a:t>
+              <a:t>6/13/2025</a:t>
             </a:fld>
             <a:endParaRPr lang="en-US"/>
           </a:p>
@@ -2699,7 +2699,7 @@
           <a:p>
             <a:fld id="{1C565815-05F0-455F-BBD6-9680ABD9D1CB}" type="datetimeFigureOut">
               <a:rPr lang="en-US" smtClean="0"/>
-              <a:t>1/11/2024</a:t>
+              <a:t>6/13/2025</a:t>
             </a:fld>
             <a:endParaRPr lang="en-US"/>
           </a:p>
@@ -2951,7 +2951,7 @@
           <a:p>
             <a:fld id="{1C565815-05F0-455F-BBD6-9680ABD9D1CB}" type="datetimeFigureOut">
               <a:rPr lang="en-US" smtClean="0"/>
-              <a:t>1/11/2024</a:t>
+              <a:t>6/13/2025</a:t>
             </a:fld>
             <a:endParaRPr lang="en-US"/>
           </a:p>
@@ -3119,7 +3119,7 @@
           <a:p>
             <a:fld id="{1C565815-05F0-455F-BBD6-9680ABD9D1CB}" type="datetimeFigureOut">
               <a:rPr lang="en-US" smtClean="0"/>
-              <a:t>1/11/2024</a:t>
+              <a:t>6/13/2025</a:t>
             </a:fld>
             <a:endParaRPr lang="en-US"/>
           </a:p>
@@ -3297,7 +3297,7 @@
           <a:p>
             <a:fld id="{1C565815-05F0-455F-BBD6-9680ABD9D1CB}" type="datetimeFigureOut">
               <a:rPr lang="en-US" smtClean="0"/>
-              <a:t>1/11/2024</a:t>
+              <a:t>6/13/2025</a:t>
             </a:fld>
             <a:endParaRPr lang="en-US"/>
           </a:p>
@@ -4104,7 +4104,7 @@
           <a:p>
             <a:fld id="{A1FA2290-0477-46BB-87A2-28AB474124F3}" type="datetime1">
               <a:rPr lang="nl-BE" smtClean="0"/>
-              <a:t>11/01/2024</a:t>
+              <a:t>13/06/2025</a:t>
             </a:fld>
             <a:endParaRPr lang="nl-BE" dirty="0"/>
           </a:p>
@@ -4370,7 +4370,7 @@
           <a:p>
             <a:fld id="{1C565815-05F0-455F-BBD6-9680ABD9D1CB}" type="datetimeFigureOut">
               <a:rPr lang="en-US" smtClean="0"/>
-              <a:t>1/11/2024</a:t>
+              <a:t>6/13/2025</a:t>
             </a:fld>
             <a:endParaRPr lang="en-US"/>
           </a:p>
@@ -4568,7 +4568,7 @@
           <a:p>
             <a:fld id="{1C565815-05F0-455F-BBD6-9680ABD9D1CB}" type="datetimeFigureOut">
               <a:rPr lang="en-US" smtClean="0"/>
-              <a:t>1/11/2024</a:t>
+              <a:t>6/13/2025</a:t>
             </a:fld>
             <a:endParaRPr lang="en-US"/>
           </a:p>
@@ -4813,7 +4813,7 @@
           <a:p>
             <a:fld id="{1C565815-05F0-455F-BBD6-9680ABD9D1CB}" type="datetimeFigureOut">
               <a:rPr lang="en-US" smtClean="0"/>
-              <a:t>1/11/2024</a:t>
+              <a:t>6/13/2025</a:t>
             </a:fld>
             <a:endParaRPr lang="en-US"/>
           </a:p>
@@ -5653,7 +5653,7 @@
           <a:p>
             <a:fld id="{1C565815-05F0-455F-BBD6-9680ABD9D1CB}" type="datetimeFigureOut">
               <a:rPr lang="en-US" smtClean="0"/>
-              <a:t>1/11/2024</a:t>
+              <a:t>6/13/2025</a:t>
             </a:fld>
             <a:endParaRPr lang="en-US"/>
           </a:p>
@@ -11033,8 +11033,13 @@
           <a:p>
             <a:r>
               <a:rPr lang="en-US" altLang="en-US" sz="2200" dirty="0"/>
-              <a:t>VSC agenda: training sessions, events</a:t>
-            </a:r>
+              <a:t>VSC agenda: training sessions, events (VSC and </a:t>
+            </a:r>
+            <a:r>
+              <a:rPr lang="en-US" altLang="en-US" sz="2200"/>
+              <a:t>KU Leuven user days)</a:t>
+            </a:r>
+            <a:endParaRPr lang="en-US" altLang="en-US" sz="2200" dirty="0"/>
           </a:p>
           <a:p>
             <a:endParaRPr lang="en-US" altLang="en-US" sz="2200" dirty="0"/>
@@ -11048,7 +11053,7 @@
               <a:rPr lang="en-US" altLang="en-US" sz="2200" dirty="0"/>
             </a:br>
             <a:r>
-              <a:rPr lang="nl-BE" altLang="en-US" sz="2200">
+              <a:rPr lang="nl-BE" altLang="en-US" sz="2200" dirty="0">
                 <a:solidFill>
                   <a:srgbClr val="DB6C30"/>
                 </a:solidFill>
@@ -12098,6 +12103,18 @@
 </file>
 
 <file path=customXml/item1.xml><?xml version="1.0" encoding="utf-8"?>
+<p:properties xmlns:p="http://schemas.microsoft.com/office/2006/metadata/properties" xmlns:xsi="http://www.w3.org/2001/XMLSchema-instance" xmlns:pc="http://schemas.microsoft.com/office/infopath/2007/PartnerControls">
+  <documentManagement>
+    <_dlc_DocId xmlns="aff7d12c-bb71-4270-bd29-9c4d45ff3327">346bfafb-41a4-4705-9274-1725a8a4651c</_dlc_DocId>
+    <_dlc_DocIdUrl xmlns="aff7d12c-bb71-4270-bd29-9c4d45ff3327">
+      <Url>https://www.groupware.kuleuven.be/sites/hpc/_layouts/15/DocIdRedir.aspx?ID=346bfafb-41a4-4705-9274-1725a8a4651c</Url>
+      <Description>346bfafb-41a4-4705-9274-1725a8a4651c</Description>
+    </_dlc_DocIdUrl>
+  </documentManagement>
+</p:properties>
+</file>
+
+<file path=customXml/item2.xml><?xml version="1.0" encoding="utf-8"?>
 <ct:contentTypeSchema xmlns:ct="http://schemas.microsoft.com/office/2006/metadata/contentType" xmlns:ma="http://schemas.microsoft.com/office/2006/metadata/properties/metaAttributes" ct:_="" ma:_="" ma:contentTypeName="Document" ma:contentTypeID="0x010100317C36A1CAF973428CFB8DC9B5B73D030400A741C9874CC89F4CB7C7A5AE62CBCD36" ma:contentTypeVersion="2" ma:contentTypeDescription="" ma:contentTypeScope="" ma:versionID="2a5b37c1a06f9995b1548b8fc9b10188">
   <xsd:schema xmlns:xsd="http://www.w3.org/2001/XMLSchema" xmlns:xs="http://www.w3.org/2001/XMLSchema" xmlns:p="http://schemas.microsoft.com/office/2006/metadata/properties" xmlns:ns2="aff7d12c-bb71-4270-bd29-9c4d45ff3327" targetNamespace="http://schemas.microsoft.com/office/2006/metadata/properties" ma:root="true" ma:fieldsID="535495b15c0addd8af32a03863086e70" ns2:_="">
     <xsd:import namespace="aff7d12c-bb71-4270-bd29-9c4d45ff3327"/>
@@ -12242,19 +12259,26 @@
 </ct:contentTypeSchema>
 </file>
 
-<file path=customXml/item2.xml><?xml version="1.0" encoding="utf-8"?>
-<p:properties xmlns:p="http://schemas.microsoft.com/office/2006/metadata/properties" xmlns:xsi="http://www.w3.org/2001/XMLSchema-instance" xmlns:pc="http://schemas.microsoft.com/office/infopath/2007/PartnerControls">
-  <documentManagement>
-    <_dlc_DocId xmlns="aff7d12c-bb71-4270-bd29-9c4d45ff3327">346bfafb-41a4-4705-9274-1725a8a4651c</_dlc_DocId>
-    <_dlc_DocIdUrl xmlns="aff7d12c-bb71-4270-bd29-9c4d45ff3327">
-      <Url>https://www.groupware.kuleuven.be/sites/hpc/_layouts/15/DocIdRedir.aspx?ID=346bfafb-41a4-4705-9274-1725a8a4651c</Url>
-      <Description>346bfafb-41a4-4705-9274-1725a8a4651c</Description>
-    </_dlc_DocIdUrl>
-  </documentManagement>
-</p:properties>
+<file path=customXml/item3.xml><?xml version="1.0" encoding="utf-8"?>
+<?mso-contentType ?>
+<FormTemplates xmlns="http://schemas.microsoft.com/sharepoint/v3/contenttype/forms">
+  <Display>DocumentLibraryForm</Display>
+  <Edit>DocumentLibraryForm</Edit>
+  <New>DocumentLibraryForm</New>
+</FormTemplates>
 </file>
 
-<file path=customXml/item3.xml><?xml version="1.0" encoding="utf-8"?>
+<file path=customXml/item4.xml><?xml version="1.0" encoding="utf-8"?>
+<?mso-contentType ?>
+<customXsn xmlns="http://schemas.microsoft.com/office/2006/metadata/customXsn">
+  <xsnLocation/>
+  <cached>True</cached>
+  <openByDefault>True</openByDefault>
+  <xsnScope>/sites/hpc</xsnScope>
+</customXsn>
+</file>
+
+<file path=customXml/item5.xml><?xml version="1.0" encoding="utf-8"?>
 <?mso-contentType ?>
 <spe:Receivers xmlns:spe="http://schemas.microsoft.com/sharepoint/events">
   <Receiver>
@@ -12300,26 +12324,23 @@
 </spe:Receivers>
 </file>
 
-<file path=customXml/item4.xml><?xml version="1.0" encoding="utf-8"?>
-<?mso-contentType ?>
-<customXsn xmlns="http://schemas.microsoft.com/office/2006/metadata/customXsn">
-  <xsnLocation/>
-  <cached>True</cached>
-  <openByDefault>True</openByDefault>
-  <xsnScope>/sites/hpc</xsnScope>
-</customXsn>
+<file path=customXml/itemProps1.xml><?xml version="1.0" encoding="utf-8"?>
+<ds:datastoreItem xmlns:ds="http://schemas.openxmlformats.org/officeDocument/2006/customXml" ds:itemID="{F0D56244-60B2-41FD-96AD-7AC25F221D7C}">
+  <ds:schemaRefs>
+    <ds:schemaRef ds:uri="http://schemas.microsoft.com/office/2006/documentManagement/types"/>
+    <ds:schemaRef ds:uri="http://purl.org/dc/terms/"/>
+    <ds:schemaRef ds:uri="aff7d12c-bb71-4270-bd29-9c4d45ff3327"/>
+    <ds:schemaRef ds:uri="http://purl.org/dc/dcmitype/"/>
+    <ds:schemaRef ds:uri="http://schemas.microsoft.com/office/infopath/2007/PartnerControls"/>
+    <ds:schemaRef ds:uri="http://purl.org/dc/elements/1.1/"/>
+    <ds:schemaRef ds:uri="http://schemas.microsoft.com/office/2006/metadata/properties"/>
+    <ds:schemaRef ds:uri="http://schemas.openxmlformats.org/package/2006/metadata/core-properties"/>
+    <ds:schemaRef ds:uri="http://www.w3.org/XML/1998/namespace"/>
+  </ds:schemaRefs>
+</ds:datastoreItem>
 </file>
 
-<file path=customXml/item5.xml><?xml version="1.0" encoding="utf-8"?>
-<?mso-contentType ?>
-<FormTemplates xmlns="http://schemas.microsoft.com/sharepoint/v3/contenttype/forms">
-  <Display>DocumentLibraryForm</Display>
-  <Edit>DocumentLibraryForm</Edit>
-  <New>DocumentLibraryForm</New>
-</FormTemplates>
-</file>
-
-<file path=customXml/itemProps1.xml><?xml version="1.0" encoding="utf-8"?>
+<file path=customXml/itemProps2.xml><?xml version="1.0" encoding="utf-8"?>
 <ds:datastoreItem xmlns:ds="http://schemas.openxmlformats.org/officeDocument/2006/customXml" ds:itemID="{5D5B35C9-35F5-4278-990B-48710415D639}">
   <ds:schemaRefs>
     <ds:schemaRef ds:uri="http://schemas.microsoft.com/office/2006/metadata/contentType"/>
@@ -12337,26 +12358,10 @@
 </ds:datastoreItem>
 </file>
 
-<file path=customXml/itemProps2.xml><?xml version="1.0" encoding="utf-8"?>
-<ds:datastoreItem xmlns:ds="http://schemas.openxmlformats.org/officeDocument/2006/customXml" ds:itemID="{F0D56244-60B2-41FD-96AD-7AC25F221D7C}">
+<file path=customXml/itemProps3.xml><?xml version="1.0" encoding="utf-8"?>
+<ds:datastoreItem xmlns:ds="http://schemas.openxmlformats.org/officeDocument/2006/customXml" ds:itemID="{564EE3F2-D13D-4835-816B-74B5A421851B}">
   <ds:schemaRefs>
-    <ds:schemaRef ds:uri="http://schemas.microsoft.com/office/2006/documentManagement/types"/>
-    <ds:schemaRef ds:uri="http://purl.org/dc/terms/"/>
-    <ds:schemaRef ds:uri="aff7d12c-bb71-4270-bd29-9c4d45ff3327"/>
-    <ds:schemaRef ds:uri="http://purl.org/dc/dcmitype/"/>
-    <ds:schemaRef ds:uri="http://schemas.microsoft.com/office/infopath/2007/PartnerControls"/>
-    <ds:schemaRef ds:uri="http://purl.org/dc/elements/1.1/"/>
-    <ds:schemaRef ds:uri="http://schemas.microsoft.com/office/2006/metadata/properties"/>
-    <ds:schemaRef ds:uri="http://schemas.openxmlformats.org/package/2006/metadata/core-properties"/>
-    <ds:schemaRef ds:uri="http://www.w3.org/XML/1998/namespace"/>
-  </ds:schemaRefs>
-</ds:datastoreItem>
-</file>
-
-<file path=customXml/itemProps3.xml><?xml version="1.0" encoding="utf-8"?>
-<ds:datastoreItem xmlns:ds="http://schemas.openxmlformats.org/officeDocument/2006/customXml" ds:itemID="{7732E273-8A47-4E01-AC36-8FF8A6317757}">
-  <ds:schemaRefs>
-    <ds:schemaRef ds:uri="http://schemas.microsoft.com/sharepoint/events"/>
+    <ds:schemaRef ds:uri="http://schemas.microsoft.com/sharepoint/v3/contenttype/forms"/>
   </ds:schemaRefs>
 </ds:datastoreItem>
 </file>
@@ -12370,9 +12375,9 @@
 </file>
 
 <file path=customXml/itemProps5.xml><?xml version="1.0" encoding="utf-8"?>
-<ds:datastoreItem xmlns:ds="http://schemas.openxmlformats.org/officeDocument/2006/customXml" ds:itemID="{564EE3F2-D13D-4835-816B-74B5A421851B}">
+<ds:datastoreItem xmlns:ds="http://schemas.openxmlformats.org/officeDocument/2006/customXml" ds:itemID="{7732E273-8A47-4E01-AC36-8FF8A6317757}">
   <ds:schemaRefs>
-    <ds:schemaRef ds:uri="http://schemas.microsoft.com/sharepoint/v3/contenttype/forms"/>
+    <ds:schemaRef ds:uri="http://schemas.microsoft.com/sharepoint/events"/>
   </ds:schemaRefs>
 </ds:datastoreItem>
 </file>
</xml_diff>